<commit_message>
Week 11 update by Roger
</commit_message>
<xml_diff>
--- a/Week_10-11/Presentation_EDA.pptx
+++ b/Week_10-11/Presentation_EDA.pptx
@@ -5,7 +5,7 @@
     <p:sldMasterId id="2147483684" r:id="rId1"/>
   </p:sldMasterIdLst>
   <p:notesMasterIdLst>
-    <p:notesMasterId r:id="rId19"/>
+    <p:notesMasterId r:id="rId23"/>
   </p:notesMasterIdLst>
   <p:sldIdLst>
     <p:sldId id="256" r:id="rId2"/>
@@ -16,15 +16,19 @@
     <p:sldId id="275" r:id="rId7"/>
     <p:sldId id="276" r:id="rId8"/>
     <p:sldId id="272" r:id="rId9"/>
-    <p:sldId id="286" r:id="rId10"/>
-    <p:sldId id="292" r:id="rId11"/>
-    <p:sldId id="290" r:id="rId12"/>
-    <p:sldId id="291" r:id="rId13"/>
-    <p:sldId id="285" r:id="rId14"/>
-    <p:sldId id="273" r:id="rId15"/>
-    <p:sldId id="274" r:id="rId16"/>
-    <p:sldId id="284" r:id="rId17"/>
-    <p:sldId id="268" r:id="rId18"/>
+    <p:sldId id="293" r:id="rId10"/>
+    <p:sldId id="297" r:id="rId11"/>
+    <p:sldId id="294" r:id="rId12"/>
+    <p:sldId id="295" r:id="rId13"/>
+    <p:sldId id="296" r:id="rId14"/>
+    <p:sldId id="286" r:id="rId15"/>
+    <p:sldId id="292" r:id="rId16"/>
+    <p:sldId id="290" r:id="rId17"/>
+    <p:sldId id="291" r:id="rId18"/>
+    <p:sldId id="285" r:id="rId19"/>
+    <p:sldId id="273" r:id="rId20"/>
+    <p:sldId id="284" r:id="rId21"/>
+    <p:sldId id="268" r:id="rId22"/>
   </p:sldIdLst>
   <p:sldSz cx="12192000" cy="6858000"/>
   <p:notesSz cx="6858000" cy="9144000"/>
@@ -131,6 +135,14 @@
 </p:presentation>
 </file>
 
+<file path=ppt/revisionInfo.xml><?xml version="1.0" encoding="utf-8"?>
+<p1510:revInfo xmlns:a="http://schemas.openxmlformats.org/drawingml/2006/main" xmlns:r="http://schemas.openxmlformats.org/officeDocument/2006/relationships" xmlns:p1510="http://schemas.microsoft.com/office/powerpoint/2015/10/main">
+  <p1510:revLst>
+    <p1510:client id="{1F239C82-AFC1-45CC-A017-1A691C60E705}" v="27" dt="2021-05-03T20:45:28.147"/>
+  </p1510:revLst>
+</p1510:revInfo>
+</file>
+
 <file path=ppt/changesInfos/changesInfo1.xml><?xml version="1.0" encoding="utf-8"?>
 <pc:chgInfo xmlns:a="http://schemas.openxmlformats.org/drawingml/2006/main" xmlns:r="http://schemas.openxmlformats.org/officeDocument/2006/relationships" xmlns:ac="http://schemas.microsoft.com/office/drawing/2013/main/command" xmlns:pc="http://schemas.microsoft.com/office/powerpoint/2013/main/command">
   <pc:docChgLst>
@@ -623,6 +635,455 @@
             <ac:spMk id="4" creationId="{F0FEE1CD-BF08-48FA-8526-5BEB92660675}"/>
           </ac:spMkLst>
         </pc:spChg>
+      </pc:sldChg>
+    </pc:docChg>
+  </pc:docChgLst>
+  <pc:docChgLst>
+    <pc:chgData name="Roger Burek-Bors" userId="52318fc02a824a34" providerId="LiveId" clId="{1F239C82-AFC1-45CC-A017-1A691C60E705}"/>
+    <pc:docChg chg="undo custSel addSld delSld modSld sldOrd">
+      <pc:chgData name="Roger Burek-Bors" userId="52318fc02a824a34" providerId="LiveId" clId="{1F239C82-AFC1-45CC-A017-1A691C60E705}" dt="2021-05-03T20:52:43.099" v="766" actId="33524"/>
+      <pc:docMkLst>
+        <pc:docMk/>
+      </pc:docMkLst>
+      <pc:sldChg chg="modSp mod">
+        <pc:chgData name="Roger Burek-Bors" userId="52318fc02a824a34" providerId="LiveId" clId="{1F239C82-AFC1-45CC-A017-1A691C60E705}" dt="2021-05-03T20:38:25.932" v="482" actId="13926"/>
+        <pc:sldMkLst>
+          <pc:docMk/>
+          <pc:sldMk cId="1899016330" sldId="269"/>
+        </pc:sldMkLst>
+        <pc:spChg chg="mod">
+          <ac:chgData name="Roger Burek-Bors" userId="52318fc02a824a34" providerId="LiveId" clId="{1F239C82-AFC1-45CC-A017-1A691C60E705}" dt="2021-05-03T20:38:25.932" v="482" actId="13926"/>
+          <ac:spMkLst>
+            <pc:docMk/>
+            <pc:sldMk cId="1899016330" sldId="269"/>
+            <ac:spMk id="3" creationId="{CDC6F948-2F33-47A0-AE55-62E355ACC532}"/>
+          </ac:spMkLst>
+        </pc:spChg>
+      </pc:sldChg>
+      <pc:sldChg chg="modSp mod">
+        <pc:chgData name="Roger Burek-Bors" userId="52318fc02a824a34" providerId="LiveId" clId="{1F239C82-AFC1-45CC-A017-1A691C60E705}" dt="2021-05-03T20:52:43.099" v="766" actId="33524"/>
+        <pc:sldMkLst>
+          <pc:docMk/>
+          <pc:sldMk cId="3497837162" sldId="273"/>
+        </pc:sldMkLst>
+        <pc:spChg chg="mod">
+          <ac:chgData name="Roger Burek-Bors" userId="52318fc02a824a34" providerId="LiveId" clId="{1F239C82-AFC1-45CC-A017-1A691C60E705}" dt="2021-05-03T20:52:43.099" v="766" actId="33524"/>
+          <ac:spMkLst>
+            <pc:docMk/>
+            <pc:sldMk cId="3497837162" sldId="273"/>
+            <ac:spMk id="3" creationId="{CDC6F948-2F33-47A0-AE55-62E355ACC532}"/>
+          </ac:spMkLst>
+        </pc:spChg>
+      </pc:sldChg>
+      <pc:sldChg chg="del">
+        <pc:chgData name="Roger Burek-Bors" userId="52318fc02a824a34" providerId="LiveId" clId="{1F239C82-AFC1-45CC-A017-1A691C60E705}" dt="2021-05-03T20:19:38.133" v="161" actId="47"/>
+        <pc:sldMkLst>
+          <pc:docMk/>
+          <pc:sldMk cId="481083618" sldId="274"/>
+        </pc:sldMkLst>
+      </pc:sldChg>
+      <pc:sldChg chg="modSp mod">
+        <pc:chgData name="Roger Burek-Bors" userId="52318fc02a824a34" providerId="LiveId" clId="{1F239C82-AFC1-45CC-A017-1A691C60E705}" dt="2021-05-03T20:38:43.828" v="483" actId="790"/>
+        <pc:sldMkLst>
+          <pc:docMk/>
+          <pc:sldMk cId="2276711680" sldId="275"/>
+        </pc:sldMkLst>
+        <pc:spChg chg="mod">
+          <ac:chgData name="Roger Burek-Bors" userId="52318fc02a824a34" providerId="LiveId" clId="{1F239C82-AFC1-45CC-A017-1A691C60E705}" dt="2021-05-03T20:38:43.828" v="483" actId="790"/>
+          <ac:spMkLst>
+            <pc:docMk/>
+            <pc:sldMk cId="2276711680" sldId="275"/>
+            <ac:spMk id="3" creationId="{CDC6F948-2F33-47A0-AE55-62E355ACC532}"/>
+          </ac:spMkLst>
+        </pc:spChg>
+        <pc:spChg chg="mod">
+          <ac:chgData name="Roger Burek-Bors" userId="52318fc02a824a34" providerId="LiveId" clId="{1F239C82-AFC1-45CC-A017-1A691C60E705}" dt="2021-05-03T20:20:23.051" v="164" actId="20577"/>
+          <ac:spMkLst>
+            <pc:docMk/>
+            <pc:sldMk cId="2276711680" sldId="275"/>
+            <ac:spMk id="4" creationId="{F0FEE1CD-BF08-48FA-8526-5BEB92660675}"/>
+          </ac:spMkLst>
+        </pc:spChg>
+      </pc:sldChg>
+      <pc:sldChg chg="modSp mod">
+        <pc:chgData name="Roger Burek-Bors" userId="52318fc02a824a34" providerId="LiveId" clId="{1F239C82-AFC1-45CC-A017-1A691C60E705}" dt="2021-05-03T20:25:28.189" v="289"/>
+        <pc:sldMkLst>
+          <pc:docMk/>
+          <pc:sldMk cId="3201505257" sldId="276"/>
+        </pc:sldMkLst>
+        <pc:spChg chg="mod">
+          <ac:chgData name="Roger Burek-Bors" userId="52318fc02a824a34" providerId="LiveId" clId="{1F239C82-AFC1-45CC-A017-1A691C60E705}" dt="2021-05-03T20:25:28.189" v="289"/>
+          <ac:spMkLst>
+            <pc:docMk/>
+            <pc:sldMk cId="3201505257" sldId="276"/>
+            <ac:spMk id="3" creationId="{CDC6F948-2F33-47A0-AE55-62E355ACC532}"/>
+          </ac:spMkLst>
+        </pc:spChg>
+      </pc:sldChg>
+      <pc:sldChg chg="modSp mod">
+        <pc:chgData name="Roger Burek-Bors" userId="52318fc02a824a34" providerId="LiveId" clId="{1F239C82-AFC1-45CC-A017-1A691C60E705}" dt="2021-05-03T20:08:17.109" v="33" actId="20577"/>
+        <pc:sldMkLst>
+          <pc:docMk/>
+          <pc:sldMk cId="1837009852" sldId="284"/>
+        </pc:sldMkLst>
+        <pc:spChg chg="mod">
+          <ac:chgData name="Roger Burek-Bors" userId="52318fc02a824a34" providerId="LiveId" clId="{1F239C82-AFC1-45CC-A017-1A691C60E705}" dt="2021-05-03T20:08:17.109" v="33" actId="20577"/>
+          <ac:spMkLst>
+            <pc:docMk/>
+            <pc:sldMk cId="1837009852" sldId="284"/>
+            <ac:spMk id="3" creationId="{CDC6F948-2F33-47A0-AE55-62E355ACC532}"/>
+          </ac:spMkLst>
+        </pc:spChg>
+      </pc:sldChg>
+      <pc:sldChg chg="modSp mod">
+        <pc:chgData name="Roger Burek-Bors" userId="52318fc02a824a34" providerId="LiveId" clId="{1F239C82-AFC1-45CC-A017-1A691C60E705}" dt="2021-05-03T20:46:02.348" v="549" actId="13926"/>
+        <pc:sldMkLst>
+          <pc:docMk/>
+          <pc:sldMk cId="305963083" sldId="285"/>
+        </pc:sldMkLst>
+        <pc:spChg chg="mod">
+          <ac:chgData name="Roger Burek-Bors" userId="52318fc02a824a34" providerId="LiveId" clId="{1F239C82-AFC1-45CC-A017-1A691C60E705}" dt="2021-05-03T20:46:02.348" v="549" actId="13926"/>
+          <ac:spMkLst>
+            <pc:docMk/>
+            <pc:sldMk cId="305963083" sldId="285"/>
+            <ac:spMk id="3" creationId="{CDC6F948-2F33-47A0-AE55-62E355ACC532}"/>
+          </ac:spMkLst>
+        </pc:spChg>
+        <pc:spChg chg="mod">
+          <ac:chgData name="Roger Burek-Bors" userId="52318fc02a824a34" providerId="LiveId" clId="{1F239C82-AFC1-45CC-A017-1A691C60E705}" dt="2021-05-03T20:45:59.582" v="548" actId="13926"/>
+          <ac:spMkLst>
+            <pc:docMk/>
+            <pc:sldMk cId="305963083" sldId="285"/>
+            <ac:spMk id="4" creationId="{F0FEE1CD-BF08-48FA-8526-5BEB92660675}"/>
+          </ac:spMkLst>
+        </pc:spChg>
+      </pc:sldChg>
+      <pc:sldChg chg="modSp mod">
+        <pc:chgData name="Roger Burek-Bors" userId="52318fc02a824a34" providerId="LiveId" clId="{1F239C82-AFC1-45CC-A017-1A691C60E705}" dt="2021-05-03T20:18:33.991" v="138" actId="20577"/>
+        <pc:sldMkLst>
+          <pc:docMk/>
+          <pc:sldMk cId="2274438380" sldId="286"/>
+        </pc:sldMkLst>
+        <pc:spChg chg="mod">
+          <ac:chgData name="Roger Burek-Bors" userId="52318fc02a824a34" providerId="LiveId" clId="{1F239C82-AFC1-45CC-A017-1A691C60E705}" dt="2021-05-03T20:18:33.991" v="138" actId="20577"/>
+          <ac:spMkLst>
+            <pc:docMk/>
+            <pc:sldMk cId="2274438380" sldId="286"/>
+            <ac:spMk id="4" creationId="{F0FEE1CD-BF08-48FA-8526-5BEB92660675}"/>
+          </ac:spMkLst>
+        </pc:spChg>
+      </pc:sldChg>
+      <pc:sldChg chg="modSp mod">
+        <pc:chgData name="Roger Burek-Bors" userId="52318fc02a824a34" providerId="LiveId" clId="{1F239C82-AFC1-45CC-A017-1A691C60E705}" dt="2021-05-03T20:18:51.837" v="144" actId="20577"/>
+        <pc:sldMkLst>
+          <pc:docMk/>
+          <pc:sldMk cId="932615590" sldId="290"/>
+        </pc:sldMkLst>
+        <pc:spChg chg="mod">
+          <ac:chgData name="Roger Burek-Bors" userId="52318fc02a824a34" providerId="LiveId" clId="{1F239C82-AFC1-45CC-A017-1A691C60E705}" dt="2021-05-03T20:18:51.837" v="144" actId="20577"/>
+          <ac:spMkLst>
+            <pc:docMk/>
+            <pc:sldMk cId="932615590" sldId="290"/>
+            <ac:spMk id="4" creationId="{F0FEE1CD-BF08-48FA-8526-5BEB92660675}"/>
+          </ac:spMkLst>
+        </pc:spChg>
+      </pc:sldChg>
+      <pc:sldChg chg="modSp mod">
+        <pc:chgData name="Roger Burek-Bors" userId="52318fc02a824a34" providerId="LiveId" clId="{1F239C82-AFC1-45CC-A017-1A691C60E705}" dt="2021-05-03T20:18:58.936" v="147" actId="20577"/>
+        <pc:sldMkLst>
+          <pc:docMk/>
+          <pc:sldMk cId="3823268150" sldId="291"/>
+        </pc:sldMkLst>
+        <pc:spChg chg="mod">
+          <ac:chgData name="Roger Burek-Bors" userId="52318fc02a824a34" providerId="LiveId" clId="{1F239C82-AFC1-45CC-A017-1A691C60E705}" dt="2021-05-03T20:18:58.936" v="147" actId="20577"/>
+          <ac:spMkLst>
+            <pc:docMk/>
+            <pc:sldMk cId="3823268150" sldId="291"/>
+            <ac:spMk id="4" creationId="{F0FEE1CD-BF08-48FA-8526-5BEB92660675}"/>
+          </ac:spMkLst>
+        </pc:spChg>
+      </pc:sldChg>
+      <pc:sldChg chg="modSp mod">
+        <pc:chgData name="Roger Burek-Bors" userId="52318fc02a824a34" providerId="LiveId" clId="{1F239C82-AFC1-45CC-A017-1A691C60E705}" dt="2021-05-03T20:18:44.022" v="141" actId="20577"/>
+        <pc:sldMkLst>
+          <pc:docMk/>
+          <pc:sldMk cId="2450542382" sldId="292"/>
+        </pc:sldMkLst>
+        <pc:spChg chg="mod">
+          <ac:chgData name="Roger Burek-Bors" userId="52318fc02a824a34" providerId="LiveId" clId="{1F239C82-AFC1-45CC-A017-1A691C60E705}" dt="2021-05-03T20:18:44.022" v="141" actId="20577"/>
+          <ac:spMkLst>
+            <pc:docMk/>
+            <pc:sldMk cId="2450542382" sldId="292"/>
+            <ac:spMk id="4" creationId="{F0FEE1CD-BF08-48FA-8526-5BEB92660675}"/>
+          </ac:spMkLst>
+        </pc:spChg>
+      </pc:sldChg>
+      <pc:sldChg chg="addSp delSp modSp add mod">
+        <pc:chgData name="Roger Burek-Bors" userId="52318fc02a824a34" providerId="LiveId" clId="{1F239C82-AFC1-45CC-A017-1A691C60E705}" dt="2021-05-03T20:16:49.220" v="110" actId="1076"/>
+        <pc:sldMkLst>
+          <pc:docMk/>
+          <pc:sldMk cId="2156988798" sldId="293"/>
+        </pc:sldMkLst>
+        <pc:spChg chg="mod">
+          <ac:chgData name="Roger Burek-Bors" userId="52318fc02a824a34" providerId="LiveId" clId="{1F239C82-AFC1-45CC-A017-1A691C60E705}" dt="2021-05-03T20:16:42.852" v="109" actId="1076"/>
+          <ac:spMkLst>
+            <pc:docMk/>
+            <pc:sldMk cId="2156988798" sldId="293"/>
+            <ac:spMk id="3" creationId="{CDC6F948-2F33-47A0-AE55-62E355ACC532}"/>
+          </ac:spMkLst>
+        </pc:spChg>
+        <pc:spChg chg="mod">
+          <ac:chgData name="Roger Burek-Bors" userId="52318fc02a824a34" providerId="LiveId" clId="{1F239C82-AFC1-45CC-A017-1A691C60E705}" dt="2021-05-03T20:12:17.523" v="68" actId="20577"/>
+          <ac:spMkLst>
+            <pc:docMk/>
+            <pc:sldMk cId="2156988798" sldId="293"/>
+            <ac:spMk id="4" creationId="{F0FEE1CD-BF08-48FA-8526-5BEB92660675}"/>
+          </ac:spMkLst>
+        </pc:spChg>
+        <pc:spChg chg="add mod">
+          <ac:chgData name="Roger Burek-Bors" userId="52318fc02a824a34" providerId="LiveId" clId="{1F239C82-AFC1-45CC-A017-1A691C60E705}" dt="2021-05-03T20:16:49.220" v="110" actId="1076"/>
+          <ac:spMkLst>
+            <pc:docMk/>
+            <pc:sldMk cId="2156988798" sldId="293"/>
+            <ac:spMk id="11" creationId="{F9D4C8FC-A208-41EC-B784-B3722E694791}"/>
+          </ac:spMkLst>
+        </pc:spChg>
+        <pc:picChg chg="del">
+          <ac:chgData name="Roger Burek-Bors" userId="52318fc02a824a34" providerId="LiveId" clId="{1F239C82-AFC1-45CC-A017-1A691C60E705}" dt="2021-05-03T20:13:25.898" v="73" actId="478"/>
+          <ac:picMkLst>
+            <pc:docMk/>
+            <pc:sldMk cId="2156988798" sldId="293"/>
+            <ac:picMk id="5" creationId="{A995BEC3-555A-4FB5-BEFB-142F1A184D8C}"/>
+          </ac:picMkLst>
+        </pc:picChg>
+        <pc:picChg chg="add mod">
+          <ac:chgData name="Roger Burek-Bors" userId="52318fc02a824a34" providerId="LiveId" clId="{1F239C82-AFC1-45CC-A017-1A691C60E705}" dt="2021-05-03T20:14:16.458" v="75" actId="1076"/>
+          <ac:picMkLst>
+            <pc:docMk/>
+            <pc:sldMk cId="2156988798" sldId="293"/>
+            <ac:picMk id="6" creationId="{93F0C90B-75A4-4EE9-A670-88D8F0BA6E83}"/>
+          </ac:picMkLst>
+        </pc:picChg>
+        <pc:picChg chg="add del">
+          <ac:chgData name="Roger Burek-Bors" userId="52318fc02a824a34" providerId="LiveId" clId="{1F239C82-AFC1-45CC-A017-1A691C60E705}" dt="2021-05-03T20:14:46.634" v="84"/>
+          <ac:picMkLst>
+            <pc:docMk/>
+            <pc:sldMk cId="2156988798" sldId="293"/>
+            <ac:picMk id="7" creationId="{73DBB07E-B132-4DC5-A8E8-2348E61099BF}"/>
+          </ac:picMkLst>
+        </pc:picChg>
+        <pc:picChg chg="add mod">
+          <ac:chgData name="Roger Burek-Bors" userId="52318fc02a824a34" providerId="LiveId" clId="{1F239C82-AFC1-45CC-A017-1A691C60E705}" dt="2021-05-03T20:15:43.709" v="91" actId="1076"/>
+          <ac:picMkLst>
+            <pc:docMk/>
+            <pc:sldMk cId="2156988798" sldId="293"/>
+            <ac:picMk id="9" creationId="{3CBC7FF4-559B-4FC3-8235-ADCA753D42A7}"/>
+          </ac:picMkLst>
+        </pc:picChg>
+      </pc:sldChg>
+      <pc:sldChg chg="addSp delSp modSp add mod ord">
+        <pc:chgData name="Roger Burek-Bors" userId="52318fc02a824a34" providerId="LiveId" clId="{1F239C82-AFC1-45CC-A017-1A691C60E705}" dt="2021-05-03T20:41:38.693" v="517" actId="1076"/>
+        <pc:sldMkLst>
+          <pc:docMk/>
+          <pc:sldMk cId="839964648" sldId="294"/>
+        </pc:sldMkLst>
+        <pc:spChg chg="mod">
+          <ac:chgData name="Roger Burek-Bors" userId="52318fc02a824a34" providerId="LiveId" clId="{1F239C82-AFC1-45CC-A017-1A691C60E705}" dt="2021-05-03T20:41:38.693" v="517" actId="1076"/>
+          <ac:spMkLst>
+            <pc:docMk/>
+            <pc:sldMk cId="839964648" sldId="294"/>
+            <ac:spMk id="3" creationId="{CDC6F948-2F33-47A0-AE55-62E355ACC532}"/>
+          </ac:spMkLst>
+        </pc:spChg>
+        <pc:spChg chg="mod">
+          <ac:chgData name="Roger Burek-Bors" userId="52318fc02a824a34" providerId="LiveId" clId="{1F239C82-AFC1-45CC-A017-1A691C60E705}" dt="2021-05-03T20:23:30.054" v="276" actId="20577"/>
+          <ac:spMkLst>
+            <pc:docMk/>
+            <pc:sldMk cId="839964648" sldId="294"/>
+            <ac:spMk id="4" creationId="{F0FEE1CD-BF08-48FA-8526-5BEB92660675}"/>
+          </ac:spMkLst>
+        </pc:spChg>
+        <pc:spChg chg="add mod">
+          <ac:chgData name="Roger Burek-Bors" userId="52318fc02a824a34" providerId="LiveId" clId="{1F239C82-AFC1-45CC-A017-1A691C60E705}" dt="2021-05-03T20:41:34.311" v="516" actId="1076"/>
+          <ac:spMkLst>
+            <pc:docMk/>
+            <pc:sldMk cId="839964648" sldId="294"/>
+            <ac:spMk id="7" creationId="{AC6C6EF5-2F39-486B-9458-838510BC92BD}"/>
+          </ac:spMkLst>
+        </pc:spChg>
+        <pc:picChg chg="del">
+          <ac:chgData name="Roger Burek-Bors" userId="52318fc02a824a34" providerId="LiveId" clId="{1F239C82-AFC1-45CC-A017-1A691C60E705}" dt="2021-05-03T20:39:33.796" v="484" actId="478"/>
+          <ac:picMkLst>
+            <pc:docMk/>
+            <pc:sldMk cId="839964648" sldId="294"/>
+            <ac:picMk id="5" creationId="{A995BEC3-555A-4FB5-BEFB-142F1A184D8C}"/>
+          </ac:picMkLst>
+        </pc:picChg>
+        <pc:picChg chg="add mod">
+          <ac:chgData name="Roger Burek-Bors" userId="52318fc02a824a34" providerId="LiveId" clId="{1F239C82-AFC1-45CC-A017-1A691C60E705}" dt="2021-05-03T20:39:39.257" v="486" actId="1076"/>
+          <ac:picMkLst>
+            <pc:docMk/>
+            <pc:sldMk cId="839964648" sldId="294"/>
+            <ac:picMk id="1026" creationId="{ACCAA7A1-29FF-466B-890E-FB6CEB917DE6}"/>
+          </ac:picMkLst>
+        </pc:picChg>
+        <pc:picChg chg="add mod">
+          <ac:chgData name="Roger Burek-Bors" userId="52318fc02a824a34" providerId="LiveId" clId="{1F239C82-AFC1-45CC-A017-1A691C60E705}" dt="2021-05-03T20:41:24.454" v="515" actId="1076"/>
+          <ac:picMkLst>
+            <pc:docMk/>
+            <pc:sldMk cId="839964648" sldId="294"/>
+            <ac:picMk id="1028" creationId="{0760E8AA-5DEC-4886-8880-68AF1B8A0073}"/>
+          </ac:picMkLst>
+        </pc:picChg>
+      </pc:sldChg>
+      <pc:sldChg chg="addSp delSp modSp add mod">
+        <pc:chgData name="Roger Burek-Bors" userId="52318fc02a824a34" providerId="LiveId" clId="{1F239C82-AFC1-45CC-A017-1A691C60E705}" dt="2021-05-03T20:44:09.122" v="533" actId="20577"/>
+        <pc:sldMkLst>
+          <pc:docMk/>
+          <pc:sldMk cId="2196212050" sldId="295"/>
+        </pc:sldMkLst>
+        <pc:spChg chg="mod">
+          <ac:chgData name="Roger Burek-Bors" userId="52318fc02a824a34" providerId="LiveId" clId="{1F239C82-AFC1-45CC-A017-1A691C60E705}" dt="2021-05-03T20:44:09.122" v="533" actId="20577"/>
+          <ac:spMkLst>
+            <pc:docMk/>
+            <pc:sldMk cId="2196212050" sldId="295"/>
+            <ac:spMk id="3" creationId="{CDC6F948-2F33-47A0-AE55-62E355ACC532}"/>
+          </ac:spMkLst>
+        </pc:spChg>
+        <pc:spChg chg="mod">
+          <ac:chgData name="Roger Burek-Bors" userId="52318fc02a824a34" providerId="LiveId" clId="{1F239C82-AFC1-45CC-A017-1A691C60E705}" dt="2021-05-03T20:24:34.085" v="285"/>
+          <ac:spMkLst>
+            <pc:docMk/>
+            <pc:sldMk cId="2196212050" sldId="295"/>
+            <ac:spMk id="4" creationId="{F0FEE1CD-BF08-48FA-8526-5BEB92660675}"/>
+          </ac:spMkLst>
+        </pc:spChg>
+        <pc:picChg chg="add mod">
+          <ac:chgData name="Roger Burek-Bors" userId="52318fc02a824a34" providerId="LiveId" clId="{1F239C82-AFC1-45CC-A017-1A691C60E705}" dt="2021-05-03T20:43:20.916" v="524" actId="1076"/>
+          <ac:picMkLst>
+            <pc:docMk/>
+            <pc:sldMk cId="2196212050" sldId="295"/>
+            <ac:picMk id="2" creationId="{341D352E-A054-46A8-BAA1-4B635F41D580}"/>
+          </ac:picMkLst>
+        </pc:picChg>
+        <pc:picChg chg="del">
+          <ac:chgData name="Roger Burek-Bors" userId="52318fc02a824a34" providerId="LiveId" clId="{1F239C82-AFC1-45CC-A017-1A691C60E705}" dt="2021-05-03T20:42:09.685" v="518" actId="478"/>
+          <ac:picMkLst>
+            <pc:docMk/>
+            <pc:sldMk cId="2196212050" sldId="295"/>
+            <ac:picMk id="5" creationId="{A995BEC3-555A-4FB5-BEFB-142F1A184D8C}"/>
+          </ac:picMkLst>
+        </pc:picChg>
+        <pc:picChg chg="add mod">
+          <ac:chgData name="Roger Burek-Bors" userId="52318fc02a824a34" providerId="LiveId" clId="{1F239C82-AFC1-45CC-A017-1A691C60E705}" dt="2021-05-03T20:43:26.689" v="526" actId="1076"/>
+          <ac:picMkLst>
+            <pc:docMk/>
+            <pc:sldMk cId="2196212050" sldId="295"/>
+            <ac:picMk id="2050" creationId="{4CE7F58A-C4DE-4E30-95B3-69FA7BC945AB}"/>
+          </ac:picMkLst>
+        </pc:picChg>
+      </pc:sldChg>
+      <pc:sldChg chg="addSp delSp modSp add mod">
+        <pc:chgData name="Roger Burek-Bors" userId="52318fc02a824a34" providerId="LiveId" clId="{1F239C82-AFC1-45CC-A017-1A691C60E705}" dt="2021-05-03T20:45:47.908" v="547"/>
+        <pc:sldMkLst>
+          <pc:docMk/>
+          <pc:sldMk cId="884164174" sldId="296"/>
+        </pc:sldMkLst>
+        <pc:spChg chg="mod">
+          <ac:chgData name="Roger Burek-Bors" userId="52318fc02a824a34" providerId="LiveId" clId="{1F239C82-AFC1-45CC-A017-1A691C60E705}" dt="2021-05-03T20:45:47.908" v="547"/>
+          <ac:spMkLst>
+            <pc:docMk/>
+            <pc:sldMk cId="884164174" sldId="296"/>
+            <ac:spMk id="3" creationId="{CDC6F948-2F33-47A0-AE55-62E355ACC532}"/>
+          </ac:spMkLst>
+        </pc:spChg>
+        <pc:spChg chg="mod">
+          <ac:chgData name="Roger Burek-Bors" userId="52318fc02a824a34" providerId="LiveId" clId="{1F239C82-AFC1-45CC-A017-1A691C60E705}" dt="2021-05-03T20:25:37.498" v="290"/>
+          <ac:spMkLst>
+            <pc:docMk/>
+            <pc:sldMk cId="884164174" sldId="296"/>
+            <ac:spMk id="4" creationId="{F0FEE1CD-BF08-48FA-8526-5BEB92660675}"/>
+          </ac:spMkLst>
+        </pc:spChg>
+        <pc:picChg chg="del">
+          <ac:chgData name="Roger Burek-Bors" userId="52318fc02a824a34" providerId="LiveId" clId="{1F239C82-AFC1-45CC-A017-1A691C60E705}" dt="2021-05-03T20:44:45.678" v="534" actId="478"/>
+          <ac:picMkLst>
+            <pc:docMk/>
+            <pc:sldMk cId="884164174" sldId="296"/>
+            <ac:picMk id="5" creationId="{A995BEC3-555A-4FB5-BEFB-142F1A184D8C}"/>
+          </ac:picMkLst>
+        </pc:picChg>
+        <pc:picChg chg="add mod">
+          <ac:chgData name="Roger Burek-Bors" userId="52318fc02a824a34" providerId="LiveId" clId="{1F239C82-AFC1-45CC-A017-1A691C60E705}" dt="2021-05-03T20:45:28.147" v="546" actId="1076"/>
+          <ac:picMkLst>
+            <pc:docMk/>
+            <pc:sldMk cId="884164174" sldId="296"/>
+            <ac:picMk id="3074" creationId="{E3FB3F1D-685A-4674-B708-86CBB04EA109}"/>
+          </ac:picMkLst>
+        </pc:picChg>
+        <pc:picChg chg="add mod">
+          <ac:chgData name="Roger Burek-Bors" userId="52318fc02a824a34" providerId="LiveId" clId="{1F239C82-AFC1-45CC-A017-1A691C60E705}" dt="2021-05-03T20:45:28.147" v="546" actId="1076"/>
+          <ac:picMkLst>
+            <pc:docMk/>
+            <pc:sldMk cId="884164174" sldId="296"/>
+            <ac:picMk id="3076" creationId="{32F00863-DC79-4014-B508-0E4D69843C76}"/>
+          </ac:picMkLst>
+        </pc:picChg>
+      </pc:sldChg>
+      <pc:sldChg chg="addSp delSp modSp add mod">
+        <pc:chgData name="Roger Burek-Bors" userId="52318fc02a824a34" providerId="LiveId" clId="{1F239C82-AFC1-45CC-A017-1A691C60E705}" dt="2021-05-03T20:28:31.957" v="370" actId="1076"/>
+        <pc:sldMkLst>
+          <pc:docMk/>
+          <pc:sldMk cId="229490772" sldId="297"/>
+        </pc:sldMkLst>
+        <pc:spChg chg="del mod">
+          <ac:chgData name="Roger Burek-Bors" userId="52318fc02a824a34" providerId="LiveId" clId="{1F239C82-AFC1-45CC-A017-1A691C60E705}" dt="2021-05-03T20:28:12.115" v="363" actId="478"/>
+          <ac:spMkLst>
+            <pc:docMk/>
+            <pc:sldMk cId="229490772" sldId="297"/>
+            <ac:spMk id="3" creationId="{CDC6F948-2F33-47A0-AE55-62E355ACC532}"/>
+          </ac:spMkLst>
+        </pc:spChg>
+        <pc:spChg chg="add del mod">
+          <ac:chgData name="Roger Burek-Bors" userId="52318fc02a824a34" providerId="LiveId" clId="{1F239C82-AFC1-45CC-A017-1A691C60E705}" dt="2021-05-03T20:28:16.385" v="365" actId="478"/>
+          <ac:spMkLst>
+            <pc:docMk/>
+            <pc:sldMk cId="229490772" sldId="297"/>
+            <ac:spMk id="5" creationId="{09FCD95F-5F89-4BCB-A243-942FFA937499}"/>
+          </ac:spMkLst>
+        </pc:spChg>
+        <pc:spChg chg="del">
+          <ac:chgData name="Roger Burek-Bors" userId="52318fc02a824a34" providerId="LiveId" clId="{1F239C82-AFC1-45CC-A017-1A691C60E705}" dt="2021-05-03T20:28:15.123" v="364" actId="478"/>
+          <ac:spMkLst>
+            <pc:docMk/>
+            <pc:sldMk cId="229490772" sldId="297"/>
+            <ac:spMk id="11" creationId="{F9D4C8FC-A208-41EC-B784-B3722E694791}"/>
+          </ac:spMkLst>
+        </pc:spChg>
+        <pc:picChg chg="del">
+          <ac:chgData name="Roger Burek-Bors" userId="52318fc02a824a34" providerId="LiveId" clId="{1F239C82-AFC1-45CC-A017-1A691C60E705}" dt="2021-05-03T20:28:06.579" v="360" actId="478"/>
+          <ac:picMkLst>
+            <pc:docMk/>
+            <pc:sldMk cId="229490772" sldId="297"/>
+            <ac:picMk id="6" creationId="{93F0C90B-75A4-4EE9-A670-88D8F0BA6E83}"/>
+          </ac:picMkLst>
+        </pc:picChg>
+        <pc:picChg chg="add mod">
+          <ac:chgData name="Roger Burek-Bors" userId="52318fc02a824a34" providerId="LiveId" clId="{1F239C82-AFC1-45CC-A017-1A691C60E705}" dt="2021-05-03T20:28:31.957" v="370" actId="1076"/>
+          <ac:picMkLst>
+            <pc:docMk/>
+            <pc:sldMk cId="229490772" sldId="297"/>
+            <ac:picMk id="8" creationId="{369F835C-72EE-4553-918A-C1FC0B1BC81A}"/>
+          </ac:picMkLst>
+        </pc:picChg>
+        <pc:picChg chg="del">
+          <ac:chgData name="Roger Burek-Bors" userId="52318fc02a824a34" providerId="LiveId" clId="{1F239C82-AFC1-45CC-A017-1A691C60E705}" dt="2021-05-03T20:28:08.831" v="361" actId="478"/>
+          <ac:picMkLst>
+            <pc:docMk/>
+            <pc:sldMk cId="229490772" sldId="297"/>
+            <ac:picMk id="9" creationId="{3CBC7FF4-559B-4FC3-8235-ADCA753D42A7}"/>
+          </ac:picMkLst>
+        </pc:picChg>
       </pc:sldChg>
     </pc:docChg>
   </pc:docChgLst>
@@ -1629,7 +2090,7 @@
           <a:p>
             <a:fld id="{45D38039-D5F5-4949-A49B-4447AEE3E6F0}" type="slidenum">
               <a:rPr lang="en-US" smtClean="0"/>
-              <a:t>11</a:t>
+              <a:t>16</a:t>
             </a:fld>
             <a:endParaRPr lang="en-US"/>
           </a:p>
@@ -1713,7 +2174,7 @@
           <a:p>
             <a:fld id="{45D38039-D5F5-4949-A49B-4447AEE3E6F0}" type="slidenum">
               <a:rPr lang="en-US" smtClean="0"/>
-              <a:t>12</a:t>
+              <a:t>17</a:t>
             </a:fld>
             <a:endParaRPr lang="en-US"/>
           </a:p>
@@ -4795,6 +5256,1538 @@
       </p:grpSpPr>
       <p:sp>
         <p:nvSpPr>
+          <p:cNvPr id="4" name="Title 1">
+            <a:extLst>
+              <a:ext uri="{FF2B5EF4-FFF2-40B4-BE49-F238E27FC236}">
+                <a16:creationId xmlns:a16="http://schemas.microsoft.com/office/drawing/2014/main" id="{F0FEE1CD-BF08-48FA-8526-5BEB92660675}"/>
+              </a:ext>
+            </a:extLst>
+          </p:cNvPr>
+          <p:cNvSpPr txBox="1">
+            <a:spLocks/>
+          </p:cNvSpPr>
+          <p:nvPr/>
+        </p:nvSpPr>
+        <p:spPr>
+          <a:xfrm rot="5400000">
+            <a:off x="5488404" y="-5488406"/>
+            <a:ext cx="1215190" cy="12192001"/>
+          </a:xfrm>
+          <a:prstGeom prst="rect">
+            <a:avLst/>
+          </a:prstGeom>
+          <a:solidFill>
+            <a:srgbClr val="3B3B3B"/>
+          </a:solidFill>
+        </p:spPr>
+        <p:txBody>
+          <a:bodyPr vert="vert270" lIns="91440" tIns="45720" rIns="91440" bIns="45720" rtlCol="0" anchor="ctr" anchorCtr="0">
+            <a:normAutofit fontScale="92500" lnSpcReduction="10000"/>
+          </a:bodyPr>
+          <a:lstStyle>
+            <a:lvl1pPr algn="l" defTabSz="914400" rtl="0" eaLnBrk="1" latinLnBrk="0" hangingPunct="1">
+              <a:lnSpc>
+                <a:spcPct val="90000"/>
+              </a:lnSpc>
+              <a:spcBef>
+                <a:spcPct val="0"/>
+              </a:spcBef>
+              <a:buNone/>
+              <a:defRPr sz="4400" kern="1200">
+                <a:solidFill>
+                  <a:schemeClr val="tx1"/>
+                </a:solidFill>
+                <a:latin typeface="+mj-lt"/>
+                <a:ea typeface="+mj-ea"/>
+                <a:cs typeface="+mj-cs"/>
+              </a:defRPr>
+            </a:lvl1pPr>
+          </a:lstStyle>
+          <a:p>
+            <a:pPr algn="ctr"/>
+            <a:r>
+              <a:rPr lang="en-US" b="1" dirty="0">
+                <a:solidFill>
+                  <a:srgbClr val="FF6600"/>
+                </a:solidFill>
+              </a:rPr>
+              <a:t>EDA - Hypothesis no. </a:t>
+            </a:r>
+            <a:r>
+              <a:rPr lang="pl-PL" b="1" dirty="0">
+                <a:solidFill>
+                  <a:srgbClr val="FF6600"/>
+                </a:solidFill>
+              </a:rPr>
+              <a:t>2 </a:t>
+            </a:r>
+          </a:p>
+          <a:p>
+            <a:pPr algn="ctr"/>
+            <a:r>
+              <a:rPr lang="pl-PL" b="1" dirty="0">
+                <a:solidFill>
+                  <a:srgbClr val="FF6600"/>
+                </a:solidFill>
+              </a:rPr>
+              <a:t>„RISK </a:t>
+            </a:r>
+            <a:r>
+              <a:rPr lang="pl-PL" b="1" dirty="0" err="1">
+                <a:solidFill>
+                  <a:srgbClr val="FF6600"/>
+                </a:solidFill>
+              </a:rPr>
+              <a:t>features</a:t>
+            </a:r>
+            <a:r>
+              <a:rPr lang="pl-PL" b="1" dirty="0">
+                <a:solidFill>
+                  <a:srgbClr val="FF6600"/>
+                </a:solidFill>
+              </a:rPr>
+              <a:t> as</a:t>
+            </a:r>
+            <a:r>
+              <a:rPr lang="en-US" b="1" dirty="0">
+                <a:solidFill>
+                  <a:srgbClr val="FF6600"/>
+                </a:solidFill>
+              </a:rPr>
+              <a:t> important classifier of drug persistency</a:t>
+            </a:r>
+            <a:r>
+              <a:rPr lang="pl-PL" b="1" dirty="0">
+                <a:solidFill>
+                  <a:srgbClr val="FF6600"/>
+                </a:solidFill>
+              </a:rPr>
+              <a:t>”</a:t>
+            </a:r>
+            <a:endParaRPr lang="en-US" b="1" dirty="0">
+              <a:solidFill>
+                <a:srgbClr val="FF6600"/>
+              </a:solidFill>
+            </a:endParaRPr>
+          </a:p>
+        </p:txBody>
+      </p:sp>
+      <p:pic>
+        <p:nvPicPr>
+          <p:cNvPr id="8" name="Obraz 7">
+            <a:extLst>
+              <a:ext uri="{FF2B5EF4-FFF2-40B4-BE49-F238E27FC236}">
+                <a16:creationId xmlns:a16="http://schemas.microsoft.com/office/drawing/2014/main" id="{369F835C-72EE-4553-918A-C1FC0B1BC81A}"/>
+              </a:ext>
+            </a:extLst>
+          </p:cNvPr>
+          <p:cNvPicPr>
+            <a:picLocks noChangeAspect="1"/>
+          </p:cNvPicPr>
+          <p:nvPr/>
+        </p:nvPicPr>
+        <p:blipFill>
+          <a:blip r:embed="rId2"/>
+          <a:stretch>
+            <a:fillRect/>
+          </a:stretch>
+        </p:blipFill>
+        <p:spPr>
+          <a:xfrm>
+            <a:off x="2376523" y="1371600"/>
+            <a:ext cx="7438952" cy="5329096"/>
+          </a:xfrm>
+          <a:prstGeom prst="rect">
+            <a:avLst/>
+          </a:prstGeom>
+        </p:spPr>
+      </p:pic>
+    </p:spTree>
+    <p:extLst>
+      <p:ext uri="{BB962C8B-B14F-4D97-AF65-F5344CB8AC3E}">
+        <p14:creationId xmlns:p14="http://schemas.microsoft.com/office/powerpoint/2010/main" val="229490772"/>
+      </p:ext>
+    </p:extLst>
+  </p:cSld>
+  <p:clrMapOvr>
+    <a:masterClrMapping/>
+  </p:clrMapOvr>
+</p:sld>
+</file>
+
+<file path=ppt/slides/slide11.xml><?xml version="1.0" encoding="utf-8"?>
+<p:sld xmlns:a="http://schemas.openxmlformats.org/drawingml/2006/main" xmlns:r="http://schemas.openxmlformats.org/officeDocument/2006/relationships" xmlns:p="http://schemas.openxmlformats.org/presentationml/2006/main">
+  <p:cSld>
+    <p:spTree>
+      <p:nvGrpSpPr>
+        <p:cNvPr id="1" name=""/>
+        <p:cNvGrpSpPr/>
+        <p:nvPr/>
+      </p:nvGrpSpPr>
+      <p:grpSpPr>
+        <a:xfrm>
+          <a:off x="0" y="0"/>
+          <a:ext cx="0" cy="0"/>
+          <a:chOff x="0" y="0"/>
+          <a:chExt cx="0" cy="0"/>
+        </a:xfrm>
+      </p:grpSpPr>
+      <p:sp>
+        <p:nvSpPr>
+          <p:cNvPr id="3" name="Symbol zastępczy zawartości 2">
+            <a:extLst>
+              <a:ext uri="{FF2B5EF4-FFF2-40B4-BE49-F238E27FC236}">
+                <a16:creationId xmlns:a16="http://schemas.microsoft.com/office/drawing/2014/main" id="{CDC6F948-2F33-47A0-AE55-62E355ACC532}"/>
+              </a:ext>
+            </a:extLst>
+          </p:cNvPr>
+          <p:cNvSpPr>
+            <a:spLocks noGrp="1"/>
+          </p:cNvSpPr>
+          <p:nvPr>
+            <p:ph idx="1"/>
+          </p:nvPr>
+        </p:nvSpPr>
+        <p:spPr>
+          <a:xfrm>
+            <a:off x="4459460" y="2283478"/>
+            <a:ext cx="7285800" cy="2035860"/>
+          </a:xfrm>
+        </p:spPr>
+        <p:txBody>
+          <a:bodyPr>
+            <a:normAutofit/>
+          </a:bodyPr>
+          <a:lstStyle/>
+          <a:p>
+            <a:pPr algn="just"/>
+            <a:r>
+              <a:rPr lang="en-US" dirty="0"/>
+              <a:t>Older patients are more persistent</a:t>
+            </a:r>
+            <a:r>
+              <a:rPr lang="pl-PL" dirty="0"/>
+              <a:t>.</a:t>
+            </a:r>
+          </a:p>
+        </p:txBody>
+      </p:sp>
+      <p:sp>
+        <p:nvSpPr>
+          <p:cNvPr id="4" name="Title 1">
+            <a:extLst>
+              <a:ext uri="{FF2B5EF4-FFF2-40B4-BE49-F238E27FC236}">
+                <a16:creationId xmlns:a16="http://schemas.microsoft.com/office/drawing/2014/main" id="{F0FEE1CD-BF08-48FA-8526-5BEB92660675}"/>
+              </a:ext>
+            </a:extLst>
+          </p:cNvPr>
+          <p:cNvSpPr txBox="1">
+            <a:spLocks/>
+          </p:cNvSpPr>
+          <p:nvPr/>
+        </p:nvSpPr>
+        <p:spPr>
+          <a:xfrm rot="5400000">
+            <a:off x="5488404" y="-5488406"/>
+            <a:ext cx="1215190" cy="12192001"/>
+          </a:xfrm>
+          <a:prstGeom prst="rect">
+            <a:avLst/>
+          </a:prstGeom>
+          <a:solidFill>
+            <a:srgbClr val="3B3B3B"/>
+          </a:solidFill>
+        </p:spPr>
+        <p:txBody>
+          <a:bodyPr vert="vert270" lIns="91440" tIns="45720" rIns="91440" bIns="45720" rtlCol="0" anchor="ctr" anchorCtr="0">
+            <a:normAutofit fontScale="92500" lnSpcReduction="10000"/>
+          </a:bodyPr>
+          <a:lstStyle>
+            <a:lvl1pPr algn="l" defTabSz="914400" rtl="0" eaLnBrk="1" latinLnBrk="0" hangingPunct="1">
+              <a:lnSpc>
+                <a:spcPct val="90000"/>
+              </a:lnSpc>
+              <a:spcBef>
+                <a:spcPct val="0"/>
+              </a:spcBef>
+              <a:buNone/>
+              <a:defRPr sz="4400" kern="1200">
+                <a:solidFill>
+                  <a:schemeClr val="tx1"/>
+                </a:solidFill>
+                <a:latin typeface="+mj-lt"/>
+                <a:ea typeface="+mj-ea"/>
+                <a:cs typeface="+mj-cs"/>
+              </a:defRPr>
+            </a:lvl1pPr>
+          </a:lstStyle>
+          <a:p>
+            <a:pPr algn="ctr"/>
+            <a:r>
+              <a:rPr lang="en-US" b="1" dirty="0">
+                <a:solidFill>
+                  <a:srgbClr val="FF6600"/>
+                </a:solidFill>
+              </a:rPr>
+              <a:t>EDA - Hypothesis no. </a:t>
+            </a:r>
+            <a:r>
+              <a:rPr lang="pl-PL" b="1" dirty="0">
+                <a:solidFill>
+                  <a:srgbClr val="FF6600"/>
+                </a:solidFill>
+              </a:rPr>
+              <a:t>3 </a:t>
+            </a:r>
+          </a:p>
+          <a:p>
+            <a:pPr algn="ctr"/>
+            <a:r>
+              <a:rPr lang="pl-PL" b="1" dirty="0">
+                <a:solidFill>
+                  <a:srgbClr val="FF6600"/>
+                </a:solidFill>
+              </a:rPr>
+              <a:t>„</a:t>
+            </a:r>
+            <a:r>
+              <a:rPr lang="en-US" b="1" dirty="0">
+                <a:solidFill>
+                  <a:srgbClr val="FF6600"/>
+                </a:solidFill>
+              </a:rPr>
+              <a:t>Effects of Demographics on persistency of drugs?</a:t>
+            </a:r>
+            <a:r>
+              <a:rPr lang="pl-PL" b="1" dirty="0">
+                <a:solidFill>
+                  <a:srgbClr val="FF6600"/>
+                </a:solidFill>
+              </a:rPr>
+              <a:t>”</a:t>
+            </a:r>
+            <a:endParaRPr lang="en-US" b="1" dirty="0">
+              <a:solidFill>
+                <a:srgbClr val="FF6600"/>
+              </a:solidFill>
+            </a:endParaRPr>
+          </a:p>
+        </p:txBody>
+      </p:sp>
+      <p:pic>
+        <p:nvPicPr>
+          <p:cNvPr id="1026" name="Picture 2">
+            <a:extLst>
+              <a:ext uri="{FF2B5EF4-FFF2-40B4-BE49-F238E27FC236}">
+                <a16:creationId xmlns:a16="http://schemas.microsoft.com/office/drawing/2014/main" id="{ACCAA7A1-29FF-466B-890E-FB6CEB917DE6}"/>
+              </a:ext>
+            </a:extLst>
+          </p:cNvPr>
+          <p:cNvPicPr>
+            <a:picLocks noChangeAspect="1" noChangeArrowheads="1"/>
+          </p:cNvPicPr>
+          <p:nvPr/>
+        </p:nvPicPr>
+        <p:blipFill>
+          <a:blip r:embed="rId2">
+            <a:extLst>
+              <a:ext uri="{28A0092B-C50C-407E-A947-70E740481C1C}">
+                <a14:useLocalDpi xmlns:a14="http://schemas.microsoft.com/office/drawing/2010/main" val="0"/>
+              </a:ext>
+            </a:extLst>
+          </a:blip>
+          <a:srcRect/>
+          <a:stretch>
+            <a:fillRect/>
+          </a:stretch>
+        </p:blipFill>
+        <p:spPr bwMode="auto">
+          <a:xfrm>
+            <a:off x="446740" y="1393140"/>
+            <a:ext cx="3676650" cy="2476500"/>
+          </a:xfrm>
+          <a:prstGeom prst="rect">
+            <a:avLst/>
+          </a:prstGeom>
+          <a:noFill/>
+          <a:extLst>
+            <a:ext uri="{909E8E84-426E-40DD-AFC4-6F175D3DCCD1}">
+              <a14:hiddenFill xmlns:a14="http://schemas.microsoft.com/office/drawing/2010/main">
+                <a:solidFill>
+                  <a:srgbClr val="FFFFFF"/>
+                </a:solidFill>
+              </a14:hiddenFill>
+            </a:ext>
+          </a:extLst>
+        </p:spPr>
+      </p:pic>
+      <p:pic>
+        <p:nvPicPr>
+          <p:cNvPr id="1028" name="Picture 4">
+            <a:extLst>
+              <a:ext uri="{FF2B5EF4-FFF2-40B4-BE49-F238E27FC236}">
+                <a16:creationId xmlns:a16="http://schemas.microsoft.com/office/drawing/2014/main" id="{0760E8AA-5DEC-4886-8880-68AF1B8A0073}"/>
+              </a:ext>
+            </a:extLst>
+          </p:cNvPr>
+          <p:cNvPicPr>
+            <a:picLocks noChangeAspect="1" noChangeArrowheads="1"/>
+          </p:cNvPicPr>
+          <p:nvPr/>
+        </p:nvPicPr>
+        <p:blipFill>
+          <a:blip r:embed="rId3">
+            <a:extLst>
+              <a:ext uri="{28A0092B-C50C-407E-A947-70E740481C1C}">
+                <a14:useLocalDpi xmlns:a14="http://schemas.microsoft.com/office/drawing/2010/main" val="0"/>
+              </a:ext>
+            </a:extLst>
+          </a:blip>
+          <a:srcRect/>
+          <a:stretch>
+            <a:fillRect/>
+          </a:stretch>
+        </p:blipFill>
+        <p:spPr bwMode="auto">
+          <a:xfrm>
+            <a:off x="446740" y="4226610"/>
+            <a:ext cx="3676650" cy="2476500"/>
+          </a:xfrm>
+          <a:prstGeom prst="rect">
+            <a:avLst/>
+          </a:prstGeom>
+          <a:noFill/>
+          <a:extLst>
+            <a:ext uri="{909E8E84-426E-40DD-AFC4-6F175D3DCCD1}">
+              <a14:hiddenFill xmlns:a14="http://schemas.microsoft.com/office/drawing/2010/main">
+                <a:solidFill>
+                  <a:srgbClr val="FFFFFF"/>
+                </a:solidFill>
+              </a14:hiddenFill>
+            </a:ext>
+          </a:extLst>
+        </p:spPr>
+      </p:pic>
+      <p:sp>
+        <p:nvSpPr>
+          <p:cNvPr id="7" name="Symbol zastępczy zawartości 2">
+            <a:extLst>
+              <a:ext uri="{FF2B5EF4-FFF2-40B4-BE49-F238E27FC236}">
+                <a16:creationId xmlns:a16="http://schemas.microsoft.com/office/drawing/2014/main" id="{AC6C6EF5-2F39-486B-9458-838510BC92BD}"/>
+              </a:ext>
+            </a:extLst>
+          </p:cNvPr>
+          <p:cNvSpPr txBox="1">
+            <a:spLocks/>
+          </p:cNvSpPr>
+          <p:nvPr/>
+        </p:nvSpPr>
+        <p:spPr>
+          <a:xfrm>
+            <a:off x="4425712" y="4938447"/>
+            <a:ext cx="7285800" cy="2035860"/>
+          </a:xfrm>
+          <a:prstGeom prst="rect">
+            <a:avLst/>
+          </a:prstGeom>
+        </p:spPr>
+        <p:txBody>
+          <a:bodyPr vert="horz" lIns="91440" tIns="45720" rIns="91440" bIns="45720" rtlCol="0">
+            <a:normAutofit/>
+          </a:bodyPr>
+          <a:lstStyle>
+            <a:lvl1pPr marL="228600" indent="-228600" algn="l" defTabSz="914400" rtl="0" eaLnBrk="1" latinLnBrk="0" hangingPunct="1">
+              <a:lnSpc>
+                <a:spcPct val="90000"/>
+              </a:lnSpc>
+              <a:spcBef>
+                <a:spcPts val="1000"/>
+              </a:spcBef>
+              <a:buFont typeface="Arial" panose="020B0604020202020204" pitchFamily="34" charset="0"/>
+              <a:buChar char="•"/>
+              <a:defRPr sz="2800" kern="1200">
+                <a:solidFill>
+                  <a:schemeClr val="tx1"/>
+                </a:solidFill>
+                <a:latin typeface="+mn-lt"/>
+                <a:ea typeface="+mn-ea"/>
+                <a:cs typeface="+mn-cs"/>
+              </a:defRPr>
+            </a:lvl1pPr>
+            <a:lvl2pPr marL="685800" indent="-228600" algn="l" defTabSz="914400" rtl="0" eaLnBrk="1" latinLnBrk="0" hangingPunct="1">
+              <a:lnSpc>
+                <a:spcPct val="90000"/>
+              </a:lnSpc>
+              <a:spcBef>
+                <a:spcPts val="500"/>
+              </a:spcBef>
+              <a:buFont typeface="Arial" panose="020B0604020202020204" pitchFamily="34" charset="0"/>
+              <a:buChar char="•"/>
+              <a:defRPr sz="2400" kern="1200">
+                <a:solidFill>
+                  <a:schemeClr val="tx1"/>
+                </a:solidFill>
+                <a:latin typeface="+mn-lt"/>
+                <a:ea typeface="+mn-ea"/>
+                <a:cs typeface="+mn-cs"/>
+              </a:defRPr>
+            </a:lvl2pPr>
+            <a:lvl3pPr marL="1143000" indent="-228600" algn="l" defTabSz="914400" rtl="0" eaLnBrk="1" latinLnBrk="0" hangingPunct="1">
+              <a:lnSpc>
+                <a:spcPct val="90000"/>
+              </a:lnSpc>
+              <a:spcBef>
+                <a:spcPts val="500"/>
+              </a:spcBef>
+              <a:buFont typeface="Arial" panose="020B0604020202020204" pitchFamily="34" charset="0"/>
+              <a:buChar char="•"/>
+              <a:defRPr sz="2000" kern="1200">
+                <a:solidFill>
+                  <a:schemeClr val="tx1"/>
+                </a:solidFill>
+                <a:latin typeface="+mn-lt"/>
+                <a:ea typeface="+mn-ea"/>
+                <a:cs typeface="+mn-cs"/>
+              </a:defRPr>
+            </a:lvl3pPr>
+            <a:lvl4pPr marL="1600200" indent="-228600" algn="l" defTabSz="914400" rtl="0" eaLnBrk="1" latinLnBrk="0" hangingPunct="1">
+              <a:lnSpc>
+                <a:spcPct val="90000"/>
+              </a:lnSpc>
+              <a:spcBef>
+                <a:spcPts val="500"/>
+              </a:spcBef>
+              <a:buFont typeface="Arial" panose="020B0604020202020204" pitchFamily="34" charset="0"/>
+              <a:buChar char="•"/>
+              <a:defRPr sz="1800" kern="1200">
+                <a:solidFill>
+                  <a:schemeClr val="tx1"/>
+                </a:solidFill>
+                <a:latin typeface="+mn-lt"/>
+                <a:ea typeface="+mn-ea"/>
+                <a:cs typeface="+mn-cs"/>
+              </a:defRPr>
+            </a:lvl4pPr>
+            <a:lvl5pPr marL="2057400" indent="-228600" algn="l" defTabSz="914400" rtl="0" eaLnBrk="1" latinLnBrk="0" hangingPunct="1">
+              <a:lnSpc>
+                <a:spcPct val="90000"/>
+              </a:lnSpc>
+              <a:spcBef>
+                <a:spcPts val="500"/>
+              </a:spcBef>
+              <a:buFont typeface="Arial" panose="020B0604020202020204" pitchFamily="34" charset="0"/>
+              <a:buChar char="•"/>
+              <a:defRPr sz="1800" kern="1200">
+                <a:solidFill>
+                  <a:schemeClr val="tx1"/>
+                </a:solidFill>
+                <a:latin typeface="+mn-lt"/>
+                <a:ea typeface="+mn-ea"/>
+                <a:cs typeface="+mn-cs"/>
+              </a:defRPr>
+            </a:lvl5pPr>
+            <a:lvl6pPr marL="2514600" indent="-228600" algn="l" defTabSz="914400" rtl="0" eaLnBrk="1" latinLnBrk="0" hangingPunct="1">
+              <a:lnSpc>
+                <a:spcPct val="90000"/>
+              </a:lnSpc>
+              <a:spcBef>
+                <a:spcPts val="500"/>
+              </a:spcBef>
+              <a:buFont typeface="Arial" panose="020B0604020202020204" pitchFamily="34" charset="0"/>
+              <a:buChar char="•"/>
+              <a:defRPr sz="1800" kern="1200">
+                <a:solidFill>
+                  <a:schemeClr val="tx1"/>
+                </a:solidFill>
+                <a:latin typeface="+mn-lt"/>
+                <a:ea typeface="+mn-ea"/>
+                <a:cs typeface="+mn-cs"/>
+              </a:defRPr>
+            </a:lvl6pPr>
+            <a:lvl7pPr marL="2971800" indent="-228600" algn="l" defTabSz="914400" rtl="0" eaLnBrk="1" latinLnBrk="0" hangingPunct="1">
+              <a:lnSpc>
+                <a:spcPct val="90000"/>
+              </a:lnSpc>
+              <a:spcBef>
+                <a:spcPts val="500"/>
+              </a:spcBef>
+              <a:buFont typeface="Arial" panose="020B0604020202020204" pitchFamily="34" charset="0"/>
+              <a:buChar char="•"/>
+              <a:defRPr sz="1800" kern="1200">
+                <a:solidFill>
+                  <a:schemeClr val="tx1"/>
+                </a:solidFill>
+                <a:latin typeface="+mn-lt"/>
+                <a:ea typeface="+mn-ea"/>
+                <a:cs typeface="+mn-cs"/>
+              </a:defRPr>
+            </a:lvl7pPr>
+            <a:lvl8pPr marL="3429000" indent="-228600" algn="l" defTabSz="914400" rtl="0" eaLnBrk="1" latinLnBrk="0" hangingPunct="1">
+              <a:lnSpc>
+                <a:spcPct val="90000"/>
+              </a:lnSpc>
+              <a:spcBef>
+                <a:spcPts val="500"/>
+              </a:spcBef>
+              <a:buFont typeface="Arial" panose="020B0604020202020204" pitchFamily="34" charset="0"/>
+              <a:buChar char="•"/>
+              <a:defRPr sz="1800" kern="1200">
+                <a:solidFill>
+                  <a:schemeClr val="tx1"/>
+                </a:solidFill>
+                <a:latin typeface="+mn-lt"/>
+                <a:ea typeface="+mn-ea"/>
+                <a:cs typeface="+mn-cs"/>
+              </a:defRPr>
+            </a:lvl8pPr>
+            <a:lvl9pPr marL="3886200" indent="-228600" algn="l" defTabSz="914400" rtl="0" eaLnBrk="1" latinLnBrk="0" hangingPunct="1">
+              <a:lnSpc>
+                <a:spcPct val="90000"/>
+              </a:lnSpc>
+              <a:spcBef>
+                <a:spcPts val="500"/>
+              </a:spcBef>
+              <a:buFont typeface="Arial" panose="020B0604020202020204" pitchFamily="34" charset="0"/>
+              <a:buChar char="•"/>
+              <a:defRPr sz="1800" kern="1200">
+                <a:solidFill>
+                  <a:schemeClr val="tx1"/>
+                </a:solidFill>
+                <a:latin typeface="+mn-lt"/>
+                <a:ea typeface="+mn-ea"/>
+                <a:cs typeface="+mn-cs"/>
+              </a:defRPr>
+            </a:lvl9pPr>
+          </a:lstStyle>
+          <a:p>
+            <a:pPr algn="just"/>
+            <a:r>
+              <a:rPr lang="en-US" dirty="0"/>
+              <a:t>People from south is more Persistent followed by </a:t>
+            </a:r>
+            <a:r>
+              <a:rPr lang="en-US" dirty="0" err="1"/>
+              <a:t>midwest</a:t>
+            </a:r>
+            <a:r>
+              <a:rPr lang="pl-PL" dirty="0"/>
+              <a:t>.</a:t>
+            </a:r>
+          </a:p>
+        </p:txBody>
+      </p:sp>
+    </p:spTree>
+    <p:extLst>
+      <p:ext uri="{BB962C8B-B14F-4D97-AF65-F5344CB8AC3E}">
+        <p14:creationId xmlns:p14="http://schemas.microsoft.com/office/powerpoint/2010/main" val="839964648"/>
+      </p:ext>
+    </p:extLst>
+  </p:cSld>
+  <p:clrMapOvr>
+    <a:masterClrMapping/>
+  </p:clrMapOvr>
+</p:sld>
+</file>
+
+<file path=ppt/slides/slide12.xml><?xml version="1.0" encoding="utf-8"?>
+<p:sld xmlns:a="http://schemas.openxmlformats.org/drawingml/2006/main" xmlns:r="http://schemas.openxmlformats.org/officeDocument/2006/relationships" xmlns:p="http://schemas.openxmlformats.org/presentationml/2006/main">
+  <p:cSld>
+    <p:spTree>
+      <p:nvGrpSpPr>
+        <p:cNvPr id="1" name=""/>
+        <p:cNvGrpSpPr/>
+        <p:nvPr/>
+      </p:nvGrpSpPr>
+      <p:grpSpPr>
+        <a:xfrm>
+          <a:off x="0" y="0"/>
+          <a:ext cx="0" cy="0"/>
+          <a:chOff x="0" y="0"/>
+          <a:chExt cx="0" cy="0"/>
+        </a:xfrm>
+      </p:grpSpPr>
+      <p:sp>
+        <p:nvSpPr>
+          <p:cNvPr id="3" name="Symbol zastępczy zawartości 2">
+            <a:extLst>
+              <a:ext uri="{FF2B5EF4-FFF2-40B4-BE49-F238E27FC236}">
+                <a16:creationId xmlns:a16="http://schemas.microsoft.com/office/drawing/2014/main" id="{CDC6F948-2F33-47A0-AE55-62E355ACC532}"/>
+              </a:ext>
+            </a:extLst>
+          </p:cNvPr>
+          <p:cNvSpPr>
+            <a:spLocks noGrp="1"/>
+          </p:cNvSpPr>
+          <p:nvPr>
+            <p:ph idx="1"/>
+          </p:nvPr>
+        </p:nvSpPr>
+        <p:spPr>
+          <a:xfrm>
+            <a:off x="446740" y="1393140"/>
+            <a:ext cx="11298518" cy="5327749"/>
+          </a:xfrm>
+        </p:spPr>
+        <p:txBody>
+          <a:bodyPr>
+            <a:normAutofit/>
+          </a:bodyPr>
+          <a:lstStyle/>
+          <a:p>
+            <a:pPr algn="just"/>
+            <a:endParaRPr lang="pl-PL" dirty="0"/>
+          </a:p>
+          <a:p>
+            <a:pPr algn="just"/>
+            <a:endParaRPr lang="pl-PL" dirty="0"/>
+          </a:p>
+          <a:p>
+            <a:pPr algn="just"/>
+            <a:endParaRPr lang="pl-PL" dirty="0"/>
+          </a:p>
+          <a:p>
+            <a:pPr algn="just"/>
+            <a:endParaRPr lang="pl-PL" dirty="0"/>
+          </a:p>
+          <a:p>
+            <a:pPr algn="just"/>
+            <a:endParaRPr lang="pl-PL" dirty="0"/>
+          </a:p>
+          <a:p>
+            <a:pPr algn="just"/>
+            <a:endParaRPr lang="pl-PL" dirty="0"/>
+          </a:p>
+          <a:p>
+            <a:pPr algn="just"/>
+            <a:endParaRPr lang="pl-PL" dirty="0"/>
+          </a:p>
+          <a:p>
+            <a:pPr algn="just"/>
+            <a:r>
+              <a:rPr lang="en-US" dirty="0"/>
+              <a:t>Oncology followed by Endocrinology drugs are more persistent.</a:t>
+            </a:r>
+            <a:endParaRPr lang="pl-PL" dirty="0"/>
+          </a:p>
+          <a:p>
+            <a:pPr algn="just"/>
+            <a:r>
+              <a:rPr lang="en-US" dirty="0"/>
+              <a:t>In general terms</a:t>
+            </a:r>
+            <a:r>
+              <a:rPr lang="pl-PL" dirty="0"/>
+              <a:t>,</a:t>
+            </a:r>
+            <a:r>
+              <a:rPr lang="en-US" dirty="0"/>
+              <a:t> </a:t>
+            </a:r>
+            <a:r>
+              <a:rPr lang="pl-PL" dirty="0"/>
+              <a:t>c</a:t>
+            </a:r>
+            <a:r>
+              <a:rPr lang="en-US" dirty="0" err="1"/>
+              <a:t>ancer</a:t>
+            </a:r>
+            <a:r>
+              <a:rPr lang="en-US" dirty="0"/>
+              <a:t> patients are more persistent in taking medicines followed by diabetes and thyroid patient</a:t>
+            </a:r>
+            <a:r>
+              <a:rPr lang="pl-PL" dirty="0"/>
+              <a:t>.</a:t>
+            </a:r>
+          </a:p>
+        </p:txBody>
+      </p:sp>
+      <p:sp>
+        <p:nvSpPr>
+          <p:cNvPr id="4" name="Title 1">
+            <a:extLst>
+              <a:ext uri="{FF2B5EF4-FFF2-40B4-BE49-F238E27FC236}">
+                <a16:creationId xmlns:a16="http://schemas.microsoft.com/office/drawing/2014/main" id="{F0FEE1CD-BF08-48FA-8526-5BEB92660675}"/>
+              </a:ext>
+            </a:extLst>
+          </p:cNvPr>
+          <p:cNvSpPr txBox="1">
+            <a:spLocks/>
+          </p:cNvSpPr>
+          <p:nvPr/>
+        </p:nvSpPr>
+        <p:spPr>
+          <a:xfrm rot="5400000">
+            <a:off x="5488404" y="-5488406"/>
+            <a:ext cx="1215190" cy="12192001"/>
+          </a:xfrm>
+          <a:prstGeom prst="rect">
+            <a:avLst/>
+          </a:prstGeom>
+          <a:solidFill>
+            <a:srgbClr val="3B3B3B"/>
+          </a:solidFill>
+        </p:spPr>
+        <p:txBody>
+          <a:bodyPr vert="vert270" lIns="91440" tIns="45720" rIns="91440" bIns="45720" rtlCol="0" anchor="ctr" anchorCtr="0">
+            <a:normAutofit fontScale="92500" lnSpcReduction="10000"/>
+          </a:bodyPr>
+          <a:lstStyle>
+            <a:lvl1pPr algn="l" defTabSz="914400" rtl="0" eaLnBrk="1" latinLnBrk="0" hangingPunct="1">
+              <a:lnSpc>
+                <a:spcPct val="90000"/>
+              </a:lnSpc>
+              <a:spcBef>
+                <a:spcPct val="0"/>
+              </a:spcBef>
+              <a:buNone/>
+              <a:defRPr sz="4400" kern="1200">
+                <a:solidFill>
+                  <a:schemeClr val="tx1"/>
+                </a:solidFill>
+                <a:latin typeface="+mj-lt"/>
+                <a:ea typeface="+mj-ea"/>
+                <a:cs typeface="+mj-cs"/>
+              </a:defRPr>
+            </a:lvl1pPr>
+          </a:lstStyle>
+          <a:p>
+            <a:pPr algn="ctr"/>
+            <a:r>
+              <a:rPr lang="en-US" b="1" dirty="0">
+                <a:solidFill>
+                  <a:srgbClr val="FF6600"/>
+                </a:solidFill>
+              </a:rPr>
+              <a:t>EDA - Hypothesis no. </a:t>
+            </a:r>
+            <a:r>
+              <a:rPr lang="pl-PL" b="1" dirty="0">
+                <a:solidFill>
+                  <a:srgbClr val="FF6600"/>
+                </a:solidFill>
+              </a:rPr>
+              <a:t>4 </a:t>
+            </a:r>
+          </a:p>
+          <a:p>
+            <a:pPr algn="ctr"/>
+            <a:r>
+              <a:rPr lang="pl-PL" b="1" dirty="0">
+                <a:solidFill>
+                  <a:srgbClr val="FF6600"/>
+                </a:solidFill>
+              </a:rPr>
+              <a:t>„</a:t>
+            </a:r>
+            <a:r>
+              <a:rPr lang="en-US" b="1" dirty="0">
+                <a:solidFill>
+                  <a:srgbClr val="FF6600"/>
+                </a:solidFill>
+              </a:rPr>
+              <a:t>Effects of provider attributes on the persistency?</a:t>
+            </a:r>
+            <a:r>
+              <a:rPr lang="pl-PL" b="1" dirty="0">
+                <a:solidFill>
+                  <a:srgbClr val="FF6600"/>
+                </a:solidFill>
+              </a:rPr>
+              <a:t>”</a:t>
+            </a:r>
+            <a:endParaRPr lang="en-US" b="1" dirty="0">
+              <a:solidFill>
+                <a:srgbClr val="FF6600"/>
+              </a:solidFill>
+            </a:endParaRPr>
+          </a:p>
+        </p:txBody>
+      </p:sp>
+      <p:pic>
+        <p:nvPicPr>
+          <p:cNvPr id="2050" name="Picture 2">
+            <a:extLst>
+              <a:ext uri="{FF2B5EF4-FFF2-40B4-BE49-F238E27FC236}">
+                <a16:creationId xmlns:a16="http://schemas.microsoft.com/office/drawing/2014/main" id="{4CE7F58A-C4DE-4E30-95B3-69FA7BC945AB}"/>
+              </a:ext>
+            </a:extLst>
+          </p:cNvPr>
+          <p:cNvPicPr>
+            <a:picLocks noChangeAspect="1" noChangeArrowheads="1"/>
+          </p:cNvPicPr>
+          <p:nvPr/>
+        </p:nvPicPr>
+        <p:blipFill>
+          <a:blip r:embed="rId2">
+            <a:extLst>
+              <a:ext uri="{28A0092B-C50C-407E-A947-70E740481C1C}">
+                <a14:useLocalDpi xmlns:a14="http://schemas.microsoft.com/office/drawing/2010/main" val="0"/>
+              </a:ext>
+            </a:extLst>
+          </a:blip>
+          <a:srcRect/>
+          <a:stretch>
+            <a:fillRect/>
+          </a:stretch>
+        </p:blipFill>
+        <p:spPr bwMode="auto">
+          <a:xfrm>
+            <a:off x="1034579" y="1499938"/>
+            <a:ext cx="4744238" cy="3154736"/>
+          </a:xfrm>
+          <a:prstGeom prst="rect">
+            <a:avLst/>
+          </a:prstGeom>
+          <a:noFill/>
+          <a:extLst>
+            <a:ext uri="{909E8E84-426E-40DD-AFC4-6F175D3DCCD1}">
+              <a14:hiddenFill xmlns:a14="http://schemas.microsoft.com/office/drawing/2010/main">
+                <a:solidFill>
+                  <a:srgbClr val="FFFFFF"/>
+                </a:solidFill>
+              </a14:hiddenFill>
+            </a:ext>
+          </a:extLst>
+        </p:spPr>
+      </p:pic>
+      <p:pic>
+        <p:nvPicPr>
+          <p:cNvPr id="2" name="Obraz 1">
+            <a:extLst>
+              <a:ext uri="{FF2B5EF4-FFF2-40B4-BE49-F238E27FC236}">
+                <a16:creationId xmlns:a16="http://schemas.microsoft.com/office/drawing/2014/main" id="{341D352E-A054-46A8-BAA1-4B635F41D580}"/>
+              </a:ext>
+            </a:extLst>
+          </p:cNvPr>
+          <p:cNvPicPr>
+            <a:picLocks noChangeAspect="1"/>
+          </p:cNvPicPr>
+          <p:nvPr/>
+        </p:nvPicPr>
+        <p:blipFill>
+          <a:blip r:embed="rId3"/>
+          <a:stretch>
+            <a:fillRect/>
+          </a:stretch>
+        </p:blipFill>
+        <p:spPr>
+          <a:xfrm>
+            <a:off x="6366656" y="1338994"/>
+            <a:ext cx="4438650" cy="3476625"/>
+          </a:xfrm>
+          <a:prstGeom prst="rect">
+            <a:avLst/>
+          </a:prstGeom>
+        </p:spPr>
+      </p:pic>
+    </p:spTree>
+    <p:extLst>
+      <p:ext uri="{BB962C8B-B14F-4D97-AF65-F5344CB8AC3E}">
+        <p14:creationId xmlns:p14="http://schemas.microsoft.com/office/powerpoint/2010/main" val="2196212050"/>
+      </p:ext>
+    </p:extLst>
+  </p:cSld>
+  <p:clrMapOvr>
+    <a:masterClrMapping/>
+  </p:clrMapOvr>
+</p:sld>
+</file>
+
+<file path=ppt/slides/slide13.xml><?xml version="1.0" encoding="utf-8"?>
+<p:sld xmlns:a="http://schemas.openxmlformats.org/drawingml/2006/main" xmlns:r="http://schemas.openxmlformats.org/officeDocument/2006/relationships" xmlns:p="http://schemas.openxmlformats.org/presentationml/2006/main">
+  <p:cSld>
+    <p:spTree>
+      <p:nvGrpSpPr>
+        <p:cNvPr id="1" name=""/>
+        <p:cNvGrpSpPr/>
+        <p:nvPr/>
+      </p:nvGrpSpPr>
+      <p:grpSpPr>
+        <a:xfrm>
+          <a:off x="0" y="0"/>
+          <a:ext cx="0" cy="0"/>
+          <a:chOff x="0" y="0"/>
+          <a:chExt cx="0" cy="0"/>
+        </a:xfrm>
+      </p:grpSpPr>
+      <p:sp>
+        <p:nvSpPr>
+          <p:cNvPr id="3" name="Symbol zastępczy zawartości 2">
+            <a:extLst>
+              <a:ext uri="{FF2B5EF4-FFF2-40B4-BE49-F238E27FC236}">
+                <a16:creationId xmlns:a16="http://schemas.microsoft.com/office/drawing/2014/main" id="{CDC6F948-2F33-47A0-AE55-62E355ACC532}"/>
+              </a:ext>
+            </a:extLst>
+          </p:cNvPr>
+          <p:cNvSpPr>
+            <a:spLocks noGrp="1"/>
+          </p:cNvSpPr>
+          <p:nvPr>
+            <p:ph idx="1"/>
+          </p:nvPr>
+        </p:nvSpPr>
+        <p:spPr>
+          <a:xfrm>
+            <a:off x="446740" y="1393140"/>
+            <a:ext cx="11298518" cy="5327749"/>
+          </a:xfrm>
+        </p:spPr>
+        <p:txBody>
+          <a:bodyPr>
+            <a:normAutofit/>
+          </a:bodyPr>
+          <a:lstStyle/>
+          <a:p>
+            <a:pPr algn="just"/>
+            <a:endParaRPr lang="pl-PL" dirty="0"/>
+          </a:p>
+          <a:p>
+            <a:pPr algn="just"/>
+            <a:endParaRPr lang="pl-PL" dirty="0"/>
+          </a:p>
+          <a:p>
+            <a:pPr algn="just"/>
+            <a:endParaRPr lang="pl-PL" dirty="0"/>
+          </a:p>
+          <a:p>
+            <a:pPr algn="just"/>
+            <a:endParaRPr lang="pl-PL" dirty="0"/>
+          </a:p>
+          <a:p>
+            <a:pPr algn="just"/>
+            <a:endParaRPr lang="pl-PL" dirty="0"/>
+          </a:p>
+          <a:p>
+            <a:pPr algn="just"/>
+            <a:endParaRPr lang="pl-PL" dirty="0"/>
+          </a:p>
+          <a:p>
+            <a:pPr algn="just"/>
+            <a:endParaRPr lang="pl-PL" dirty="0"/>
+          </a:p>
+          <a:p>
+            <a:pPr algn="just"/>
+            <a:r>
+              <a:rPr lang="en-US" dirty="0"/>
+              <a:t>When glucose record is considered during RX persistency increases from 18 to 38 %.</a:t>
+            </a:r>
+            <a:endParaRPr lang="pl-PL" dirty="0"/>
+          </a:p>
+        </p:txBody>
+      </p:sp>
+      <p:sp>
+        <p:nvSpPr>
+          <p:cNvPr id="4" name="Title 1">
+            <a:extLst>
+              <a:ext uri="{FF2B5EF4-FFF2-40B4-BE49-F238E27FC236}">
+                <a16:creationId xmlns:a16="http://schemas.microsoft.com/office/drawing/2014/main" id="{F0FEE1CD-BF08-48FA-8526-5BEB92660675}"/>
+              </a:ext>
+            </a:extLst>
+          </p:cNvPr>
+          <p:cNvSpPr txBox="1">
+            <a:spLocks/>
+          </p:cNvSpPr>
+          <p:nvPr/>
+        </p:nvSpPr>
+        <p:spPr>
+          <a:xfrm rot="5400000">
+            <a:off x="5488404" y="-5488406"/>
+            <a:ext cx="1215190" cy="12192001"/>
+          </a:xfrm>
+          <a:prstGeom prst="rect">
+            <a:avLst/>
+          </a:prstGeom>
+          <a:solidFill>
+            <a:srgbClr val="3B3B3B"/>
+          </a:solidFill>
+        </p:spPr>
+        <p:txBody>
+          <a:bodyPr vert="vert270" lIns="91440" tIns="45720" rIns="91440" bIns="45720" rtlCol="0" anchor="ctr" anchorCtr="0">
+            <a:normAutofit fontScale="92500" lnSpcReduction="10000"/>
+          </a:bodyPr>
+          <a:lstStyle>
+            <a:lvl1pPr algn="l" defTabSz="914400" rtl="0" eaLnBrk="1" latinLnBrk="0" hangingPunct="1">
+              <a:lnSpc>
+                <a:spcPct val="90000"/>
+              </a:lnSpc>
+              <a:spcBef>
+                <a:spcPct val="0"/>
+              </a:spcBef>
+              <a:buNone/>
+              <a:defRPr sz="4400" kern="1200">
+                <a:solidFill>
+                  <a:schemeClr val="tx1"/>
+                </a:solidFill>
+                <a:latin typeface="+mj-lt"/>
+                <a:ea typeface="+mj-ea"/>
+                <a:cs typeface="+mj-cs"/>
+              </a:defRPr>
+            </a:lvl1pPr>
+          </a:lstStyle>
+          <a:p>
+            <a:pPr algn="ctr"/>
+            <a:r>
+              <a:rPr lang="en-US" b="1" dirty="0">
+                <a:solidFill>
+                  <a:srgbClr val="FF6600"/>
+                </a:solidFill>
+              </a:rPr>
+              <a:t>EDA - Hypothesis no. </a:t>
+            </a:r>
+            <a:r>
+              <a:rPr lang="pl-PL" b="1" dirty="0">
+                <a:solidFill>
+                  <a:srgbClr val="FF6600"/>
+                </a:solidFill>
+              </a:rPr>
+              <a:t>5 </a:t>
+            </a:r>
+          </a:p>
+          <a:p>
+            <a:pPr algn="ctr"/>
+            <a:r>
+              <a:rPr lang="pl-PL" b="1" dirty="0">
+                <a:solidFill>
+                  <a:srgbClr val="FF6600"/>
+                </a:solidFill>
+              </a:rPr>
+              <a:t>„</a:t>
+            </a:r>
+            <a:r>
+              <a:rPr lang="en-US" b="1" dirty="0">
+                <a:solidFill>
+                  <a:srgbClr val="FF6600"/>
+                </a:solidFill>
+              </a:rPr>
+              <a:t>Effects of Glucose record During Rx?</a:t>
+            </a:r>
+            <a:r>
+              <a:rPr lang="pl-PL" b="1" dirty="0">
+                <a:solidFill>
+                  <a:srgbClr val="FF6600"/>
+                </a:solidFill>
+              </a:rPr>
+              <a:t>”</a:t>
+            </a:r>
+            <a:endParaRPr lang="en-US" b="1" dirty="0">
+              <a:solidFill>
+                <a:srgbClr val="FF6600"/>
+              </a:solidFill>
+            </a:endParaRPr>
+          </a:p>
+        </p:txBody>
+      </p:sp>
+      <p:pic>
+        <p:nvPicPr>
+          <p:cNvPr id="3074" name="Picture 2">
+            <a:extLst>
+              <a:ext uri="{FF2B5EF4-FFF2-40B4-BE49-F238E27FC236}">
+                <a16:creationId xmlns:a16="http://schemas.microsoft.com/office/drawing/2014/main" id="{E3FB3F1D-685A-4674-B708-86CBB04EA109}"/>
+              </a:ext>
+            </a:extLst>
+          </p:cNvPr>
+          <p:cNvPicPr>
+            <a:picLocks noChangeAspect="1" noChangeArrowheads="1"/>
+          </p:cNvPicPr>
+          <p:nvPr/>
+        </p:nvPicPr>
+        <p:blipFill>
+          <a:blip r:embed="rId2">
+            <a:extLst>
+              <a:ext uri="{28A0092B-C50C-407E-A947-70E740481C1C}">
+                <a14:useLocalDpi xmlns:a14="http://schemas.microsoft.com/office/drawing/2010/main" val="0"/>
+              </a:ext>
+            </a:extLst>
+          </a:blip>
+          <a:srcRect/>
+          <a:stretch>
+            <a:fillRect/>
+          </a:stretch>
+        </p:blipFill>
+        <p:spPr bwMode="auto">
+          <a:xfrm>
+            <a:off x="1331310" y="1767795"/>
+            <a:ext cx="4470962" cy="2973018"/>
+          </a:xfrm>
+          <a:prstGeom prst="rect">
+            <a:avLst/>
+          </a:prstGeom>
+          <a:noFill/>
+          <a:extLst>
+            <a:ext uri="{909E8E84-426E-40DD-AFC4-6F175D3DCCD1}">
+              <a14:hiddenFill xmlns:a14="http://schemas.microsoft.com/office/drawing/2010/main">
+                <a:solidFill>
+                  <a:srgbClr val="FFFFFF"/>
+                </a:solidFill>
+              </a14:hiddenFill>
+            </a:ext>
+          </a:extLst>
+        </p:spPr>
+      </p:pic>
+      <p:pic>
+        <p:nvPicPr>
+          <p:cNvPr id="3076" name="Picture 4">
+            <a:extLst>
+              <a:ext uri="{FF2B5EF4-FFF2-40B4-BE49-F238E27FC236}">
+                <a16:creationId xmlns:a16="http://schemas.microsoft.com/office/drawing/2014/main" id="{32F00863-DC79-4014-B508-0E4D69843C76}"/>
+              </a:ext>
+            </a:extLst>
+          </p:cNvPr>
+          <p:cNvPicPr>
+            <a:picLocks noChangeAspect="1" noChangeArrowheads="1"/>
+          </p:cNvPicPr>
+          <p:nvPr/>
+        </p:nvPicPr>
+        <p:blipFill>
+          <a:blip r:embed="rId3">
+            <a:extLst>
+              <a:ext uri="{28A0092B-C50C-407E-A947-70E740481C1C}">
+                <a14:useLocalDpi xmlns:a14="http://schemas.microsoft.com/office/drawing/2010/main" val="0"/>
+              </a:ext>
+            </a:extLst>
+          </a:blip>
+          <a:srcRect/>
+          <a:stretch>
+            <a:fillRect/>
+          </a:stretch>
+        </p:blipFill>
+        <p:spPr bwMode="auto">
+          <a:xfrm>
+            <a:off x="6391420" y="1393140"/>
+            <a:ext cx="4438650" cy="3476625"/>
+          </a:xfrm>
+          <a:prstGeom prst="rect">
+            <a:avLst/>
+          </a:prstGeom>
+          <a:noFill/>
+          <a:extLst>
+            <a:ext uri="{909E8E84-426E-40DD-AFC4-6F175D3DCCD1}">
+              <a14:hiddenFill xmlns:a14="http://schemas.microsoft.com/office/drawing/2010/main">
+                <a:solidFill>
+                  <a:srgbClr val="FFFFFF"/>
+                </a:solidFill>
+              </a14:hiddenFill>
+            </a:ext>
+          </a:extLst>
+        </p:spPr>
+      </p:pic>
+    </p:spTree>
+    <p:extLst>
+      <p:ext uri="{BB962C8B-B14F-4D97-AF65-F5344CB8AC3E}">
+        <p14:creationId xmlns:p14="http://schemas.microsoft.com/office/powerpoint/2010/main" val="884164174"/>
+      </p:ext>
+    </p:extLst>
+  </p:cSld>
+  <p:clrMapOvr>
+    <a:masterClrMapping/>
+  </p:clrMapOvr>
+</p:sld>
+</file>
+
+<file path=ppt/slides/slide14.xml><?xml version="1.0" encoding="utf-8"?>
+<p:sld xmlns:a="http://schemas.openxmlformats.org/drawingml/2006/main" xmlns:r="http://schemas.openxmlformats.org/officeDocument/2006/relationships" xmlns:p="http://schemas.openxmlformats.org/presentationml/2006/main">
+  <p:cSld>
+    <p:spTree>
+      <p:nvGrpSpPr>
+        <p:cNvPr id="1" name=""/>
+        <p:cNvGrpSpPr/>
+        <p:nvPr/>
+      </p:nvGrpSpPr>
+      <p:grpSpPr>
+        <a:xfrm>
+          <a:off x="0" y="0"/>
+          <a:ext cx="0" cy="0"/>
+          <a:chOff x="0" y="0"/>
+          <a:chExt cx="0" cy="0"/>
+        </a:xfrm>
+      </p:grpSpPr>
+      <p:sp>
+        <p:nvSpPr>
+          <p:cNvPr id="3" name="Symbol zastępczy zawartości 2">
+            <a:extLst>
+              <a:ext uri="{FF2B5EF4-FFF2-40B4-BE49-F238E27FC236}">
+                <a16:creationId xmlns:a16="http://schemas.microsoft.com/office/drawing/2014/main" id="{CDC6F948-2F33-47A0-AE55-62E355ACC532}"/>
+              </a:ext>
+            </a:extLst>
+          </p:cNvPr>
+          <p:cNvSpPr>
+            <a:spLocks noGrp="1"/>
+          </p:cNvSpPr>
+          <p:nvPr>
+            <p:ph idx="1"/>
+          </p:nvPr>
+        </p:nvSpPr>
+        <p:spPr>
+          <a:xfrm>
+            <a:off x="446739" y="1393140"/>
+            <a:ext cx="11410719" cy="5327749"/>
+          </a:xfrm>
+        </p:spPr>
+        <p:txBody>
+          <a:bodyPr>
+            <a:normAutofit/>
+          </a:bodyPr>
+          <a:lstStyle/>
+          <a:p>
+            <a:pPr algn="just"/>
+            <a:endParaRPr lang="pl-PL" dirty="0"/>
+          </a:p>
+          <a:p>
+            <a:pPr algn="just"/>
+            <a:endParaRPr lang="pl-PL" dirty="0"/>
+          </a:p>
+          <a:p>
+            <a:pPr algn="just"/>
+            <a:endParaRPr lang="pl-PL" dirty="0"/>
+          </a:p>
+          <a:p>
+            <a:pPr algn="just"/>
+            <a:endParaRPr lang="pl-PL" dirty="0"/>
+          </a:p>
+          <a:p>
+            <a:pPr algn="just"/>
+            <a:endParaRPr lang="pl-PL" dirty="0"/>
+          </a:p>
+          <a:p>
+            <a:pPr algn="just"/>
+            <a:endParaRPr lang="pl-PL" dirty="0"/>
+          </a:p>
+          <a:p>
+            <a:pPr algn="just"/>
+            <a:endParaRPr lang="pl-PL" dirty="0"/>
+          </a:p>
+        </p:txBody>
+      </p:sp>
+      <p:sp>
+        <p:nvSpPr>
+          <p:cNvPr id="4" name="Title 1">
+            <a:extLst>
+              <a:ext uri="{FF2B5EF4-FFF2-40B4-BE49-F238E27FC236}">
+                <a16:creationId xmlns:a16="http://schemas.microsoft.com/office/drawing/2014/main" id="{F0FEE1CD-BF08-48FA-8526-5BEB92660675}"/>
+              </a:ext>
+            </a:extLst>
+          </p:cNvPr>
+          <p:cNvSpPr txBox="1">
+            <a:spLocks/>
+          </p:cNvSpPr>
+          <p:nvPr/>
+        </p:nvSpPr>
+        <p:spPr>
+          <a:xfrm rot="5400000">
+            <a:off x="5488404" y="-5488406"/>
+            <a:ext cx="1215190" cy="12192001"/>
+          </a:xfrm>
+          <a:prstGeom prst="rect">
+            <a:avLst/>
+          </a:prstGeom>
+          <a:solidFill>
+            <a:srgbClr val="3B3B3B"/>
+          </a:solidFill>
+        </p:spPr>
+        <p:txBody>
+          <a:bodyPr vert="vert270" lIns="91440" tIns="45720" rIns="91440" bIns="45720" rtlCol="0" anchor="ctr" anchorCtr="0">
+            <a:normAutofit fontScale="92500"/>
+          </a:bodyPr>
+          <a:lstStyle>
+            <a:lvl1pPr algn="l" defTabSz="914400" rtl="0" eaLnBrk="1" latinLnBrk="0" hangingPunct="1">
+              <a:lnSpc>
+                <a:spcPct val="90000"/>
+              </a:lnSpc>
+              <a:spcBef>
+                <a:spcPct val="0"/>
+              </a:spcBef>
+              <a:buNone/>
+              <a:defRPr sz="4400" kern="1200">
+                <a:solidFill>
+                  <a:schemeClr val="tx1"/>
+                </a:solidFill>
+                <a:latin typeface="+mj-lt"/>
+                <a:ea typeface="+mj-ea"/>
+                <a:cs typeface="+mj-cs"/>
+              </a:defRPr>
+            </a:lvl1pPr>
+          </a:lstStyle>
+          <a:p>
+            <a:pPr algn="ctr"/>
+            <a:r>
+              <a:rPr lang="en-US" b="1" dirty="0">
+                <a:solidFill>
+                  <a:srgbClr val="FF6600"/>
+                </a:solidFill>
+              </a:rPr>
+              <a:t>EDA - Hypothesis no. </a:t>
+            </a:r>
+            <a:r>
+              <a:rPr lang="pl-PL" b="1" dirty="0">
+                <a:solidFill>
+                  <a:srgbClr val="FF6600"/>
+                </a:solidFill>
+              </a:rPr>
+              <a:t>6</a:t>
+            </a:r>
+            <a:endParaRPr lang="en-US" b="1" dirty="0">
+              <a:solidFill>
+                <a:srgbClr val="FF6600"/>
+              </a:solidFill>
+            </a:endParaRPr>
+          </a:p>
+          <a:p>
+            <a:pPr algn="ctr"/>
+            <a:r>
+              <a:rPr lang="pl-PL" sz="3400" b="1" dirty="0">
+                <a:solidFill>
+                  <a:srgbClr val="FF6600"/>
+                </a:solidFill>
+              </a:rPr>
+              <a:t> „</a:t>
+            </a:r>
+            <a:r>
+              <a:rPr lang="en-US" sz="3400" b="1" dirty="0">
+                <a:solidFill>
+                  <a:srgbClr val="FF6600"/>
+                </a:solidFill>
+              </a:rPr>
+              <a:t>Side effect analysis based on patients condition since taking the drugs</a:t>
+            </a:r>
+            <a:r>
+              <a:rPr lang="pl-PL" sz="3400" b="1" dirty="0">
+                <a:solidFill>
+                  <a:srgbClr val="FF6600"/>
+                </a:solidFill>
+              </a:rPr>
+              <a:t>”</a:t>
+            </a:r>
+            <a:endParaRPr lang="en-US" sz="3400" b="1" dirty="0">
+              <a:solidFill>
+                <a:srgbClr val="FF6600"/>
+              </a:solidFill>
+            </a:endParaRPr>
+          </a:p>
+        </p:txBody>
+      </p:sp>
+      <p:sp>
+        <p:nvSpPr>
+          <p:cNvPr id="2" name="TextBox 1">
+            <a:extLst>
+              <a:ext uri="{FF2B5EF4-FFF2-40B4-BE49-F238E27FC236}">
+                <a16:creationId xmlns:a16="http://schemas.microsoft.com/office/drawing/2014/main" id="{54593952-0983-4F47-9812-9069F76BD06A}"/>
+              </a:ext>
+            </a:extLst>
+          </p:cNvPr>
+          <p:cNvSpPr txBox="1"/>
+          <p:nvPr/>
+        </p:nvSpPr>
+        <p:spPr>
+          <a:xfrm>
+            <a:off x="6727372" y="1393140"/>
+            <a:ext cx="4599992" cy="4524315"/>
+          </a:xfrm>
+          <a:prstGeom prst="rect">
+            <a:avLst/>
+          </a:prstGeom>
+          <a:noFill/>
+        </p:spPr>
+        <p:txBody>
+          <a:bodyPr wrap="square" rtlCol="0">
+            <a:spAutoFit/>
+          </a:bodyPr>
+          <a:lstStyle/>
+          <a:p>
+            <a:pPr marL="285750" indent="-285750">
+              <a:buFont typeface="Arial" panose="020B0604020202020204" pitchFamily="34" charset="0"/>
+              <a:buChar char="•"/>
+            </a:pPr>
+            <a:r>
+              <a:rPr lang="en-US" dirty="0"/>
+              <a:t> After dealing with the Nan values, the graph consulted shows that most of the patients had no side effects, but they neither improved their condition.</a:t>
+            </a:r>
+          </a:p>
+          <a:p>
+            <a:pPr marL="285750" indent="-285750">
+              <a:buFont typeface="Arial" panose="020B0604020202020204" pitchFamily="34" charset="0"/>
+              <a:buChar char="•"/>
+            </a:pPr>
+            <a:r>
+              <a:rPr lang="en-US" dirty="0"/>
+              <a:t>This is an example where the dominant category will definitely influence learning only one category and will be of no use when training, and no influence over declaring the persistency of a drug.</a:t>
+            </a:r>
+          </a:p>
+          <a:p>
+            <a:pPr marL="285750" indent="-285750">
+              <a:buFont typeface="Arial" panose="020B0604020202020204" pitchFamily="34" charset="0"/>
+              <a:buChar char="•"/>
+            </a:pPr>
+            <a:r>
+              <a:rPr lang="en-US" dirty="0"/>
+              <a:t> For this reason along with consideration of the very small appearance number of the two categories in the dataset, the two categories “Worsened” and “Improved” can be considered outliers. Therefore, after outliers removal, this column will not even exist.</a:t>
+            </a:r>
+            <a:endParaRPr lang="pl-PL" dirty="0"/>
+          </a:p>
+        </p:txBody>
+      </p:sp>
+      <p:pic>
+        <p:nvPicPr>
+          <p:cNvPr id="7" name="Picture 6">
+            <a:extLst>
+              <a:ext uri="{FF2B5EF4-FFF2-40B4-BE49-F238E27FC236}">
+                <a16:creationId xmlns:a16="http://schemas.microsoft.com/office/drawing/2014/main" id="{6753BF89-C4B6-46CD-9680-7A04893F2CFD}"/>
+              </a:ext>
+            </a:extLst>
+          </p:cNvPr>
+          <p:cNvPicPr>
+            <a:picLocks noChangeAspect="1"/>
+          </p:cNvPicPr>
+          <p:nvPr/>
+        </p:nvPicPr>
+        <p:blipFill>
+          <a:blip r:embed="rId2"/>
+          <a:stretch>
+            <a:fillRect/>
+          </a:stretch>
+        </p:blipFill>
+        <p:spPr>
+          <a:xfrm>
+            <a:off x="715268" y="1632255"/>
+            <a:ext cx="5743575" cy="4046084"/>
+          </a:xfrm>
+          <a:prstGeom prst="rect">
+            <a:avLst/>
+          </a:prstGeom>
+        </p:spPr>
+      </p:pic>
+    </p:spTree>
+    <p:extLst>
+      <p:ext uri="{BB962C8B-B14F-4D97-AF65-F5344CB8AC3E}">
+        <p14:creationId xmlns:p14="http://schemas.microsoft.com/office/powerpoint/2010/main" val="2274438380"/>
+      </p:ext>
+    </p:extLst>
+  </p:cSld>
+  <p:clrMapOvr>
+    <a:masterClrMapping/>
+  </p:clrMapOvr>
+</p:sld>
+</file>
+
+<file path=ppt/slides/slide15.xml><?xml version="1.0" encoding="utf-8"?>
+<p:sld xmlns:a="http://schemas.openxmlformats.org/drawingml/2006/main" xmlns:r="http://schemas.openxmlformats.org/officeDocument/2006/relationships" xmlns:p="http://schemas.openxmlformats.org/presentationml/2006/main">
+  <p:cSld>
+    <p:spTree>
+      <p:nvGrpSpPr>
+        <p:cNvPr id="1" name=""/>
+        <p:cNvGrpSpPr/>
+        <p:nvPr/>
+      </p:nvGrpSpPr>
+      <p:grpSpPr>
+        <a:xfrm>
+          <a:off x="0" y="0"/>
+          <a:ext cx="0" cy="0"/>
+          <a:chOff x="0" y="0"/>
+          <a:chExt cx="0" cy="0"/>
+        </a:xfrm>
+      </p:grpSpPr>
+      <p:sp>
+        <p:nvSpPr>
           <p:cNvPr id="3" name="Symbol zastępczy zawartości 2">
             <a:extLst>
               <a:ext uri="{FF2B5EF4-FFF2-40B4-BE49-F238E27FC236}">
@@ -4907,8 +6900,21 @@
                   <a:srgbClr val="FF6600"/>
                 </a:solidFill>
               </a:rPr>
-              <a:t>EDA - Hypothesis no. 3</a:t>
-            </a:r>
+              <a:t>EDA - Hypothesis no. </a:t>
+            </a:r>
+            <a:r>
+              <a:rPr lang="pl-PL" b="1" dirty="0">
+                <a:solidFill>
+                  <a:srgbClr val="FF6600"/>
+                </a:solidFill>
+              </a:rPr>
+              <a:t>7</a:t>
+            </a:r>
+            <a:endParaRPr lang="en-US" b="1" dirty="0">
+              <a:solidFill>
+                <a:srgbClr val="FF6600"/>
+              </a:solidFill>
+            </a:endParaRPr>
           </a:p>
           <a:p>
             <a:pPr algn="ctr"/>
@@ -4926,7 +6932,7 @@
                   <a:srgbClr val="FF6600"/>
                 </a:solidFill>
               </a:rPr>
-              <a:t> Most frequent risks</a:t>
+              <a:t>Most frequent risks</a:t>
             </a:r>
             <a:r>
               <a:rPr lang="pl-PL" sz="3400" b="1" dirty="0">
@@ -5027,7 +7033,7 @@
 </p:sld>
 </file>
 
-<file path=ppt/slides/slide11.xml><?xml version="1.0" encoding="utf-8"?>
+<file path=ppt/slides/slide16.xml><?xml version="1.0" encoding="utf-8"?>
 <p:sld xmlns:a="http://schemas.openxmlformats.org/drawingml/2006/main" xmlns:r="http://schemas.openxmlformats.org/officeDocument/2006/relationships" xmlns:p="http://schemas.openxmlformats.org/presentationml/2006/main">
   <p:cSld>
     <p:spTree>
@@ -5160,8 +7166,21 @@
                   <a:srgbClr val="FF6600"/>
                 </a:solidFill>
               </a:rPr>
-              <a:t>EDA - Hypothesis no. 2</a:t>
-            </a:r>
+              <a:t>EDA - Hypothesis no. </a:t>
+            </a:r>
+            <a:r>
+              <a:rPr lang="pl-PL" b="1" dirty="0">
+                <a:solidFill>
+                  <a:srgbClr val="FF6600"/>
+                </a:solidFill>
+              </a:rPr>
+              <a:t>7</a:t>
+            </a:r>
+            <a:endParaRPr lang="en-US" b="1" dirty="0">
+              <a:solidFill>
+                <a:srgbClr val="FF6600"/>
+              </a:solidFill>
+            </a:endParaRPr>
           </a:p>
           <a:p>
             <a:pPr algn="ctr"/>
@@ -5179,7 +7198,7 @@
                   <a:srgbClr val="FF6600"/>
                 </a:solidFill>
               </a:rPr>
-              <a:t> Most frequent risks</a:t>
+              <a:t>Most frequent risks</a:t>
             </a:r>
             <a:r>
               <a:rPr lang="pl-PL" sz="3400" b="1" dirty="0">
@@ -5335,7 +7354,7 @@
 </p:sld>
 </file>
 
-<file path=ppt/slides/slide12.xml><?xml version="1.0" encoding="utf-8"?>
+<file path=ppt/slides/slide17.xml><?xml version="1.0" encoding="utf-8"?>
 <p:sld xmlns:a="http://schemas.openxmlformats.org/drawingml/2006/main" xmlns:r="http://schemas.openxmlformats.org/officeDocument/2006/relationships" xmlns:p="http://schemas.openxmlformats.org/presentationml/2006/main">
   <p:cSld>
     <p:spTree>
@@ -5468,8 +7487,21 @@
                   <a:srgbClr val="FF6600"/>
                 </a:solidFill>
               </a:rPr>
-              <a:t>EDA - Hypothesis no. 2</a:t>
-            </a:r>
+              <a:t>EDA - Hypothesis no. </a:t>
+            </a:r>
+            <a:r>
+              <a:rPr lang="pl-PL" b="1" dirty="0">
+                <a:solidFill>
+                  <a:srgbClr val="FF6600"/>
+                </a:solidFill>
+              </a:rPr>
+              <a:t>7</a:t>
+            </a:r>
+            <a:endParaRPr lang="en-US" b="1" dirty="0">
+              <a:solidFill>
+                <a:srgbClr val="FF6600"/>
+              </a:solidFill>
+            </a:endParaRPr>
           </a:p>
           <a:p>
             <a:pPr algn="ctr"/>
@@ -5487,7 +7519,7 @@
                   <a:srgbClr val="FF6600"/>
                 </a:solidFill>
               </a:rPr>
-              <a:t> Most frequent risks</a:t>
+              <a:t>Most frequent risks</a:t>
             </a:r>
             <a:r>
               <a:rPr lang="pl-PL" sz="3400" b="1" dirty="0">
@@ -5627,7 +7659,7 @@
 </p:sld>
 </file>
 
-<file path=ppt/slides/slide13.xml><?xml version="1.0" encoding="utf-8"?>
+<file path=ppt/slides/slide18.xml><?xml version="1.0" encoding="utf-8"?>
 <p:sld xmlns:a="http://schemas.openxmlformats.org/drawingml/2006/main" xmlns:r="http://schemas.openxmlformats.org/officeDocument/2006/relationships" xmlns:p="http://schemas.openxmlformats.org/presentationml/2006/main">
   <p:cSld>
     <p:spTree>
@@ -5674,17 +7706,29 @@
           <a:p>
             <a:pPr algn="just"/>
             <a:r>
-              <a:rPr lang="pl-PL" dirty="0"/>
+              <a:rPr lang="pl-PL" dirty="0">
+                <a:highlight>
+                  <a:srgbClr val="FFFF00"/>
+                </a:highlight>
+              </a:rPr>
               <a:t>…</a:t>
             </a:r>
           </a:p>
           <a:p>
             <a:pPr algn="just"/>
             <a:r>
-              <a:rPr lang="pl-PL" dirty="0"/>
+              <a:rPr lang="pl-PL" dirty="0">
+                <a:highlight>
+                  <a:srgbClr val="FFFF00"/>
+                </a:highlight>
+              </a:rPr>
               <a:t>…</a:t>
             </a:r>
-            <a:endParaRPr lang="en-AU" dirty="0"/>
+            <a:endParaRPr lang="en-AU" dirty="0">
+              <a:highlight>
+                <a:srgbClr val="FFFF00"/>
+              </a:highlight>
+            </a:endParaRPr>
           </a:p>
           <a:p>
             <a:endParaRPr lang="pl-PL" dirty="0"/>
@@ -5719,7 +7763,7 @@
         </p:spPr>
         <p:txBody>
           <a:bodyPr vert="vert270" lIns="91440" tIns="45720" rIns="91440" bIns="45720" rtlCol="0" anchor="ctr" anchorCtr="0">
-            <a:normAutofit/>
+            <a:normAutofit fontScale="92500" lnSpcReduction="10000"/>
           </a:bodyPr>
           <a:lstStyle>
             <a:lvl1pPr algn="l" defTabSz="914400" rtl="0" eaLnBrk="1" latinLnBrk="0" hangingPunct="1">
@@ -5756,12 +7800,29 @@
                   <a:srgbClr val="FF6600"/>
                 </a:solidFill>
               </a:rPr>
-              <a:t>…</a:t>
+              <a:t>8</a:t>
+            </a:r>
+          </a:p>
+          <a:p>
+            <a:pPr algn="ctr"/>
+            <a:r>
+              <a:rPr lang="pl-PL" b="1" dirty="0">
+                <a:solidFill>
+                  <a:srgbClr val="FF6600"/>
+                </a:solidFill>
+                <a:highlight>
+                  <a:srgbClr val="FFFF00"/>
+                </a:highlight>
+              </a:rPr>
+              <a:t>„…”</a:t>
             </a:r>
             <a:endParaRPr lang="en-US" b="1" dirty="0">
               <a:solidFill>
                 <a:srgbClr val="FF6600"/>
               </a:solidFill>
+              <a:highlight>
+                <a:srgbClr val="FFFF00"/>
+              </a:highlight>
             </a:endParaRPr>
           </a:p>
         </p:txBody>
@@ -5779,7 +7840,7 @@
 </p:sld>
 </file>
 
-<file path=ppt/slides/slide14.xml><?xml version="1.0" encoding="utf-8"?>
+<file path=ppt/slides/slide19.xml><?xml version="1.0" encoding="utf-8"?>
 <p:sld xmlns:a="http://schemas.openxmlformats.org/drawingml/2006/main" xmlns:r="http://schemas.openxmlformats.org/officeDocument/2006/relationships" xmlns:p="http://schemas.openxmlformats.org/presentationml/2006/main">
   <p:cSld>
     <p:spTree>
@@ -5826,12 +7887,15 @@
           <a:p>
             <a:pPr algn="just"/>
             <a:r>
-              <a:rPr lang="pl-PL" sz="3200" dirty="0"/>
-              <a:t>..</a:t>
-            </a:r>
-            <a:r>
-              <a:rPr lang="en-AU" sz="3200" dirty="0"/>
-              <a:t>.</a:t>
+              <a:rPr lang="en-US" sz="2000" dirty="0"/>
+              <a:t>CT scan prior and during therapy has similar values. Therefore, only one of these features should be taken into modeling.</a:t>
+            </a:r>
+          </a:p>
+          <a:p>
+            <a:pPr algn="just"/>
+            <a:r>
+              <a:rPr lang="en-US" sz="2000" dirty="0"/>
+              <a:t>All risk related features should be taken into modeling.</a:t>
             </a:r>
           </a:p>
           <a:p>
@@ -5845,13 +7909,17 @@
             <a:pPr algn="just"/>
             <a:r>
               <a:rPr lang="en-US" sz="2000" dirty="0"/>
-              <a:t>The most frequent risks are usually among :Vitamin D insufficiency, risk of smoking tobacco, risk of chronic malnutrition or malabsorption, risks during Rx and before mycobacteria (NTM) treatment.</a:t>
+              <a:t>The most frequent risks are usually among: Vitamin D insufficiency, risk of smoking tobacco, risk of chronic malnutrition or malabsorption, risks during Rx and before mycobacteria (NTM) treatment.</a:t>
             </a:r>
           </a:p>
           <a:p>
             <a:pPr algn="just"/>
             <a:r>
-              <a:rPr lang="en-US" sz="3200" dirty="0"/>
+              <a:rPr lang="en-US" sz="2000" dirty="0">
+                <a:highlight>
+                  <a:srgbClr val="FFFF00"/>
+                </a:highlight>
+              </a:rPr>
               <a:t>….</a:t>
             </a:r>
           </a:p>
@@ -5927,499 +7995,6 @@
     <p:extLst>
       <p:ext uri="{BB962C8B-B14F-4D97-AF65-F5344CB8AC3E}">
         <p14:creationId xmlns:p14="http://schemas.microsoft.com/office/powerpoint/2010/main" val="3497837162"/>
-      </p:ext>
-    </p:extLst>
-  </p:cSld>
-  <p:clrMapOvr>
-    <a:masterClrMapping/>
-  </p:clrMapOvr>
-</p:sld>
-</file>
-
-<file path=ppt/slides/slide15.xml><?xml version="1.0" encoding="utf-8"?>
-<p:sld xmlns:a="http://schemas.openxmlformats.org/drawingml/2006/main" xmlns:r="http://schemas.openxmlformats.org/officeDocument/2006/relationships" xmlns:p="http://schemas.openxmlformats.org/presentationml/2006/main">
-  <p:cSld>
-    <p:spTree>
-      <p:nvGrpSpPr>
-        <p:cNvPr id="1" name=""/>
-        <p:cNvGrpSpPr/>
-        <p:nvPr/>
-      </p:nvGrpSpPr>
-      <p:grpSpPr>
-        <a:xfrm>
-          <a:off x="0" y="0"/>
-          <a:ext cx="0" cy="0"/>
-          <a:chOff x="0" y="0"/>
-          <a:chExt cx="0" cy="0"/>
-        </a:xfrm>
-      </p:grpSpPr>
-      <p:sp>
-        <p:nvSpPr>
-          <p:cNvPr id="3" name="Symbol zastępczy zawartości 2">
-            <a:extLst>
-              <a:ext uri="{FF2B5EF4-FFF2-40B4-BE49-F238E27FC236}">
-                <a16:creationId xmlns:a16="http://schemas.microsoft.com/office/drawing/2014/main" id="{CDC6F948-2F33-47A0-AE55-62E355ACC532}"/>
-              </a:ext>
-            </a:extLst>
-          </p:cNvPr>
-          <p:cNvSpPr>
-            <a:spLocks noGrp="1"/>
-          </p:cNvSpPr>
-          <p:nvPr>
-            <p:ph idx="1"/>
-          </p:nvPr>
-        </p:nvSpPr>
-        <p:spPr>
-          <a:xfrm>
-            <a:off x="477253" y="1392488"/>
-            <a:ext cx="11205410" cy="5285038"/>
-          </a:xfrm>
-        </p:spPr>
-        <p:txBody>
-          <a:bodyPr>
-            <a:noAutofit/>
-          </a:bodyPr>
-          <a:lstStyle/>
-          <a:p>
-            <a:pPr algn="just"/>
-            <a:r>
-              <a:rPr lang="pl-PL" sz="2000" dirty="0"/>
-              <a:t>…</a:t>
-            </a:r>
-          </a:p>
-          <a:p>
-            <a:pPr algn="just"/>
-            <a:r>
-              <a:rPr lang="pl-PL" sz="2000" dirty="0"/>
-              <a:t>…</a:t>
-            </a:r>
-          </a:p>
-          <a:p>
-            <a:pPr algn="just"/>
-            <a:r>
-              <a:rPr lang="pl-PL" sz="2000" dirty="0"/>
-              <a:t>…</a:t>
-            </a:r>
-            <a:endParaRPr lang="en-US" sz="900" dirty="0"/>
-          </a:p>
-        </p:txBody>
-      </p:sp>
-      <p:sp>
-        <p:nvSpPr>
-          <p:cNvPr id="4" name="Title 1">
-            <a:extLst>
-              <a:ext uri="{FF2B5EF4-FFF2-40B4-BE49-F238E27FC236}">
-                <a16:creationId xmlns:a16="http://schemas.microsoft.com/office/drawing/2014/main" id="{F0FEE1CD-BF08-48FA-8526-5BEB92660675}"/>
-              </a:ext>
-            </a:extLst>
-          </p:cNvPr>
-          <p:cNvSpPr txBox="1">
-            <a:spLocks/>
-          </p:cNvSpPr>
-          <p:nvPr/>
-        </p:nvSpPr>
-        <p:spPr>
-          <a:xfrm rot="5400000">
-            <a:off x="5488404" y="-5488406"/>
-            <a:ext cx="1215190" cy="12192001"/>
-          </a:xfrm>
-          <a:prstGeom prst="rect">
-            <a:avLst/>
-          </a:prstGeom>
-          <a:solidFill>
-            <a:srgbClr val="3B3B3B"/>
-          </a:solidFill>
-        </p:spPr>
-        <p:txBody>
-          <a:bodyPr vert="vert270" lIns="91440" tIns="45720" rIns="91440" bIns="45720" rtlCol="0" anchor="ctr" anchorCtr="0">
-            <a:normAutofit/>
-          </a:bodyPr>
-          <a:lstStyle>
-            <a:lvl1pPr algn="l" defTabSz="914400" rtl="0" eaLnBrk="1" latinLnBrk="0" hangingPunct="1">
-              <a:lnSpc>
-                <a:spcPct val="90000"/>
-              </a:lnSpc>
-              <a:spcBef>
-                <a:spcPct val="0"/>
-              </a:spcBef>
-              <a:buNone/>
-              <a:defRPr sz="4400" kern="1200">
-                <a:solidFill>
-                  <a:schemeClr val="tx1"/>
-                </a:solidFill>
-                <a:latin typeface="+mj-lt"/>
-                <a:ea typeface="+mj-ea"/>
-                <a:cs typeface="+mj-cs"/>
-              </a:defRPr>
-            </a:lvl1pPr>
-          </a:lstStyle>
-          <a:p>
-            <a:pPr algn="ctr"/>
-            <a:r>
-              <a:rPr lang="en-US" b="1" dirty="0">
-                <a:solidFill>
-                  <a:srgbClr val="FF6600"/>
-                </a:solidFill>
-              </a:rPr>
-              <a:t>Recommendations</a:t>
-            </a:r>
-          </a:p>
-        </p:txBody>
-      </p:sp>
-    </p:spTree>
-    <p:extLst>
-      <p:ext uri="{BB962C8B-B14F-4D97-AF65-F5344CB8AC3E}">
-        <p14:creationId xmlns:p14="http://schemas.microsoft.com/office/powerpoint/2010/main" val="481083618"/>
-      </p:ext>
-    </p:extLst>
-  </p:cSld>
-  <p:clrMapOvr>
-    <a:masterClrMapping/>
-  </p:clrMapOvr>
-</p:sld>
-</file>
-
-<file path=ppt/slides/slide16.xml><?xml version="1.0" encoding="utf-8"?>
-<p:sld xmlns:a="http://schemas.openxmlformats.org/drawingml/2006/main" xmlns:r="http://schemas.openxmlformats.org/officeDocument/2006/relationships" xmlns:p="http://schemas.openxmlformats.org/presentationml/2006/main">
-  <p:cSld>
-    <p:spTree>
-      <p:nvGrpSpPr>
-        <p:cNvPr id="1" name=""/>
-        <p:cNvGrpSpPr/>
-        <p:nvPr/>
-      </p:nvGrpSpPr>
-      <p:grpSpPr>
-        <a:xfrm>
-          <a:off x="0" y="0"/>
-          <a:ext cx="0" cy="0"/>
-          <a:chOff x="0" y="0"/>
-          <a:chExt cx="0" cy="0"/>
-        </a:xfrm>
-      </p:grpSpPr>
-      <p:sp>
-        <p:nvSpPr>
-          <p:cNvPr id="3" name="Symbol zastępczy zawartości 2">
-            <a:extLst>
-              <a:ext uri="{FF2B5EF4-FFF2-40B4-BE49-F238E27FC236}">
-                <a16:creationId xmlns:a16="http://schemas.microsoft.com/office/drawing/2014/main" id="{CDC6F948-2F33-47A0-AE55-62E355ACC532}"/>
-              </a:ext>
-            </a:extLst>
-          </p:cNvPr>
-          <p:cNvSpPr>
-            <a:spLocks noGrp="1"/>
-          </p:cNvSpPr>
-          <p:nvPr>
-            <p:ph idx="1"/>
-          </p:nvPr>
-        </p:nvSpPr>
-        <p:spPr>
-          <a:xfrm>
-            <a:off x="477252" y="1296232"/>
-            <a:ext cx="11193379" cy="4226263"/>
-          </a:xfrm>
-        </p:spPr>
-        <p:txBody>
-          <a:bodyPr>
-            <a:noAutofit/>
-          </a:bodyPr>
-          <a:lstStyle/>
-          <a:p>
-            <a:pPr algn="just"/>
-            <a:r>
-              <a:rPr lang="en-US" sz="2300" dirty="0"/>
-              <a:t>Following modeling techniques should be consider for this assignment:</a:t>
-            </a:r>
-          </a:p>
-          <a:p>
-            <a:pPr lvl="1" algn="just"/>
-            <a:r>
-              <a:rPr lang="en-US" sz="1900" dirty="0"/>
-              <a:t>Decision Trees</a:t>
-            </a:r>
-          </a:p>
-          <a:p>
-            <a:pPr lvl="1" algn="just"/>
-            <a:r>
-              <a:rPr lang="en-US" sz="1900" dirty="0"/>
-              <a:t>K-Nearest Neighbors</a:t>
-            </a:r>
-          </a:p>
-          <a:p>
-            <a:pPr lvl="1" algn="just"/>
-            <a:r>
-              <a:rPr lang="en-US" sz="1900" dirty="0"/>
-              <a:t>Logistic Regression</a:t>
-            </a:r>
-          </a:p>
-          <a:p>
-            <a:pPr lvl="1" algn="just"/>
-            <a:r>
-              <a:rPr lang="en-US" sz="1900" dirty="0"/>
-              <a:t>SVM (Support Vector Machines)</a:t>
-            </a:r>
-          </a:p>
-        </p:txBody>
-      </p:sp>
-      <p:sp>
-        <p:nvSpPr>
-          <p:cNvPr id="4" name="Title 1">
-            <a:extLst>
-              <a:ext uri="{FF2B5EF4-FFF2-40B4-BE49-F238E27FC236}">
-                <a16:creationId xmlns:a16="http://schemas.microsoft.com/office/drawing/2014/main" id="{F0FEE1CD-BF08-48FA-8526-5BEB92660675}"/>
-              </a:ext>
-            </a:extLst>
-          </p:cNvPr>
-          <p:cNvSpPr txBox="1">
-            <a:spLocks/>
-          </p:cNvSpPr>
-          <p:nvPr/>
-        </p:nvSpPr>
-        <p:spPr>
-          <a:xfrm rot="5400000">
-            <a:off x="5488404" y="-5488406"/>
-            <a:ext cx="1215190" cy="12192001"/>
-          </a:xfrm>
-          <a:prstGeom prst="rect">
-            <a:avLst/>
-          </a:prstGeom>
-          <a:solidFill>
-            <a:srgbClr val="3B3B3B"/>
-          </a:solidFill>
-        </p:spPr>
-        <p:txBody>
-          <a:bodyPr vert="vert270" lIns="91440" tIns="45720" rIns="91440" bIns="45720" rtlCol="0" anchor="ctr" anchorCtr="0">
-            <a:normAutofit/>
-          </a:bodyPr>
-          <a:lstStyle>
-            <a:lvl1pPr algn="l" defTabSz="914400" rtl="0" eaLnBrk="1" latinLnBrk="0" hangingPunct="1">
-              <a:lnSpc>
-                <a:spcPct val="90000"/>
-              </a:lnSpc>
-              <a:spcBef>
-                <a:spcPct val="0"/>
-              </a:spcBef>
-              <a:buNone/>
-              <a:defRPr sz="4400" kern="1200">
-                <a:solidFill>
-                  <a:schemeClr val="tx1"/>
-                </a:solidFill>
-                <a:latin typeface="+mj-lt"/>
-                <a:ea typeface="+mj-ea"/>
-                <a:cs typeface="+mj-cs"/>
-              </a:defRPr>
-            </a:lvl1pPr>
-          </a:lstStyle>
-          <a:p>
-            <a:pPr algn="ctr"/>
-            <a:r>
-              <a:rPr lang="pl-PL" b="1" dirty="0">
-                <a:solidFill>
-                  <a:srgbClr val="FF6600"/>
-                </a:solidFill>
-              </a:rPr>
-              <a:t>Technical </a:t>
-            </a:r>
-            <a:r>
-              <a:rPr lang="pl-PL" b="1" dirty="0" err="1">
-                <a:solidFill>
-                  <a:srgbClr val="FF6600"/>
-                </a:solidFill>
-              </a:rPr>
-              <a:t>aspects</a:t>
-            </a:r>
-            <a:r>
-              <a:rPr lang="pl-PL" b="1" dirty="0">
-                <a:solidFill>
-                  <a:srgbClr val="FF6600"/>
-                </a:solidFill>
-              </a:rPr>
-              <a:t> – </a:t>
-            </a:r>
-            <a:r>
-              <a:rPr lang="pl-PL" b="1" dirty="0" err="1">
-                <a:solidFill>
-                  <a:srgbClr val="FF6600"/>
-                </a:solidFill>
-              </a:rPr>
-              <a:t>recommended</a:t>
-            </a:r>
-            <a:r>
-              <a:rPr lang="pl-PL" b="1" dirty="0">
-                <a:solidFill>
-                  <a:srgbClr val="FF6600"/>
-                </a:solidFill>
-              </a:rPr>
-              <a:t> </a:t>
-            </a:r>
-            <a:r>
-              <a:rPr lang="pl-PL" b="1" dirty="0" err="1">
-                <a:solidFill>
-                  <a:srgbClr val="FF6600"/>
-                </a:solidFill>
-              </a:rPr>
-              <a:t>models</a:t>
-            </a:r>
-            <a:endParaRPr lang="en-US" b="1" dirty="0">
-              <a:solidFill>
-                <a:srgbClr val="FF6600"/>
-              </a:solidFill>
-            </a:endParaRPr>
-          </a:p>
-        </p:txBody>
-      </p:sp>
-    </p:spTree>
-    <p:extLst>
-      <p:ext uri="{BB962C8B-B14F-4D97-AF65-F5344CB8AC3E}">
-        <p14:creationId xmlns:p14="http://schemas.microsoft.com/office/powerpoint/2010/main" val="1837009852"/>
-      </p:ext>
-    </p:extLst>
-  </p:cSld>
-  <p:clrMapOvr>
-    <a:masterClrMapping/>
-  </p:clrMapOvr>
-</p:sld>
-</file>
-
-<file path=ppt/slides/slide17.xml><?xml version="1.0" encoding="utf-8"?>
-<p:sld xmlns:a="http://schemas.openxmlformats.org/drawingml/2006/main" xmlns:r="http://schemas.openxmlformats.org/officeDocument/2006/relationships" xmlns:p="http://schemas.openxmlformats.org/presentationml/2006/main">
-  <p:cSld>
-    <p:spTree>
-      <p:nvGrpSpPr>
-        <p:cNvPr id="1" name=""/>
-        <p:cNvGrpSpPr/>
-        <p:nvPr/>
-      </p:nvGrpSpPr>
-      <p:grpSpPr>
-        <a:xfrm>
-          <a:off x="0" y="0"/>
-          <a:ext cx="0" cy="0"/>
-          <a:chOff x="0" y="0"/>
-          <a:chExt cx="0" cy="0"/>
-        </a:xfrm>
-      </p:grpSpPr>
-      <p:sp>
-        <p:nvSpPr>
-          <p:cNvPr id="2" name="Title 1">
-            <a:extLst>
-              <a:ext uri="{FF2B5EF4-FFF2-40B4-BE49-F238E27FC236}">
-                <a16:creationId xmlns:a16="http://schemas.microsoft.com/office/drawing/2014/main" id="{E8B8F26E-9345-4747-9094-972E38700A17}"/>
-              </a:ext>
-            </a:extLst>
-          </p:cNvPr>
-          <p:cNvSpPr>
-            <a:spLocks noGrp="1"/>
-          </p:cNvSpPr>
-          <p:nvPr>
-            <p:ph type="ctrTitle"/>
-          </p:nvPr>
-        </p:nvSpPr>
-        <p:spPr>
-          <a:xfrm rot="5400000">
-            <a:off x="-562431" y="562430"/>
-            <a:ext cx="6858002" cy="5733142"/>
-          </a:xfrm>
-          <a:solidFill>
-            <a:srgbClr val="3B3B3B"/>
-          </a:solidFill>
-        </p:spPr>
-        <p:txBody>
-          <a:bodyPr vert="vert270" anchor="t" anchorCtr="0"/>
-          <a:lstStyle/>
-          <a:p>
-            <a:endParaRPr lang="en-US" b="1" dirty="0">
-              <a:solidFill>
-                <a:srgbClr val="FF6600"/>
-              </a:solidFill>
-            </a:endParaRPr>
-          </a:p>
-        </p:txBody>
-      </p:sp>
-      <p:pic>
-        <p:nvPicPr>
-          <p:cNvPr id="4" name="Picture 3">
-            <a:extLst>
-              <a:ext uri="{FF2B5EF4-FFF2-40B4-BE49-F238E27FC236}">
-                <a16:creationId xmlns:a16="http://schemas.microsoft.com/office/drawing/2014/main" id="{7A465064-0714-5743-882B-8875105A7023}"/>
-              </a:ext>
-            </a:extLst>
-          </p:cNvPr>
-          <p:cNvPicPr>
-            <a:picLocks noChangeAspect="1"/>
-          </p:cNvPicPr>
-          <p:nvPr/>
-        </p:nvPicPr>
-        <p:blipFill>
-          <a:blip r:embed="rId2" cstate="print">
-            <a:extLst>
-              <a:ext uri="{28A0092B-C50C-407E-A947-70E740481C1C}">
-                <a14:useLocalDpi xmlns:a14="http://schemas.microsoft.com/office/drawing/2010/main" val="0"/>
-              </a:ext>
-            </a:extLst>
-          </a:blip>
-          <a:stretch>
-            <a:fillRect/>
-          </a:stretch>
-        </p:blipFill>
-        <p:spPr>
-          <a:xfrm>
-            <a:off x="0" y="5863771"/>
-            <a:ext cx="1654627" cy="994232"/>
-          </a:xfrm>
-          <a:prstGeom prst="rect">
-            <a:avLst/>
-          </a:prstGeom>
-        </p:spPr>
-      </p:pic>
-      <p:sp>
-        <p:nvSpPr>
-          <p:cNvPr id="6" name="Subtitle 5">
-            <a:extLst>
-              <a:ext uri="{FF2B5EF4-FFF2-40B4-BE49-F238E27FC236}">
-                <a16:creationId xmlns:a16="http://schemas.microsoft.com/office/drawing/2014/main" id="{2D4BA697-580E-5544-8F2F-194AD99B859F}"/>
-              </a:ext>
-            </a:extLst>
-          </p:cNvPr>
-          <p:cNvSpPr>
-            <a:spLocks noGrp="1"/>
-          </p:cNvSpPr>
-          <p:nvPr>
-            <p:ph type="subTitle" idx="1"/>
-          </p:nvPr>
-        </p:nvSpPr>
-        <p:spPr>
-          <a:xfrm>
-            <a:off x="5152570" y="2481943"/>
-            <a:ext cx="5558973" cy="1655762"/>
-          </a:xfrm>
-        </p:spPr>
-        <p:txBody>
-          <a:bodyPr>
-            <a:normAutofit/>
-          </a:bodyPr>
-          <a:lstStyle/>
-          <a:p>
-            <a:r>
-              <a:rPr lang="en-US" sz="6600" dirty="0">
-                <a:solidFill>
-                  <a:srgbClr val="FF6600"/>
-                </a:solidFill>
-              </a:rPr>
-              <a:t>Thank You</a:t>
-            </a:r>
-          </a:p>
-          <a:p>
-            <a:endParaRPr lang="en-US" sz="6600" dirty="0">
-              <a:solidFill>
-                <a:srgbClr val="FF6600"/>
-              </a:solidFill>
-            </a:endParaRPr>
-          </a:p>
-        </p:txBody>
-      </p:sp>
-    </p:spTree>
-    <p:extLst>
-      <p:ext uri="{BB962C8B-B14F-4D97-AF65-F5344CB8AC3E}">
-        <p14:creationId xmlns:p14="http://schemas.microsoft.com/office/powerpoint/2010/main" val="116821060"/>
       </p:ext>
     </p:extLst>
   </p:cSld>
@@ -6689,6 +8264,428 @@
 </p:sld>
 </file>
 
+<file path=ppt/slides/slide20.xml><?xml version="1.0" encoding="utf-8"?>
+<p:sld xmlns:a="http://schemas.openxmlformats.org/drawingml/2006/main" xmlns:r="http://schemas.openxmlformats.org/officeDocument/2006/relationships" xmlns:p="http://schemas.openxmlformats.org/presentationml/2006/main">
+  <p:cSld>
+    <p:spTree>
+      <p:nvGrpSpPr>
+        <p:cNvPr id="1" name=""/>
+        <p:cNvGrpSpPr/>
+        <p:nvPr/>
+      </p:nvGrpSpPr>
+      <p:grpSpPr>
+        <a:xfrm>
+          <a:off x="0" y="0"/>
+          <a:ext cx="0" cy="0"/>
+          <a:chOff x="0" y="0"/>
+          <a:chExt cx="0" cy="0"/>
+        </a:xfrm>
+      </p:grpSpPr>
+      <p:sp>
+        <p:nvSpPr>
+          <p:cNvPr id="3" name="Symbol zastępczy zawartości 2">
+            <a:extLst>
+              <a:ext uri="{FF2B5EF4-FFF2-40B4-BE49-F238E27FC236}">
+                <a16:creationId xmlns:a16="http://schemas.microsoft.com/office/drawing/2014/main" id="{CDC6F948-2F33-47A0-AE55-62E355ACC532}"/>
+              </a:ext>
+            </a:extLst>
+          </p:cNvPr>
+          <p:cNvSpPr>
+            <a:spLocks noGrp="1"/>
+          </p:cNvSpPr>
+          <p:nvPr>
+            <p:ph idx="1"/>
+          </p:nvPr>
+        </p:nvSpPr>
+        <p:spPr>
+          <a:xfrm>
+            <a:off x="477252" y="1296232"/>
+            <a:ext cx="11193379" cy="4226263"/>
+          </a:xfrm>
+        </p:spPr>
+        <p:txBody>
+          <a:bodyPr>
+            <a:noAutofit/>
+          </a:bodyPr>
+          <a:lstStyle/>
+          <a:p>
+            <a:pPr algn="just"/>
+            <a:r>
+              <a:rPr lang="en-US" sz="2300" dirty="0"/>
+              <a:t>Following modeling techniques should be consider for this assignment:</a:t>
+            </a:r>
+          </a:p>
+          <a:p>
+            <a:pPr lvl="1" algn="just"/>
+            <a:r>
+              <a:rPr lang="en-US" sz="1900" dirty="0"/>
+              <a:t>Decision Trees</a:t>
+            </a:r>
+          </a:p>
+          <a:p>
+            <a:pPr lvl="1" algn="just"/>
+            <a:r>
+              <a:rPr lang="en-US" sz="1900" dirty="0"/>
+              <a:t>K-Nearest Neighbors</a:t>
+            </a:r>
+          </a:p>
+          <a:p>
+            <a:pPr lvl="1" algn="just"/>
+            <a:r>
+              <a:rPr lang="en-US" sz="1900" dirty="0"/>
+              <a:t>Logistic Regression</a:t>
+            </a:r>
+          </a:p>
+          <a:p>
+            <a:pPr lvl="1" algn="just"/>
+            <a:r>
+              <a:rPr lang="en-US" sz="1900" dirty="0"/>
+              <a:t>SVM (Support Vector Machines)</a:t>
+            </a:r>
+            <a:endParaRPr lang="pl-PL" sz="1900" dirty="0"/>
+          </a:p>
+          <a:p>
+            <a:pPr lvl="1" algn="just"/>
+            <a:endParaRPr lang="pl-PL" sz="1900" dirty="0"/>
+          </a:p>
+          <a:p>
+            <a:pPr algn="just"/>
+            <a:r>
+              <a:rPr lang="en-US" sz="2300" dirty="0"/>
+              <a:t>Following evaluation metrics will be followed</a:t>
+            </a:r>
+            <a:r>
+              <a:rPr lang="pl-PL" sz="2300" dirty="0"/>
+              <a:t> in</a:t>
+            </a:r>
+            <a:r>
+              <a:rPr lang="en-US" sz="2300" dirty="0"/>
+              <a:t> this assignment:</a:t>
+            </a:r>
+            <a:endParaRPr lang="pl-PL" sz="2300" dirty="0"/>
+          </a:p>
+          <a:p>
+            <a:pPr lvl="1" algn="just"/>
+            <a:r>
+              <a:rPr lang="en-US" sz="1900" dirty="0"/>
+              <a:t>Accuracy</a:t>
+            </a:r>
+          </a:p>
+          <a:p>
+            <a:pPr lvl="1" algn="just"/>
+            <a:r>
+              <a:rPr lang="en-US" sz="1900" dirty="0"/>
+              <a:t>Precision and Recall  </a:t>
+            </a:r>
+            <a:endParaRPr lang="pl-PL" sz="1900" dirty="0"/>
+          </a:p>
+          <a:p>
+            <a:pPr lvl="1" algn="just"/>
+            <a:r>
+              <a:rPr lang="en-US" sz="1900" dirty="0"/>
+              <a:t>F1</a:t>
+            </a:r>
+            <a:r>
+              <a:rPr lang="pl-PL" sz="1900" dirty="0"/>
+              <a:t>/F2</a:t>
+            </a:r>
+            <a:r>
+              <a:rPr lang="en-US" sz="1900" dirty="0"/>
+              <a:t> Score</a:t>
+            </a:r>
+          </a:p>
+          <a:p>
+            <a:pPr lvl="1" algn="just"/>
+            <a:r>
+              <a:rPr lang="en-US" sz="1900" dirty="0"/>
+              <a:t>Lift and Gain</a:t>
+            </a:r>
+          </a:p>
+          <a:p>
+            <a:pPr lvl="1" algn="just"/>
+            <a:r>
+              <a:rPr lang="en-US" sz="1900" dirty="0"/>
+              <a:t>KS statistics</a:t>
+            </a:r>
+          </a:p>
+          <a:p>
+            <a:pPr lvl="1" algn="just"/>
+            <a:r>
+              <a:rPr lang="en-US" sz="1900" dirty="0"/>
+              <a:t>AUC-ROC</a:t>
+            </a:r>
+          </a:p>
+        </p:txBody>
+      </p:sp>
+      <p:sp>
+        <p:nvSpPr>
+          <p:cNvPr id="4" name="Title 1">
+            <a:extLst>
+              <a:ext uri="{FF2B5EF4-FFF2-40B4-BE49-F238E27FC236}">
+                <a16:creationId xmlns:a16="http://schemas.microsoft.com/office/drawing/2014/main" id="{F0FEE1CD-BF08-48FA-8526-5BEB92660675}"/>
+              </a:ext>
+            </a:extLst>
+          </p:cNvPr>
+          <p:cNvSpPr txBox="1">
+            <a:spLocks/>
+          </p:cNvSpPr>
+          <p:nvPr/>
+        </p:nvSpPr>
+        <p:spPr>
+          <a:xfrm rot="5400000">
+            <a:off x="5488404" y="-5488406"/>
+            <a:ext cx="1215190" cy="12192001"/>
+          </a:xfrm>
+          <a:prstGeom prst="rect">
+            <a:avLst/>
+          </a:prstGeom>
+          <a:solidFill>
+            <a:srgbClr val="3B3B3B"/>
+          </a:solidFill>
+        </p:spPr>
+        <p:txBody>
+          <a:bodyPr vert="vert270" lIns="91440" tIns="45720" rIns="91440" bIns="45720" rtlCol="0" anchor="ctr" anchorCtr="0">
+            <a:normAutofit/>
+          </a:bodyPr>
+          <a:lstStyle>
+            <a:lvl1pPr algn="l" defTabSz="914400" rtl="0" eaLnBrk="1" latinLnBrk="0" hangingPunct="1">
+              <a:lnSpc>
+                <a:spcPct val="90000"/>
+              </a:lnSpc>
+              <a:spcBef>
+                <a:spcPct val="0"/>
+              </a:spcBef>
+              <a:buNone/>
+              <a:defRPr sz="4400" kern="1200">
+                <a:solidFill>
+                  <a:schemeClr val="tx1"/>
+                </a:solidFill>
+                <a:latin typeface="+mj-lt"/>
+                <a:ea typeface="+mj-ea"/>
+                <a:cs typeface="+mj-cs"/>
+              </a:defRPr>
+            </a:lvl1pPr>
+          </a:lstStyle>
+          <a:p>
+            <a:pPr algn="ctr"/>
+            <a:r>
+              <a:rPr lang="pl-PL" b="1" dirty="0">
+                <a:solidFill>
+                  <a:srgbClr val="FF6600"/>
+                </a:solidFill>
+              </a:rPr>
+              <a:t>Technical </a:t>
+            </a:r>
+            <a:r>
+              <a:rPr lang="pl-PL" b="1" dirty="0" err="1">
+                <a:solidFill>
+                  <a:srgbClr val="FF6600"/>
+                </a:solidFill>
+              </a:rPr>
+              <a:t>aspects</a:t>
+            </a:r>
+            <a:r>
+              <a:rPr lang="pl-PL" b="1" dirty="0">
+                <a:solidFill>
+                  <a:srgbClr val="FF6600"/>
+                </a:solidFill>
+              </a:rPr>
+              <a:t> – </a:t>
+            </a:r>
+            <a:r>
+              <a:rPr lang="pl-PL" b="1" dirty="0" err="1">
+                <a:solidFill>
+                  <a:srgbClr val="FF6600"/>
+                </a:solidFill>
+              </a:rPr>
+              <a:t>recommended</a:t>
+            </a:r>
+            <a:r>
+              <a:rPr lang="pl-PL" b="1" dirty="0">
+                <a:solidFill>
+                  <a:srgbClr val="FF6600"/>
+                </a:solidFill>
+              </a:rPr>
+              <a:t> </a:t>
+            </a:r>
+            <a:r>
+              <a:rPr lang="pl-PL" b="1" dirty="0" err="1">
+                <a:solidFill>
+                  <a:srgbClr val="FF6600"/>
+                </a:solidFill>
+              </a:rPr>
+              <a:t>models</a:t>
+            </a:r>
+            <a:endParaRPr lang="en-US" b="1" dirty="0">
+              <a:solidFill>
+                <a:srgbClr val="FF6600"/>
+              </a:solidFill>
+            </a:endParaRPr>
+          </a:p>
+        </p:txBody>
+      </p:sp>
+    </p:spTree>
+    <p:extLst>
+      <p:ext uri="{BB962C8B-B14F-4D97-AF65-F5344CB8AC3E}">
+        <p14:creationId xmlns:p14="http://schemas.microsoft.com/office/powerpoint/2010/main" val="1837009852"/>
+      </p:ext>
+    </p:extLst>
+  </p:cSld>
+  <p:clrMapOvr>
+    <a:masterClrMapping/>
+  </p:clrMapOvr>
+</p:sld>
+</file>
+
+<file path=ppt/slides/slide21.xml><?xml version="1.0" encoding="utf-8"?>
+<p:sld xmlns:a="http://schemas.openxmlformats.org/drawingml/2006/main" xmlns:r="http://schemas.openxmlformats.org/officeDocument/2006/relationships" xmlns:p="http://schemas.openxmlformats.org/presentationml/2006/main">
+  <p:cSld>
+    <p:spTree>
+      <p:nvGrpSpPr>
+        <p:cNvPr id="1" name=""/>
+        <p:cNvGrpSpPr/>
+        <p:nvPr/>
+      </p:nvGrpSpPr>
+      <p:grpSpPr>
+        <a:xfrm>
+          <a:off x="0" y="0"/>
+          <a:ext cx="0" cy="0"/>
+          <a:chOff x="0" y="0"/>
+          <a:chExt cx="0" cy="0"/>
+        </a:xfrm>
+      </p:grpSpPr>
+      <p:sp>
+        <p:nvSpPr>
+          <p:cNvPr id="2" name="Title 1">
+            <a:extLst>
+              <a:ext uri="{FF2B5EF4-FFF2-40B4-BE49-F238E27FC236}">
+                <a16:creationId xmlns:a16="http://schemas.microsoft.com/office/drawing/2014/main" id="{E8B8F26E-9345-4747-9094-972E38700A17}"/>
+              </a:ext>
+            </a:extLst>
+          </p:cNvPr>
+          <p:cNvSpPr>
+            <a:spLocks noGrp="1"/>
+          </p:cNvSpPr>
+          <p:nvPr>
+            <p:ph type="ctrTitle"/>
+          </p:nvPr>
+        </p:nvSpPr>
+        <p:spPr>
+          <a:xfrm rot="5400000">
+            <a:off x="-562431" y="562430"/>
+            <a:ext cx="6858002" cy="5733142"/>
+          </a:xfrm>
+          <a:solidFill>
+            <a:srgbClr val="3B3B3B"/>
+          </a:solidFill>
+        </p:spPr>
+        <p:txBody>
+          <a:bodyPr vert="vert270" anchor="t" anchorCtr="0"/>
+          <a:lstStyle/>
+          <a:p>
+            <a:endParaRPr lang="en-US" b="1" dirty="0">
+              <a:solidFill>
+                <a:srgbClr val="FF6600"/>
+              </a:solidFill>
+            </a:endParaRPr>
+          </a:p>
+        </p:txBody>
+      </p:sp>
+      <p:pic>
+        <p:nvPicPr>
+          <p:cNvPr id="4" name="Picture 3">
+            <a:extLst>
+              <a:ext uri="{FF2B5EF4-FFF2-40B4-BE49-F238E27FC236}">
+                <a16:creationId xmlns:a16="http://schemas.microsoft.com/office/drawing/2014/main" id="{7A465064-0714-5743-882B-8875105A7023}"/>
+              </a:ext>
+            </a:extLst>
+          </p:cNvPr>
+          <p:cNvPicPr>
+            <a:picLocks noChangeAspect="1"/>
+          </p:cNvPicPr>
+          <p:nvPr/>
+        </p:nvPicPr>
+        <p:blipFill>
+          <a:blip r:embed="rId2" cstate="print">
+            <a:extLst>
+              <a:ext uri="{28A0092B-C50C-407E-A947-70E740481C1C}">
+                <a14:useLocalDpi xmlns:a14="http://schemas.microsoft.com/office/drawing/2010/main" val="0"/>
+              </a:ext>
+            </a:extLst>
+          </a:blip>
+          <a:stretch>
+            <a:fillRect/>
+          </a:stretch>
+        </p:blipFill>
+        <p:spPr>
+          <a:xfrm>
+            <a:off x="0" y="5863771"/>
+            <a:ext cx="1654627" cy="994232"/>
+          </a:xfrm>
+          <a:prstGeom prst="rect">
+            <a:avLst/>
+          </a:prstGeom>
+        </p:spPr>
+      </p:pic>
+      <p:sp>
+        <p:nvSpPr>
+          <p:cNvPr id="6" name="Subtitle 5">
+            <a:extLst>
+              <a:ext uri="{FF2B5EF4-FFF2-40B4-BE49-F238E27FC236}">
+                <a16:creationId xmlns:a16="http://schemas.microsoft.com/office/drawing/2014/main" id="{2D4BA697-580E-5544-8F2F-194AD99B859F}"/>
+              </a:ext>
+            </a:extLst>
+          </p:cNvPr>
+          <p:cNvSpPr>
+            <a:spLocks noGrp="1"/>
+          </p:cNvSpPr>
+          <p:nvPr>
+            <p:ph type="subTitle" idx="1"/>
+          </p:nvPr>
+        </p:nvSpPr>
+        <p:spPr>
+          <a:xfrm>
+            <a:off x="5152570" y="2481943"/>
+            <a:ext cx="5558973" cy="1655762"/>
+          </a:xfrm>
+        </p:spPr>
+        <p:txBody>
+          <a:bodyPr>
+            <a:normAutofit/>
+          </a:bodyPr>
+          <a:lstStyle/>
+          <a:p>
+            <a:r>
+              <a:rPr lang="en-US" sz="6600" dirty="0">
+                <a:solidFill>
+                  <a:srgbClr val="FF6600"/>
+                </a:solidFill>
+              </a:rPr>
+              <a:t>Thank You</a:t>
+            </a:r>
+          </a:p>
+          <a:p>
+            <a:endParaRPr lang="en-US" sz="6600" dirty="0">
+              <a:solidFill>
+                <a:srgbClr val="FF6600"/>
+              </a:solidFill>
+            </a:endParaRPr>
+          </a:p>
+        </p:txBody>
+      </p:sp>
+    </p:spTree>
+    <p:extLst>
+      <p:ext uri="{BB962C8B-B14F-4D97-AF65-F5344CB8AC3E}">
+        <p14:creationId xmlns:p14="http://schemas.microsoft.com/office/powerpoint/2010/main" val="116821060"/>
+      </p:ext>
+    </p:extLst>
+  </p:cSld>
+  <p:clrMapOvr>
+    <a:masterClrMapping/>
+  </p:clrMapOvr>
+</p:sld>
+</file>
+
 <file path=ppt/slides/slide3.xml><?xml version="1.0" encoding="utf-8"?>
 <p:sld xmlns:a="http://schemas.openxmlformats.org/drawingml/2006/main" xmlns:r="http://schemas.openxmlformats.org/officeDocument/2006/relationships" xmlns:p="http://schemas.openxmlformats.org/presentationml/2006/main">
   <p:cSld>
@@ -6725,134 +8722,89 @@
         <p:spPr/>
         <p:txBody>
           <a:bodyPr>
-            <a:normAutofit fontScale="92500" lnSpcReduction="20000"/>
+            <a:normAutofit fontScale="85000" lnSpcReduction="20000"/>
           </a:bodyPr>
           <a:lstStyle/>
           <a:p>
             <a:pPr algn="just"/>
             <a:r>
               <a:rPr lang="en-US" dirty="0"/>
-              <a:t>Descriptive, correlation and contextual analysis were made to help </a:t>
-            </a:r>
-            <a:r>
-              <a:rPr lang="pl-PL" dirty="0"/>
-              <a:t>the </a:t>
-            </a:r>
+              <a:t>Descriptive, correlation and contextual analysis were made to help the Pharmaceutical company to improve patient adherence to their drug through data-driven insights.</a:t>
+            </a:r>
+          </a:p>
+          <a:p>
+            <a:pPr algn="just"/>
             <a:r>
               <a:rPr lang="en-US" dirty="0"/>
-              <a:t>Pharmaceutical company</a:t>
-            </a:r>
-            <a:r>
-              <a:rPr lang="pl-PL" dirty="0"/>
-              <a:t> </a:t>
-            </a:r>
+              <a:t>Prior to EDA data set was cleansed of missing values and outliers.</a:t>
+            </a:r>
+          </a:p>
+          <a:p>
+            <a:pPr algn="just"/>
             <a:r>
               <a:rPr lang="en-US" dirty="0"/>
-              <a:t>to improve patient adherence to their drug through data-driven insights.</a:t>
-            </a:r>
-          </a:p>
-          <a:p>
-            <a:pPr algn="just"/>
-            <a:r>
-              <a:rPr lang="pl-PL" dirty="0"/>
-              <a:t>8</a:t>
-            </a:r>
+              <a:t>8 hypothesis were constructed to gain knowledge on the subject and formulate final recommendation on features and model selection. Main topics included:</a:t>
+            </a:r>
+          </a:p>
+          <a:p>
+            <a:pPr lvl="1" algn="just"/>
             <a:r>
               <a:rPr lang="en-US" dirty="0"/>
-              <a:t> hypothesis were constructed to gain knowledge on the subject and formulate final recommendation</a:t>
-            </a:r>
-            <a:r>
-              <a:rPr lang="pl-PL" dirty="0"/>
-              <a:t> on </a:t>
-            </a:r>
-            <a:r>
-              <a:rPr lang="pl-PL" dirty="0" err="1"/>
-              <a:t>features</a:t>
-            </a:r>
-            <a:r>
-              <a:rPr lang="pl-PL" dirty="0"/>
-              <a:t> and model </a:t>
-            </a:r>
-            <a:r>
-              <a:rPr lang="pl-PL" dirty="0" err="1"/>
-              <a:t>selection</a:t>
-            </a:r>
+              <a:t>Importance of CT scan</a:t>
+            </a:r>
+          </a:p>
+          <a:p>
+            <a:pPr lvl="1" algn="just"/>
             <a:r>
               <a:rPr lang="en-US" dirty="0"/>
-              <a:t>. Main topics included:</a:t>
+              <a:t>Risks impact</a:t>
             </a:r>
           </a:p>
           <a:p>
             <a:pPr lvl="1" algn="just"/>
             <a:r>
-              <a:rPr lang="pl-PL" dirty="0" err="1"/>
-              <a:t>importance</a:t>
-            </a:r>
-            <a:r>
-              <a:rPr lang="pl-PL" dirty="0"/>
-              <a:t> of CT </a:t>
-            </a:r>
-            <a:r>
-              <a:rPr lang="pl-PL" dirty="0" err="1"/>
-              <a:t>scan</a:t>
-            </a:r>
-            <a:endParaRPr lang="en-US" dirty="0"/>
+              <a:rPr lang="en-US" dirty="0"/>
+              <a:t>Demographics</a:t>
+            </a:r>
           </a:p>
           <a:p>
             <a:pPr lvl="1" algn="just"/>
             <a:r>
-              <a:rPr lang="pl-PL" dirty="0"/>
+              <a:rPr lang="en-US" dirty="0"/>
+              <a:t>Effect of provider attributes</a:t>
+            </a:r>
+          </a:p>
+          <a:p>
+            <a:pPr lvl="1" algn="just"/>
+            <a:r>
+              <a:rPr lang="en-US" dirty="0"/>
+              <a:t>Effect of glucose</a:t>
+            </a:r>
+          </a:p>
+          <a:p>
+            <a:pPr lvl="1" algn="just"/>
+            <a:r>
+              <a:rPr lang="en-US" dirty="0"/>
+              <a:t>Side effects</a:t>
+            </a:r>
+          </a:p>
+          <a:p>
+            <a:pPr lvl="1" algn="just"/>
+            <a:r>
+              <a:rPr lang="en-US" dirty="0"/>
+              <a:t>Most frequent risks</a:t>
+            </a:r>
+          </a:p>
+          <a:p>
+            <a:pPr lvl="1" algn="just"/>
+            <a:r>
+              <a:rPr lang="en-US" dirty="0">
+                <a:highlight>
+                  <a:srgbClr val="FFFF00"/>
+                </a:highlight>
+              </a:rPr>
               <a:t>…</a:t>
             </a:r>
-            <a:endParaRPr lang="en-US" dirty="0"/>
-          </a:p>
-          <a:p>
-            <a:pPr lvl="1" algn="just"/>
-            <a:r>
-              <a:rPr lang="pl-PL" dirty="0"/>
-              <a:t>…</a:t>
-            </a:r>
-            <a:endParaRPr lang="en-US" dirty="0"/>
-          </a:p>
-          <a:p>
-            <a:pPr lvl="1" algn="just"/>
-            <a:r>
-              <a:rPr lang="pl-PL" dirty="0"/>
-              <a:t>…</a:t>
-            </a:r>
-            <a:endParaRPr lang="en-US" dirty="0"/>
-          </a:p>
-          <a:p>
-            <a:pPr lvl="1" algn="just"/>
-            <a:r>
-              <a:rPr lang="pl-PL" dirty="0"/>
-              <a:t>…</a:t>
-            </a:r>
-            <a:endParaRPr lang="en-US" dirty="0"/>
-          </a:p>
-          <a:p>
-            <a:pPr lvl="1" algn="just"/>
-            <a:r>
-              <a:rPr lang="pl-PL" dirty="0"/>
-              <a:t>…</a:t>
-            </a:r>
-            <a:endParaRPr lang="en-US" dirty="0"/>
-          </a:p>
-          <a:p>
-            <a:pPr lvl="1" algn="just"/>
-            <a:r>
-              <a:rPr lang="pl-PL" dirty="0"/>
-              <a:t>…</a:t>
-            </a:r>
-            <a:endParaRPr lang="en-US" dirty="0"/>
-          </a:p>
-          <a:p>
-            <a:pPr lvl="1" algn="just"/>
-            <a:r>
-              <a:rPr lang="pl-PL" dirty="0"/>
-              <a:t>…</a:t>
-            </a:r>
-            <a:endParaRPr lang="en-US" dirty="0"/>
           </a:p>
           <a:p>
             <a:pPr lvl="1" algn="just"/>
@@ -7384,21 +9336,41 @@
           <a:p>
             <a:r>
               <a:rPr lang="pl-PL" dirty="0"/>
-              <a:t>…</a:t>
-            </a:r>
-          </a:p>
-          <a:p>
-            <a:r>
-              <a:rPr lang="pl-PL" dirty="0"/>
-              <a:t>…</a:t>
-            </a:r>
-          </a:p>
-          <a:p>
-            <a:r>
-              <a:rPr lang="pl-PL" dirty="0"/>
-              <a:t>…</a:t>
-            </a:r>
-            <a:endParaRPr lang="en-AU" dirty="0"/>
+              <a:t>„cleaned_data.csv”:</a:t>
+            </a:r>
+          </a:p>
+          <a:p>
+            <a:pPr lvl="1"/>
+            <a:r>
+              <a:rPr lang="en-US" dirty="0"/>
+              <a:t>67 features</a:t>
+            </a:r>
+          </a:p>
+          <a:p>
+            <a:pPr lvl="1"/>
+            <a:r>
+              <a:rPr lang="en-US" dirty="0"/>
+              <a:t>2004 data entries</a:t>
+            </a:r>
+          </a:p>
+          <a:p>
+            <a:pPr lvl="1"/>
+            <a:r>
+              <a:rPr lang="en-US" dirty="0"/>
+              <a:t>Cleaned of missing values</a:t>
+            </a:r>
+          </a:p>
+          <a:p>
+            <a:pPr lvl="1"/>
+            <a:r>
+              <a:rPr lang="en-US" dirty="0"/>
+              <a:t>Cleaned of </a:t>
+            </a:r>
+            <a:r>
+              <a:rPr lang="en-US" dirty="0" err="1"/>
+              <a:t>outlifers</a:t>
+            </a:r>
+            <a:endParaRPr lang="en-US" dirty="0"/>
           </a:p>
         </p:txBody>
       </p:sp>
@@ -7459,31 +9431,7 @@
                   <a:srgbClr val="FF6600"/>
                 </a:solidFill>
               </a:rPr>
-              <a:t>EDA – </a:t>
-            </a:r>
-            <a:r>
-              <a:rPr lang="pl-PL" b="1" dirty="0" err="1">
-                <a:solidFill>
-                  <a:srgbClr val="FF6600"/>
-                </a:solidFill>
-              </a:rPr>
-              <a:t>provided</a:t>
-            </a:r>
-            <a:r>
-              <a:rPr lang="pl-PL" b="1" dirty="0">
-                <a:solidFill>
-                  <a:srgbClr val="FF6600"/>
-                </a:solidFill>
-              </a:rPr>
-              <a:t> data </a:t>
-            </a:r>
-            <a:r>
-              <a:rPr lang="pl-PL" b="1" dirty="0" err="1">
-                <a:solidFill>
-                  <a:srgbClr val="FF6600"/>
-                </a:solidFill>
-              </a:rPr>
-              <a:t>sets</a:t>
+              <a:t>EDA – data set</a:t>
             </a:r>
             <a:endParaRPr lang="en-US" b="1" dirty="0">
               <a:solidFill>
@@ -7542,7 +9490,7 @@
         <p:spPr/>
         <p:txBody>
           <a:bodyPr>
-            <a:normAutofit fontScale="92500" lnSpcReduction="20000"/>
+            <a:normAutofit fontScale="85000" lnSpcReduction="20000"/>
           </a:bodyPr>
           <a:lstStyle/>
           <a:p>
@@ -7583,7 +9531,19 @@
           <a:p>
             <a:r>
               <a:rPr lang="en-US" dirty="0"/>
-              <a:t>Hypothesis no. 2: Side effect analysis based on patients condition since taking the drugs</a:t>
+              <a:t>Hypothesis no. </a:t>
+            </a:r>
+            <a:r>
+              <a:rPr lang="pl-PL" dirty="0"/>
+              <a:t>2</a:t>
+            </a:r>
+            <a:r>
+              <a:rPr lang="en-US" dirty="0"/>
+              <a:t>: Features associated with “Risk” in data set are very important classifier of drug persistency</a:t>
+            </a:r>
+            <a:r>
+              <a:rPr lang="pl-PL" dirty="0"/>
+              <a:t>?</a:t>
             </a:r>
           </a:p>
           <a:p>
@@ -7592,15 +9552,95 @@
               <a:t>Hypothesis no. </a:t>
             </a:r>
             <a:r>
-              <a:rPr lang="en-US"/>
-              <a:t>3: Most frequent risks</a:t>
+              <a:rPr lang="pl-PL" dirty="0"/>
+              <a:t>3: </a:t>
+            </a:r>
+            <a:r>
+              <a:rPr lang="en-US" dirty="0"/>
+              <a:t>Effects of Demographics on persistency of drugs?</a:t>
+            </a:r>
+            <a:endParaRPr lang="pl-PL" dirty="0"/>
+          </a:p>
+          <a:p>
+            <a:r>
+              <a:rPr lang="en-US" dirty="0"/>
+              <a:t>Hypothesis no. </a:t>
+            </a:r>
+            <a:r>
+              <a:rPr lang="pl-PL" dirty="0"/>
+              <a:t>4: </a:t>
+            </a:r>
+            <a:r>
+              <a:rPr lang="en-US" dirty="0"/>
+              <a:t>Effects of provider attributes on the persistency?</a:t>
+            </a:r>
+            <a:endParaRPr lang="pl-PL" dirty="0"/>
+          </a:p>
+          <a:p>
+            <a:r>
+              <a:rPr lang="en-US" dirty="0"/>
+              <a:t>Hypothesis no. </a:t>
+            </a:r>
+            <a:r>
+              <a:rPr lang="pl-PL" dirty="0"/>
+              <a:t>5: </a:t>
+            </a:r>
+            <a:r>
+              <a:rPr lang="en-US" dirty="0"/>
+              <a:t>Effects of Glucose record During Rx?</a:t>
+            </a:r>
+            <a:endParaRPr lang="pl-PL" dirty="0"/>
+          </a:p>
+          <a:p>
+            <a:r>
+              <a:rPr lang="en-US" dirty="0"/>
+              <a:t>Hypothesis no. </a:t>
+            </a:r>
+            <a:r>
+              <a:rPr lang="pl-PL" dirty="0"/>
+              <a:t>6</a:t>
+            </a:r>
+            <a:r>
+              <a:rPr lang="en-US" dirty="0"/>
+              <a:t>: Side effect analysis based on patients condition since taking the drugs</a:t>
+            </a:r>
+            <a:r>
+              <a:rPr lang="pl-PL" dirty="0"/>
+              <a:t>?</a:t>
+            </a:r>
+            <a:endParaRPr lang="en-US" dirty="0"/>
+          </a:p>
+          <a:p>
+            <a:r>
+              <a:rPr lang="en-US" dirty="0"/>
+              <a:t>Hypothesis no. </a:t>
+            </a:r>
+            <a:r>
+              <a:rPr lang="pl-PL" dirty="0"/>
+              <a:t>7</a:t>
+            </a:r>
+            <a:r>
+              <a:rPr lang="en-US" dirty="0"/>
+              <a:t>: Most frequent risks</a:t>
+            </a:r>
+            <a:r>
+              <a:rPr lang="pl-PL" dirty="0"/>
+              <a:t>?</a:t>
             </a:r>
             <a:endParaRPr lang="en-AU" dirty="0"/>
           </a:p>
           <a:p>
             <a:r>
               <a:rPr lang="en-US" dirty="0"/>
-              <a:t>Hypothesis no. 4: </a:t>
+              <a:t>Hypothesis no. </a:t>
+            </a:r>
+            <a:r>
+              <a:rPr lang="pl-PL" dirty="0"/>
+              <a:t>8</a:t>
+            </a:r>
+            <a:r>
+              <a:rPr lang="en-US" dirty="0"/>
+              <a:t>: </a:t>
             </a:r>
             <a:r>
               <a:rPr lang="pl-PL" dirty="0"/>
@@ -7610,82 +9650,6 @@
               <a:rPr lang="en-AU" dirty="0"/>
               <a:t>.</a:t>
             </a:r>
-          </a:p>
-          <a:p>
-            <a:r>
-              <a:rPr lang="en-US" dirty="0"/>
-              <a:t>Hypothesis no. 5: </a:t>
-            </a:r>
-            <a:r>
-              <a:rPr lang="pl-PL" dirty="0"/>
-              <a:t>..</a:t>
-            </a:r>
-            <a:r>
-              <a:rPr lang="en-AU" dirty="0"/>
-              <a:t>.</a:t>
-            </a:r>
-          </a:p>
-          <a:p>
-            <a:r>
-              <a:rPr lang="en-US" dirty="0"/>
-              <a:t>Hypothesis no. 6: </a:t>
-            </a:r>
-            <a:r>
-              <a:rPr lang="pl-PL" dirty="0"/>
-              <a:t>..</a:t>
-            </a:r>
-            <a:r>
-              <a:rPr lang="en-AU" dirty="0"/>
-              <a:t>.</a:t>
-            </a:r>
-            <a:endParaRPr lang="pl-PL" dirty="0"/>
-          </a:p>
-          <a:p>
-            <a:r>
-              <a:rPr lang="en-US" dirty="0"/>
-              <a:t>Hypothesis no. </a:t>
-            </a:r>
-            <a:r>
-              <a:rPr lang="pl-PL" dirty="0"/>
-              <a:t>7</a:t>
-            </a:r>
-            <a:r>
-              <a:rPr lang="en-US" dirty="0"/>
-              <a:t>: </a:t>
-            </a:r>
-            <a:r>
-              <a:rPr lang="pl-PL" dirty="0"/>
-              <a:t>..</a:t>
-            </a:r>
-            <a:r>
-              <a:rPr lang="en-AU" dirty="0"/>
-              <a:t>.</a:t>
-            </a:r>
-          </a:p>
-          <a:p>
-            <a:r>
-              <a:rPr lang="en-US" dirty="0"/>
-              <a:t>Hypothesis no. </a:t>
-            </a:r>
-            <a:r>
-              <a:rPr lang="pl-PL" dirty="0"/>
-              <a:t>8</a:t>
-            </a:r>
-            <a:r>
-              <a:rPr lang="en-US" dirty="0"/>
-              <a:t>: </a:t>
-            </a:r>
-            <a:r>
-              <a:rPr lang="pl-PL" dirty="0"/>
-              <a:t>..</a:t>
-            </a:r>
-            <a:r>
-              <a:rPr lang="en-AU" dirty="0"/>
-              <a:t>.</a:t>
-            </a:r>
-          </a:p>
-          <a:p>
-            <a:endParaRPr lang="en-AU" dirty="0"/>
           </a:p>
         </p:txBody>
       </p:sp>
@@ -8068,41 +10032,37 @@
         </p:nvSpPr>
         <p:spPr>
           <a:xfrm>
-            <a:off x="446739" y="1393140"/>
-            <a:ext cx="11410719" cy="5327749"/>
+            <a:off x="5159111" y="1393140"/>
+            <a:ext cx="6728089" cy="1542564"/>
           </a:xfrm>
         </p:spPr>
         <p:txBody>
           <a:bodyPr>
-            <a:normAutofit/>
+            <a:normAutofit fontScale="92500" lnSpcReduction="20000"/>
           </a:bodyPr>
           <a:lstStyle/>
           <a:p>
             <a:pPr algn="just"/>
-            <a:endParaRPr lang="pl-PL" dirty="0"/>
-          </a:p>
-          <a:p>
-            <a:pPr algn="just"/>
-            <a:endParaRPr lang="pl-PL" dirty="0"/>
-          </a:p>
-          <a:p>
-            <a:pPr algn="just"/>
-            <a:endParaRPr lang="pl-PL" dirty="0"/>
-          </a:p>
-          <a:p>
-            <a:pPr algn="just"/>
-            <a:endParaRPr lang="pl-PL" dirty="0"/>
-          </a:p>
-          <a:p>
-            <a:pPr algn="just"/>
-            <a:endParaRPr lang="pl-PL" dirty="0"/>
-          </a:p>
-          <a:p>
-            <a:pPr algn="just"/>
-            <a:endParaRPr lang="pl-PL" dirty="0"/>
-          </a:p>
-          <a:p>
-            <a:pPr algn="just"/>
+            <a:r>
+              <a:rPr lang="en-US" dirty="0"/>
+              <a:t>Features: "</a:t>
+            </a:r>
+            <a:r>
+              <a:rPr lang="en-US" dirty="0" err="1"/>
+              <a:t>Risk_Segment_Prior_Ntm</a:t>
+            </a:r>
+            <a:r>
+              <a:rPr lang="en-US" dirty="0"/>
+              <a:t>" and "</a:t>
+            </a:r>
+            <a:r>
+              <a:rPr lang="en-US" dirty="0" err="1"/>
+              <a:t>Risk_Segment_During_Rx</a:t>
+            </a:r>
+            <a:r>
+              <a:rPr lang="en-US" dirty="0"/>
+              <a:t>" have nearly same values. Difference between this 2 features is around 3%. Therefore suggestion is to take only one of this features for modeling.</a:t>
+            </a:r>
             <a:endParaRPr lang="pl-PL" dirty="0"/>
           </a:p>
         </p:txBody>
@@ -8135,7 +10095,7 @@
         </p:spPr>
         <p:txBody>
           <a:bodyPr vert="vert270" lIns="91440" tIns="45720" rIns="91440" bIns="45720" rtlCol="0" anchor="ctr" anchorCtr="0">
-            <a:normAutofit fontScale="92500"/>
+            <a:normAutofit fontScale="92500" lnSpcReduction="10000"/>
           </a:bodyPr>
           <a:lstStyle>
             <a:lvl1pPr algn="l" defTabSz="914400" rtl="0" eaLnBrk="1" latinLnBrk="0" hangingPunct="1">
@@ -8164,36 +10124,60 @@
                   <a:srgbClr val="FF6600"/>
                 </a:solidFill>
               </a:rPr>
-              <a:t>EDA - Hypothesis no. 2</a:t>
+              <a:t>EDA - Hypothesis no. </a:t>
+            </a:r>
+            <a:r>
+              <a:rPr lang="pl-PL" b="1" dirty="0">
+                <a:solidFill>
+                  <a:srgbClr val="FF6600"/>
+                </a:solidFill>
+              </a:rPr>
+              <a:t>2 </a:t>
             </a:r>
           </a:p>
           <a:p>
             <a:pPr algn="ctr"/>
             <a:r>
-              <a:rPr lang="pl-PL" sz="3400" b="1" dirty="0">
+              <a:rPr lang="pl-PL" b="1" dirty="0">
                 <a:solidFill>
                   <a:srgbClr val="FF6600"/>
                 </a:solidFill>
               </a:rPr>
-              <a:t> „</a:t>
-            </a:r>
-            <a:r>
-              <a:rPr lang="en-US" sz="3400" b="1" dirty="0">
+              <a:t>„RISK </a:t>
+            </a:r>
+            <a:r>
+              <a:rPr lang="pl-PL" b="1" dirty="0" err="1">
                 <a:solidFill>
                   <a:srgbClr val="FF6600"/>
                 </a:solidFill>
               </a:rPr>
-              <a:t>Side effect analysis based on patients condition since taking the drugs</a:t>
-            </a:r>
-            <a:r>
-              <a:rPr lang="pl-PL" sz="3400" b="1" dirty="0">
+              <a:t>features</a:t>
+            </a:r>
+            <a:r>
+              <a:rPr lang="pl-PL" b="1" dirty="0">
+                <a:solidFill>
+                  <a:srgbClr val="FF6600"/>
+                </a:solidFill>
+              </a:rPr>
+              <a:t> as</a:t>
+            </a:r>
+            <a:r>
+              <a:rPr lang="en-US" b="1" dirty="0">
+                <a:solidFill>
+                  <a:srgbClr val="FF6600"/>
+                </a:solidFill>
+              </a:rPr>
+              <a:t> important classifier of drug persistency</a:t>
+            </a:r>
+            <a:r>
+              <a:rPr lang="pl-PL" b="1" dirty="0">
                 <a:solidFill>
                   <a:srgbClr val="FF6600"/>
                 </a:solidFill>
               </a:rPr>
               <a:t>”</a:t>
             </a:r>
-            <a:endParaRPr lang="en-US" sz="3400" b="1" dirty="0">
+            <a:endParaRPr lang="en-US" b="1" dirty="0">
               <a:solidFill>
                 <a:srgbClr val="FF6600"/>
               </a:solidFill>
@@ -8201,72 +10185,12 @@
           </a:p>
         </p:txBody>
       </p:sp>
-      <p:sp>
-        <p:nvSpPr>
-          <p:cNvPr id="2" name="TextBox 1">
+      <p:pic>
+        <p:nvPicPr>
+          <p:cNvPr id="6" name="Obraz 5">
             <a:extLst>
               <a:ext uri="{FF2B5EF4-FFF2-40B4-BE49-F238E27FC236}">
-                <a16:creationId xmlns:a16="http://schemas.microsoft.com/office/drawing/2014/main" id="{54593952-0983-4F47-9812-9069F76BD06A}"/>
-              </a:ext>
-            </a:extLst>
-          </p:cNvPr>
-          <p:cNvSpPr txBox="1"/>
-          <p:nvPr/>
-        </p:nvSpPr>
-        <p:spPr>
-          <a:xfrm>
-            <a:off x="6727372" y="1393140"/>
-            <a:ext cx="4599992" cy="4524315"/>
-          </a:xfrm>
-          <a:prstGeom prst="rect">
-            <a:avLst/>
-          </a:prstGeom>
-          <a:noFill/>
-        </p:spPr>
-        <p:txBody>
-          <a:bodyPr wrap="square" rtlCol="0">
-            <a:spAutoFit/>
-          </a:bodyPr>
-          <a:lstStyle/>
-          <a:p>
-            <a:pPr marL="285750" indent="-285750">
-              <a:buFont typeface="Arial" panose="020B0604020202020204" pitchFamily="34" charset="0"/>
-              <a:buChar char="•"/>
-            </a:pPr>
-            <a:r>
-              <a:rPr lang="en-US" dirty="0"/>
-              <a:t> After dealing with the Nan values, the graph consulted shows that most of the patients had no side effects, but they neither improved their condition.</a:t>
-            </a:r>
-          </a:p>
-          <a:p>
-            <a:pPr marL="285750" indent="-285750">
-              <a:buFont typeface="Arial" panose="020B0604020202020204" pitchFamily="34" charset="0"/>
-              <a:buChar char="•"/>
-            </a:pPr>
-            <a:r>
-              <a:rPr lang="en-US" dirty="0"/>
-              <a:t>This is an example where the dominant category will definitely influence learning only one category and will be of no use when training, and no influence over declaring the persistency of a drug.</a:t>
-            </a:r>
-          </a:p>
-          <a:p>
-            <a:pPr marL="285750" indent="-285750">
-              <a:buFont typeface="Arial" panose="020B0604020202020204" pitchFamily="34" charset="0"/>
-              <a:buChar char="•"/>
-            </a:pPr>
-            <a:r>
-              <a:rPr lang="en-US" dirty="0"/>
-              <a:t> For this reason along with consideration of the very small appearance number of the two categories in the dataset, the two categories “Worsened” and “Improved” can be considered outliers. Therefore, after outliers removal, this column will not even exist.</a:t>
-            </a:r>
-            <a:endParaRPr lang="pl-PL" dirty="0"/>
-          </a:p>
-        </p:txBody>
-      </p:sp>
-      <p:pic>
-        <p:nvPicPr>
-          <p:cNvPr id="7" name="Picture 6">
-            <a:extLst>
-              <a:ext uri="{FF2B5EF4-FFF2-40B4-BE49-F238E27FC236}">
-                <a16:creationId xmlns:a16="http://schemas.microsoft.com/office/drawing/2014/main" id="{6753BF89-C4B6-46CD-9680-7A04893F2CFD}"/>
+                <a16:creationId xmlns:a16="http://schemas.microsoft.com/office/drawing/2014/main" id="{93F0C90B-75A4-4EE9-A670-88D8F0BA6E83}"/>
               </a:ext>
             </a:extLst>
           </p:cNvPr>
@@ -8283,18 +10207,110 @@
         </p:blipFill>
         <p:spPr>
           <a:xfrm>
-            <a:off x="715268" y="1632255"/>
-            <a:ext cx="5743575" cy="4046084"/>
+            <a:off x="774013" y="1393140"/>
+            <a:ext cx="3858163" cy="952633"/>
           </a:xfrm>
           <a:prstGeom prst="rect">
             <a:avLst/>
           </a:prstGeom>
         </p:spPr>
       </p:pic>
+      <p:pic>
+        <p:nvPicPr>
+          <p:cNvPr id="9" name="Obraz 8">
+            <a:extLst>
+              <a:ext uri="{FF2B5EF4-FFF2-40B4-BE49-F238E27FC236}">
+                <a16:creationId xmlns:a16="http://schemas.microsoft.com/office/drawing/2014/main" id="{3CBC7FF4-559B-4FC3-8235-ADCA753D42A7}"/>
+              </a:ext>
+            </a:extLst>
+          </p:cNvPr>
+          <p:cNvPicPr>
+            <a:picLocks noChangeAspect="1"/>
+          </p:cNvPicPr>
+          <p:nvPr/>
+        </p:nvPicPr>
+        <p:blipFill>
+          <a:blip r:embed="rId3"/>
+          <a:stretch>
+            <a:fillRect/>
+          </a:stretch>
+        </p:blipFill>
+        <p:spPr>
+          <a:xfrm>
+            <a:off x="168442" y="2935704"/>
+            <a:ext cx="7925227" cy="3698439"/>
+          </a:xfrm>
+          <a:prstGeom prst="rect">
+            <a:avLst/>
+          </a:prstGeom>
+        </p:spPr>
+      </p:pic>
+      <p:sp>
+        <p:nvSpPr>
+          <p:cNvPr id="11" name="pole tekstowe 10">
+            <a:extLst>
+              <a:ext uri="{FF2B5EF4-FFF2-40B4-BE49-F238E27FC236}">
+                <a16:creationId xmlns:a16="http://schemas.microsoft.com/office/drawing/2014/main" id="{F9D4C8FC-A208-41EC-B784-B3722E694791}"/>
+              </a:ext>
+            </a:extLst>
+          </p:cNvPr>
+          <p:cNvSpPr txBox="1"/>
+          <p:nvPr/>
+        </p:nvSpPr>
+        <p:spPr>
+          <a:xfrm>
+            <a:off x="8093669" y="4029588"/>
+            <a:ext cx="3793531" cy="1510670"/>
+          </a:xfrm>
+          <a:prstGeom prst="rect">
+            <a:avLst/>
+          </a:prstGeom>
+          <a:noFill/>
+        </p:spPr>
+        <p:txBody>
+          <a:bodyPr wrap="square">
+            <a:spAutoFit/>
+          </a:bodyPr>
+          <a:lstStyle/>
+          <a:p>
+            <a:pPr marL="228600" indent="-228600" algn="just">
+              <a:lnSpc>
+                <a:spcPct val="70000"/>
+              </a:lnSpc>
+              <a:spcBef>
+                <a:spcPts val="1000"/>
+              </a:spcBef>
+              <a:buFont typeface="Arial" panose="020B0604020202020204" pitchFamily="34" charset="0"/>
+              <a:buChar char="•"/>
+            </a:pPr>
+            <a:r>
+              <a:rPr lang="en-US" sz="2600" dirty="0"/>
+              <a:t>For modeling should be taken all of the features from </a:t>
+            </a:r>
+            <a:r>
+              <a:rPr lang="en-US" sz="2600" dirty="0" err="1"/>
+              <a:t>df_risks</a:t>
+            </a:r>
+            <a:r>
+              <a:rPr lang="en-US" sz="2600" dirty="0"/>
+              <a:t> apart “</a:t>
+            </a:r>
+            <a:r>
+              <a:rPr lang="en-US" sz="2600" dirty="0" err="1"/>
+              <a:t>Risk_Segment_During_Rx_labels</a:t>
+            </a:r>
+            <a:r>
+              <a:rPr lang="en-US" sz="2600" dirty="0"/>
+              <a:t>”.</a:t>
+            </a:r>
+            <a:endParaRPr lang="pl-PL" sz="2600" dirty="0"/>
+          </a:p>
+        </p:txBody>
+      </p:sp>
     </p:spTree>
     <p:extLst>
       <p:ext uri="{BB962C8B-B14F-4D97-AF65-F5344CB8AC3E}">
-        <p14:creationId xmlns:p14="http://schemas.microsoft.com/office/powerpoint/2010/main" val="2274438380"/>
+        <p14:creationId xmlns:p14="http://schemas.microsoft.com/office/powerpoint/2010/main" val="2156988798"/>
       </p:ext>
     </p:extLst>
   </p:cSld>

</xml_diff>

<commit_message>
Update presentation comorb and Adherence. Update data report n_rows
</commit_message>
<xml_diff>
--- a/Week_10-11/Presentation_EDA.pptx
+++ b/Week_10-11/Presentation_EDA.pptx
@@ -5,7 +5,7 @@
     <p:sldMasterId id="2147483684" r:id="rId1"/>
   </p:sldMasterIdLst>
   <p:notesMasterIdLst>
-    <p:notesMasterId r:id="rId23"/>
+    <p:notesMasterId r:id="rId24"/>
   </p:notesMasterIdLst>
   <p:sldIdLst>
     <p:sldId id="256" r:id="rId2"/>
@@ -26,9 +26,10 @@
     <p:sldId id="290" r:id="rId17"/>
     <p:sldId id="291" r:id="rId18"/>
     <p:sldId id="285" r:id="rId19"/>
-    <p:sldId id="273" r:id="rId20"/>
-    <p:sldId id="284" r:id="rId21"/>
-    <p:sldId id="268" r:id="rId22"/>
+    <p:sldId id="299" r:id="rId20"/>
+    <p:sldId id="273" r:id="rId21"/>
+    <p:sldId id="284" r:id="rId22"/>
+    <p:sldId id="268" r:id="rId23"/>
   </p:sldIdLst>
   <p:sldSz cx="12192000" cy="6858000"/>
   <p:notesSz cx="6858000" cy="9144000"/>
@@ -639,591 +640,6 @@
     </pc:docChg>
   </pc:docChgLst>
   <pc:docChgLst>
-    <pc:chgData name="Roger Burek-Bors" userId="52318fc02a824a34" providerId="LiveId" clId="{CE0CDD7B-C3A1-414A-9816-595488E1E4B6}"/>
-    <pc:docChg chg="undo custSel addSld modSld">
-      <pc:chgData name="Roger Burek-Bors" userId="52318fc02a824a34" providerId="LiveId" clId="{CE0CDD7B-C3A1-414A-9816-595488E1E4B6}" dt="2021-03-06T23:02:37.974" v="4491" actId="20577"/>
-      <pc:docMkLst>
-        <pc:docMk/>
-      </pc:docMkLst>
-      <pc:sldChg chg="modSp mod">
-        <pc:chgData name="Roger Burek-Bors" userId="52318fc02a824a34" providerId="LiveId" clId="{CE0CDD7B-C3A1-414A-9816-595488E1E4B6}" dt="2021-03-06T10:26:05.598" v="1214" actId="20577"/>
-        <pc:sldMkLst>
-          <pc:docMk/>
-          <pc:sldMk cId="109857222" sldId="256"/>
-        </pc:sldMkLst>
-        <pc:spChg chg="mod">
-          <ac:chgData name="Roger Burek-Bors" userId="52318fc02a824a34" providerId="LiveId" clId="{CE0CDD7B-C3A1-414A-9816-595488E1E4B6}" dt="2021-03-06T10:26:05.598" v="1214" actId="20577"/>
-          <ac:spMkLst>
-            <pc:docMk/>
-            <pc:sldMk cId="109857222" sldId="256"/>
-            <ac:spMk id="11" creationId="{00CC22B5-8500-2C45-91DE-A596A6DF1C3B}"/>
-          </ac:spMkLst>
-        </pc:spChg>
-      </pc:sldChg>
-      <pc:sldChg chg="addSp delSp modSp new mod">
-        <pc:chgData name="Roger Burek-Bors" userId="52318fc02a824a34" providerId="LiveId" clId="{CE0CDD7B-C3A1-414A-9816-595488E1E4B6}" dt="2021-03-06T22:17:29.718" v="4022" actId="20577"/>
-        <pc:sldMkLst>
-          <pc:docMk/>
-          <pc:sldMk cId="1899016330" sldId="269"/>
-        </pc:sldMkLst>
-        <pc:spChg chg="del">
-          <ac:chgData name="Roger Burek-Bors" userId="52318fc02a824a34" providerId="LiveId" clId="{CE0CDD7B-C3A1-414A-9816-595488E1E4B6}" dt="2021-03-06T08:16:46.801" v="2" actId="478"/>
-          <ac:spMkLst>
-            <pc:docMk/>
-            <pc:sldMk cId="1899016330" sldId="269"/>
-            <ac:spMk id="2" creationId="{2050F080-7170-4879-B84F-2D5EC65696CB}"/>
-          </ac:spMkLst>
-        </pc:spChg>
-        <pc:spChg chg="mod">
-          <ac:chgData name="Roger Burek-Bors" userId="52318fc02a824a34" providerId="LiveId" clId="{CE0CDD7B-C3A1-414A-9816-595488E1E4B6}" dt="2021-03-06T22:17:29.718" v="4022" actId="20577"/>
-          <ac:spMkLst>
-            <pc:docMk/>
-            <pc:sldMk cId="1899016330" sldId="269"/>
-            <ac:spMk id="3" creationId="{CDC6F948-2F33-47A0-AE55-62E355ACC532}"/>
-          </ac:spMkLst>
-        </pc:spChg>
-        <pc:spChg chg="add mod">
-          <ac:chgData name="Roger Burek-Bors" userId="52318fc02a824a34" providerId="LiveId" clId="{CE0CDD7B-C3A1-414A-9816-595488E1E4B6}" dt="2021-03-06T08:18:13.808" v="19"/>
-          <ac:spMkLst>
-            <pc:docMk/>
-            <pc:sldMk cId="1899016330" sldId="269"/>
-            <ac:spMk id="4" creationId="{F0FEE1CD-BF08-48FA-8526-5BEB92660675}"/>
-          </ac:spMkLst>
-        </pc:spChg>
-      </pc:sldChg>
-      <pc:sldChg chg="modSp add mod">
-        <pc:chgData name="Roger Burek-Bors" userId="52318fc02a824a34" providerId="LiveId" clId="{CE0CDD7B-C3A1-414A-9816-595488E1E4B6}" dt="2021-03-06T08:59:48.309" v="330" actId="790"/>
-        <pc:sldMkLst>
-          <pc:docMk/>
-          <pc:sldMk cId="1384039938" sldId="270"/>
-        </pc:sldMkLst>
-        <pc:spChg chg="mod">
-          <ac:chgData name="Roger Burek-Bors" userId="52318fc02a824a34" providerId="LiveId" clId="{CE0CDD7B-C3A1-414A-9816-595488E1E4B6}" dt="2021-03-06T08:59:48.309" v="330" actId="790"/>
-          <ac:spMkLst>
-            <pc:docMk/>
-            <pc:sldMk cId="1384039938" sldId="270"/>
-            <ac:spMk id="3" creationId="{CDC6F948-2F33-47A0-AE55-62E355ACC532}"/>
-          </ac:spMkLst>
-        </pc:spChg>
-        <pc:spChg chg="mod">
-          <ac:chgData name="Roger Burek-Bors" userId="52318fc02a824a34" providerId="LiveId" clId="{CE0CDD7B-C3A1-414A-9816-595488E1E4B6}" dt="2021-03-06T08:18:30.018" v="20"/>
-          <ac:spMkLst>
-            <pc:docMk/>
-            <pc:sldMk cId="1384039938" sldId="270"/>
-            <ac:spMk id="4" creationId="{F0FEE1CD-BF08-48FA-8526-5BEB92660675}"/>
-          </ac:spMkLst>
-        </pc:spChg>
-      </pc:sldChg>
-      <pc:sldChg chg="modSp add mod">
-        <pc:chgData name="Roger Burek-Bors" userId="52318fc02a824a34" providerId="LiveId" clId="{CE0CDD7B-C3A1-414A-9816-595488E1E4B6}" dt="2021-03-06T10:59:18.865" v="1401" actId="790"/>
-        <pc:sldMkLst>
-          <pc:docMk/>
-          <pc:sldMk cId="3712518515" sldId="271"/>
-        </pc:sldMkLst>
-        <pc:spChg chg="mod">
-          <ac:chgData name="Roger Burek-Bors" userId="52318fc02a824a34" providerId="LiveId" clId="{CE0CDD7B-C3A1-414A-9816-595488E1E4B6}" dt="2021-03-06T10:59:18.865" v="1401" actId="790"/>
-          <ac:spMkLst>
-            <pc:docMk/>
-            <pc:sldMk cId="3712518515" sldId="271"/>
-            <ac:spMk id="3" creationId="{CDC6F948-2F33-47A0-AE55-62E355ACC532}"/>
-          </ac:spMkLst>
-        </pc:spChg>
-        <pc:spChg chg="mod">
-          <ac:chgData name="Roger Burek-Bors" userId="52318fc02a824a34" providerId="LiveId" clId="{CE0CDD7B-C3A1-414A-9816-595488E1E4B6}" dt="2021-03-06T08:18:38.911" v="21"/>
-          <ac:spMkLst>
-            <pc:docMk/>
-            <pc:sldMk cId="3712518515" sldId="271"/>
-            <ac:spMk id="4" creationId="{F0FEE1CD-BF08-48FA-8526-5BEB92660675}"/>
-          </ac:spMkLst>
-        </pc:spChg>
-      </pc:sldChg>
-      <pc:sldChg chg="addSp modSp add mod">
-        <pc:chgData name="Roger Burek-Bors" userId="52318fc02a824a34" providerId="LiveId" clId="{CE0CDD7B-C3A1-414A-9816-595488E1E4B6}" dt="2021-03-06T20:40:13.980" v="1926" actId="20577"/>
-        <pc:sldMkLst>
-          <pc:docMk/>
-          <pc:sldMk cId="4200854336" sldId="272"/>
-        </pc:sldMkLst>
-        <pc:spChg chg="mod">
-          <ac:chgData name="Roger Burek-Bors" userId="52318fc02a824a34" providerId="LiveId" clId="{CE0CDD7B-C3A1-414A-9816-595488E1E4B6}" dt="2021-03-06T20:40:13.980" v="1926" actId="20577"/>
-          <ac:spMkLst>
-            <pc:docMk/>
-            <pc:sldMk cId="4200854336" sldId="272"/>
-            <ac:spMk id="3" creationId="{CDC6F948-2F33-47A0-AE55-62E355ACC532}"/>
-          </ac:spMkLst>
-        </pc:spChg>
-        <pc:spChg chg="mod">
-          <ac:chgData name="Roger Burek-Bors" userId="52318fc02a824a34" providerId="LiveId" clId="{CE0CDD7B-C3A1-414A-9816-595488E1E4B6}" dt="2021-03-06T10:27:18.728" v="1223" actId="20577"/>
-          <ac:spMkLst>
-            <pc:docMk/>
-            <pc:sldMk cId="4200854336" sldId="272"/>
-            <ac:spMk id="4" creationId="{F0FEE1CD-BF08-48FA-8526-5BEB92660675}"/>
-          </ac:spMkLst>
-        </pc:spChg>
-        <pc:spChg chg="add mod">
-          <ac:chgData name="Roger Burek-Bors" userId="52318fc02a824a34" providerId="LiveId" clId="{CE0CDD7B-C3A1-414A-9816-595488E1E4B6}" dt="2021-03-06T20:27:56.070" v="1459" actId="122"/>
-          <ac:spMkLst>
-            <pc:docMk/>
-            <pc:sldMk cId="4200854336" sldId="272"/>
-            <ac:spMk id="8" creationId="{3E00D818-545B-486D-93DE-99A9F6CB2B69}"/>
-          </ac:spMkLst>
-        </pc:spChg>
-        <pc:spChg chg="add mod">
-          <ac:chgData name="Roger Burek-Bors" userId="52318fc02a824a34" providerId="LiveId" clId="{CE0CDD7B-C3A1-414A-9816-595488E1E4B6}" dt="2021-03-06T20:28:37.867" v="1481" actId="20577"/>
-          <ac:spMkLst>
-            <pc:docMk/>
-            <pc:sldMk cId="4200854336" sldId="272"/>
-            <ac:spMk id="9" creationId="{F523BA9E-3D67-441D-9B1C-80CEA39F5E2C}"/>
-          </ac:spMkLst>
-        </pc:spChg>
-        <pc:picChg chg="add mod">
-          <ac:chgData name="Roger Burek-Bors" userId="52318fc02a824a34" providerId="LiveId" clId="{CE0CDD7B-C3A1-414A-9816-595488E1E4B6}" dt="2021-03-06T20:27:05.116" v="1413" actId="14100"/>
-          <ac:picMkLst>
-            <pc:docMk/>
-            <pc:sldMk cId="4200854336" sldId="272"/>
-            <ac:picMk id="5" creationId="{E04AD88E-AB73-4501-BA1F-20A03346571A}"/>
-          </ac:picMkLst>
-        </pc:picChg>
-        <pc:picChg chg="add mod">
-          <ac:chgData name="Roger Burek-Bors" userId="52318fc02a824a34" providerId="LiveId" clId="{CE0CDD7B-C3A1-414A-9816-595488E1E4B6}" dt="2021-03-06T20:26:58.032" v="1411" actId="1076"/>
-          <ac:picMkLst>
-            <pc:docMk/>
-            <pc:sldMk cId="4200854336" sldId="272"/>
-            <ac:picMk id="7" creationId="{4B03E726-EE28-4C6F-B7B4-87B349369EB5}"/>
-          </ac:picMkLst>
-        </pc:picChg>
-      </pc:sldChg>
-      <pc:sldChg chg="modSp add mod">
-        <pc:chgData name="Roger Burek-Bors" userId="52318fc02a824a34" providerId="LiveId" clId="{CE0CDD7B-C3A1-414A-9816-595488E1E4B6}" dt="2021-03-06T22:22:50.552" v="4398" actId="1076"/>
-        <pc:sldMkLst>
-          <pc:docMk/>
-          <pc:sldMk cId="3497837162" sldId="273"/>
-        </pc:sldMkLst>
-        <pc:spChg chg="mod">
-          <ac:chgData name="Roger Burek-Bors" userId="52318fc02a824a34" providerId="LiveId" clId="{CE0CDD7B-C3A1-414A-9816-595488E1E4B6}" dt="2021-03-06T22:22:50.552" v="4398" actId="1076"/>
-          <ac:spMkLst>
-            <pc:docMk/>
-            <pc:sldMk cId="3497837162" sldId="273"/>
-            <ac:spMk id="3" creationId="{CDC6F948-2F33-47A0-AE55-62E355ACC532}"/>
-          </ac:spMkLst>
-        </pc:spChg>
-        <pc:spChg chg="mod">
-          <ac:chgData name="Roger Burek-Bors" userId="52318fc02a824a34" providerId="LiveId" clId="{CE0CDD7B-C3A1-414A-9816-595488E1E4B6}" dt="2021-03-06T08:19:04.168" v="23"/>
-          <ac:spMkLst>
-            <pc:docMk/>
-            <pc:sldMk cId="3497837162" sldId="273"/>
-            <ac:spMk id="4" creationId="{F0FEE1CD-BF08-48FA-8526-5BEB92660675}"/>
-          </ac:spMkLst>
-        </pc:spChg>
-      </pc:sldChg>
-      <pc:sldChg chg="modSp add mod">
-        <pc:chgData name="Roger Burek-Bors" userId="52318fc02a824a34" providerId="LiveId" clId="{CE0CDD7B-C3A1-414A-9816-595488E1E4B6}" dt="2021-03-06T23:02:37.974" v="4491" actId="20577"/>
-        <pc:sldMkLst>
-          <pc:docMk/>
-          <pc:sldMk cId="481083618" sldId="274"/>
-        </pc:sldMkLst>
-        <pc:spChg chg="mod">
-          <ac:chgData name="Roger Burek-Bors" userId="52318fc02a824a34" providerId="LiveId" clId="{CE0CDD7B-C3A1-414A-9816-595488E1E4B6}" dt="2021-03-06T23:02:37.974" v="4491" actId="20577"/>
-          <ac:spMkLst>
-            <pc:docMk/>
-            <pc:sldMk cId="481083618" sldId="274"/>
-            <ac:spMk id="3" creationId="{CDC6F948-2F33-47A0-AE55-62E355ACC532}"/>
-          </ac:spMkLst>
-        </pc:spChg>
-        <pc:spChg chg="mod">
-          <ac:chgData name="Roger Burek-Bors" userId="52318fc02a824a34" providerId="LiveId" clId="{CE0CDD7B-C3A1-414A-9816-595488E1E4B6}" dt="2021-03-06T10:34:49.377" v="1256" actId="20577"/>
-          <ac:spMkLst>
-            <pc:docMk/>
-            <pc:sldMk cId="481083618" sldId="274"/>
-            <ac:spMk id="4" creationId="{F0FEE1CD-BF08-48FA-8526-5BEB92660675}"/>
-          </ac:spMkLst>
-        </pc:spChg>
-      </pc:sldChg>
-      <pc:sldChg chg="addSp modSp add mod">
-        <pc:chgData name="Roger Burek-Bors" userId="52318fc02a824a34" providerId="LiveId" clId="{CE0CDD7B-C3A1-414A-9816-595488E1E4B6}" dt="2021-03-06T09:50:28.173" v="917" actId="20577"/>
-        <pc:sldMkLst>
-          <pc:docMk/>
-          <pc:sldMk cId="2276711680" sldId="275"/>
-        </pc:sldMkLst>
-        <pc:spChg chg="mod">
-          <ac:chgData name="Roger Burek-Bors" userId="52318fc02a824a34" providerId="LiveId" clId="{CE0CDD7B-C3A1-414A-9816-595488E1E4B6}" dt="2021-03-06T09:48:39.949" v="908" actId="20577"/>
-          <ac:spMkLst>
-            <pc:docMk/>
-            <pc:sldMk cId="2276711680" sldId="275"/>
-            <ac:spMk id="3" creationId="{CDC6F948-2F33-47A0-AE55-62E355ACC532}"/>
-          </ac:spMkLst>
-        </pc:spChg>
-        <pc:spChg chg="mod">
-          <ac:chgData name="Roger Burek-Bors" userId="52318fc02a824a34" providerId="LiveId" clId="{CE0CDD7B-C3A1-414A-9816-595488E1E4B6}" dt="2021-03-06T09:50:28.173" v="917" actId="20577"/>
-          <ac:spMkLst>
-            <pc:docMk/>
-            <pc:sldMk cId="2276711680" sldId="275"/>
-            <ac:spMk id="4" creationId="{F0FEE1CD-BF08-48FA-8526-5BEB92660675}"/>
-          </ac:spMkLst>
-        </pc:spChg>
-        <pc:picChg chg="add mod">
-          <ac:chgData name="Roger Burek-Bors" userId="52318fc02a824a34" providerId="LiveId" clId="{CE0CDD7B-C3A1-414A-9816-595488E1E4B6}" dt="2021-03-06T09:28:27.934" v="419" actId="1038"/>
-          <ac:picMkLst>
-            <pc:docMk/>
-            <pc:sldMk cId="2276711680" sldId="275"/>
-            <ac:picMk id="5" creationId="{9C092213-4A86-436C-8C28-7631B5B29EBE}"/>
-          </ac:picMkLst>
-        </pc:picChg>
-      </pc:sldChg>
-      <pc:sldChg chg="modSp add mod">
-        <pc:chgData name="Roger Burek-Bors" userId="52318fc02a824a34" providerId="LiveId" clId="{CE0CDD7B-C3A1-414A-9816-595488E1E4B6}" dt="2021-03-06T09:20:47.535" v="378" actId="12"/>
-        <pc:sldMkLst>
-          <pc:docMk/>
-          <pc:sldMk cId="3201505257" sldId="276"/>
-        </pc:sldMkLst>
-        <pc:spChg chg="mod">
-          <ac:chgData name="Roger Burek-Bors" userId="52318fc02a824a34" providerId="LiveId" clId="{CE0CDD7B-C3A1-414A-9816-595488E1E4B6}" dt="2021-03-06T09:20:47.535" v="378" actId="12"/>
-          <ac:spMkLst>
-            <pc:docMk/>
-            <pc:sldMk cId="3201505257" sldId="276"/>
-            <ac:spMk id="3" creationId="{CDC6F948-2F33-47A0-AE55-62E355ACC532}"/>
-          </ac:spMkLst>
-        </pc:spChg>
-        <pc:spChg chg="mod">
-          <ac:chgData name="Roger Burek-Bors" userId="52318fc02a824a34" providerId="LiveId" clId="{CE0CDD7B-C3A1-414A-9816-595488E1E4B6}" dt="2021-03-06T09:15:08.698" v="373" actId="790"/>
-          <ac:spMkLst>
-            <pc:docMk/>
-            <pc:sldMk cId="3201505257" sldId="276"/>
-            <ac:spMk id="4" creationId="{F0FEE1CD-BF08-48FA-8526-5BEB92660675}"/>
-          </ac:spMkLst>
-        </pc:spChg>
-      </pc:sldChg>
-      <pc:sldChg chg="addSp delSp modSp add mod">
-        <pc:chgData name="Roger Burek-Bors" userId="52318fc02a824a34" providerId="LiveId" clId="{CE0CDD7B-C3A1-414A-9816-595488E1E4B6}" dt="2021-03-06T10:16:30.686" v="1210" actId="1035"/>
-        <pc:sldMkLst>
-          <pc:docMk/>
-          <pc:sldMk cId="1898627169" sldId="277"/>
-        </pc:sldMkLst>
-        <pc:spChg chg="mod">
-          <ac:chgData name="Roger Burek-Bors" userId="52318fc02a824a34" providerId="LiveId" clId="{CE0CDD7B-C3A1-414A-9816-595488E1E4B6}" dt="2021-03-06T10:15:59.491" v="1203" actId="1035"/>
-          <ac:spMkLst>
-            <pc:docMk/>
-            <pc:sldMk cId="1898627169" sldId="277"/>
-            <ac:spMk id="3" creationId="{CDC6F948-2F33-47A0-AE55-62E355ACC532}"/>
-          </ac:spMkLst>
-        </pc:spChg>
-        <pc:spChg chg="mod">
-          <ac:chgData name="Roger Burek-Bors" userId="52318fc02a824a34" providerId="LiveId" clId="{CE0CDD7B-C3A1-414A-9816-595488E1E4B6}" dt="2021-03-06T09:50:54.452" v="944" actId="20577"/>
-          <ac:spMkLst>
-            <pc:docMk/>
-            <pc:sldMk cId="1898627169" sldId="277"/>
-            <ac:spMk id="4" creationId="{F0FEE1CD-BF08-48FA-8526-5BEB92660675}"/>
-          </ac:spMkLst>
-        </pc:spChg>
-        <pc:spChg chg="add mod">
-          <ac:chgData name="Roger Burek-Bors" userId="52318fc02a824a34" providerId="LiveId" clId="{CE0CDD7B-C3A1-414A-9816-595488E1E4B6}" dt="2021-03-06T10:16:21.239" v="1208" actId="1036"/>
-          <ac:spMkLst>
-            <pc:docMk/>
-            <pc:sldMk cId="1898627169" sldId="277"/>
-            <ac:spMk id="9" creationId="{86890FC7-D71E-464F-A6EE-FA5C8A0939D1}"/>
-          </ac:spMkLst>
-        </pc:spChg>
-        <pc:spChg chg="add mod">
-          <ac:chgData name="Roger Burek-Bors" userId="52318fc02a824a34" providerId="LiveId" clId="{CE0CDD7B-C3A1-414A-9816-595488E1E4B6}" dt="2021-03-06T10:15:59.491" v="1203" actId="1035"/>
-          <ac:spMkLst>
-            <pc:docMk/>
-            <pc:sldMk cId="1898627169" sldId="277"/>
-            <ac:spMk id="10" creationId="{B0F8B1CA-463D-4F6F-8873-0953CDF30F82}"/>
-          </ac:spMkLst>
-        </pc:spChg>
-        <pc:spChg chg="add mod">
-          <ac:chgData name="Roger Burek-Bors" userId="52318fc02a824a34" providerId="LiveId" clId="{CE0CDD7B-C3A1-414A-9816-595488E1E4B6}" dt="2021-03-06T10:15:49.443" v="1200" actId="1036"/>
-          <ac:spMkLst>
-            <pc:docMk/>
-            <pc:sldMk cId="1898627169" sldId="277"/>
-            <ac:spMk id="11" creationId="{6E73E28B-7C40-4E48-B144-F4D992B71A59}"/>
-          </ac:spMkLst>
-        </pc:spChg>
-        <pc:picChg chg="del">
-          <ac:chgData name="Roger Burek-Bors" userId="52318fc02a824a34" providerId="LiveId" clId="{CE0CDD7B-C3A1-414A-9816-595488E1E4B6}" dt="2021-03-06T09:52:36.390" v="945" actId="478"/>
-          <ac:picMkLst>
-            <pc:docMk/>
-            <pc:sldMk cId="1898627169" sldId="277"/>
-            <ac:picMk id="5" creationId="{9C092213-4A86-436C-8C28-7631B5B29EBE}"/>
-          </ac:picMkLst>
-        </pc:picChg>
-        <pc:picChg chg="add mod">
-          <ac:chgData name="Roger Burek-Bors" userId="52318fc02a824a34" providerId="LiveId" clId="{CE0CDD7B-C3A1-414A-9816-595488E1E4B6}" dt="2021-03-06T10:15:59.491" v="1203" actId="1035"/>
-          <ac:picMkLst>
-            <pc:docMk/>
-            <pc:sldMk cId="1898627169" sldId="277"/>
-            <ac:picMk id="6" creationId="{025EA7C1-B980-4A2B-BF56-F74CFE5975A9}"/>
-          </ac:picMkLst>
-        </pc:picChg>
-        <pc:picChg chg="add mod">
-          <ac:chgData name="Roger Burek-Bors" userId="52318fc02a824a34" providerId="LiveId" clId="{CE0CDD7B-C3A1-414A-9816-595488E1E4B6}" dt="2021-03-06T10:16:30.686" v="1210" actId="1035"/>
-          <ac:picMkLst>
-            <pc:docMk/>
-            <pc:sldMk cId="1898627169" sldId="277"/>
-            <ac:picMk id="8" creationId="{D89AD308-79D0-4F5B-9860-504B18E3E720}"/>
-          </ac:picMkLst>
-        </pc:picChg>
-      </pc:sldChg>
-      <pc:sldChg chg="addSp modSp add mod">
-        <pc:chgData name="Roger Burek-Bors" userId="52318fc02a824a34" providerId="LiveId" clId="{CE0CDD7B-C3A1-414A-9816-595488E1E4B6}" dt="2021-03-06T21:19:05.900" v="2438" actId="6549"/>
-        <pc:sldMkLst>
-          <pc:docMk/>
-          <pc:sldMk cId="3679507724" sldId="278"/>
-        </pc:sldMkLst>
-        <pc:spChg chg="mod">
-          <ac:chgData name="Roger Burek-Bors" userId="52318fc02a824a34" providerId="LiveId" clId="{CE0CDD7B-C3A1-414A-9816-595488E1E4B6}" dt="2021-03-06T21:19:05.900" v="2438" actId="6549"/>
-          <ac:spMkLst>
-            <pc:docMk/>
-            <pc:sldMk cId="3679507724" sldId="278"/>
-            <ac:spMk id="3" creationId="{CDC6F948-2F33-47A0-AE55-62E355ACC532}"/>
-          </ac:spMkLst>
-        </pc:spChg>
-        <pc:spChg chg="mod">
-          <ac:chgData name="Roger Burek-Bors" userId="52318fc02a824a34" providerId="LiveId" clId="{CE0CDD7B-C3A1-414A-9816-595488E1E4B6}" dt="2021-03-06T10:27:58.947" v="1230" actId="20577"/>
-          <ac:spMkLst>
-            <pc:docMk/>
-            <pc:sldMk cId="3679507724" sldId="278"/>
-            <ac:spMk id="4" creationId="{F0FEE1CD-BF08-48FA-8526-5BEB92660675}"/>
-          </ac:spMkLst>
-        </pc:spChg>
-        <pc:picChg chg="add mod">
-          <ac:chgData name="Roger Burek-Bors" userId="52318fc02a824a34" providerId="LiveId" clId="{CE0CDD7B-C3A1-414A-9816-595488E1E4B6}" dt="2021-03-06T20:53:22.625" v="2012" actId="14100"/>
-          <ac:picMkLst>
-            <pc:docMk/>
-            <pc:sldMk cId="3679507724" sldId="278"/>
-            <ac:picMk id="5" creationId="{98E0585E-FC03-49DA-9084-1FECF72001CC}"/>
-          </ac:picMkLst>
-        </pc:picChg>
-      </pc:sldChg>
-      <pc:sldChg chg="modSp add mod">
-        <pc:chgData name="Roger Burek-Bors" userId="52318fc02a824a34" providerId="LiveId" clId="{CE0CDD7B-C3A1-414A-9816-595488E1E4B6}" dt="2021-03-06T21:28:40.172" v="2816" actId="20577"/>
-        <pc:sldMkLst>
-          <pc:docMk/>
-          <pc:sldMk cId="2898413202" sldId="279"/>
-        </pc:sldMkLst>
-        <pc:spChg chg="mod">
-          <ac:chgData name="Roger Burek-Bors" userId="52318fc02a824a34" providerId="LiveId" clId="{CE0CDD7B-C3A1-414A-9816-595488E1E4B6}" dt="2021-03-06T21:28:40.172" v="2816" actId="20577"/>
-          <ac:spMkLst>
-            <pc:docMk/>
-            <pc:sldMk cId="2898413202" sldId="279"/>
-            <ac:spMk id="3" creationId="{CDC6F948-2F33-47A0-AE55-62E355ACC532}"/>
-          </ac:spMkLst>
-        </pc:spChg>
-        <pc:spChg chg="mod">
-          <ac:chgData name="Roger Burek-Bors" userId="52318fc02a824a34" providerId="LiveId" clId="{CE0CDD7B-C3A1-414A-9816-595488E1E4B6}" dt="2021-03-06T10:28:03.831" v="1232" actId="20577"/>
-          <ac:spMkLst>
-            <pc:docMk/>
-            <pc:sldMk cId="2898413202" sldId="279"/>
-            <ac:spMk id="4" creationId="{F0FEE1CD-BF08-48FA-8526-5BEB92660675}"/>
-          </ac:spMkLst>
-        </pc:spChg>
-      </pc:sldChg>
-      <pc:sldChg chg="addSp delSp modSp add mod">
-        <pc:chgData name="Roger Burek-Bors" userId="52318fc02a824a34" providerId="LiveId" clId="{CE0CDD7B-C3A1-414A-9816-595488E1E4B6}" dt="2021-03-06T21:52:35.375" v="2907" actId="14100"/>
-        <pc:sldMkLst>
-          <pc:docMk/>
-          <pc:sldMk cId="1290289446" sldId="280"/>
-        </pc:sldMkLst>
-        <pc:spChg chg="del">
-          <ac:chgData name="Roger Burek-Bors" userId="52318fc02a824a34" providerId="LiveId" clId="{CE0CDD7B-C3A1-414A-9816-595488E1E4B6}" dt="2021-03-06T21:31:17.465" v="2817" actId="478"/>
-          <ac:spMkLst>
-            <pc:docMk/>
-            <pc:sldMk cId="1290289446" sldId="280"/>
-            <ac:spMk id="3" creationId="{CDC6F948-2F33-47A0-AE55-62E355ACC532}"/>
-          </ac:spMkLst>
-        </pc:spChg>
-        <pc:spChg chg="mod">
-          <ac:chgData name="Roger Burek-Bors" userId="52318fc02a824a34" providerId="LiveId" clId="{CE0CDD7B-C3A1-414A-9816-595488E1E4B6}" dt="2021-03-06T10:28:07.441" v="1234" actId="20577"/>
-          <ac:spMkLst>
-            <pc:docMk/>
-            <pc:sldMk cId="1290289446" sldId="280"/>
-            <ac:spMk id="4" creationId="{F0FEE1CD-BF08-48FA-8526-5BEB92660675}"/>
-          </ac:spMkLst>
-        </pc:spChg>
-        <pc:picChg chg="add mod">
-          <ac:chgData name="Roger Burek-Bors" userId="52318fc02a824a34" providerId="LiveId" clId="{CE0CDD7B-C3A1-414A-9816-595488E1E4B6}" dt="2021-03-06T21:52:35.375" v="2907" actId="14100"/>
-          <ac:picMkLst>
-            <pc:docMk/>
-            <pc:sldMk cId="1290289446" sldId="280"/>
-            <ac:picMk id="5" creationId="{DCE17B6A-718D-45CF-909E-9EB4347067BD}"/>
-          </ac:picMkLst>
-        </pc:picChg>
-        <pc:picChg chg="add mod">
-          <ac:chgData name="Roger Burek-Bors" userId="52318fc02a824a34" providerId="LiveId" clId="{CE0CDD7B-C3A1-414A-9816-595488E1E4B6}" dt="2021-03-06T21:38:53.794" v="2825" actId="1076"/>
-          <ac:picMkLst>
-            <pc:docMk/>
-            <pc:sldMk cId="1290289446" sldId="280"/>
-            <ac:picMk id="7" creationId="{74B6F8BA-D934-4B67-8EBE-F760E171C1DB}"/>
-          </ac:picMkLst>
-        </pc:picChg>
-        <pc:picChg chg="add mod">
-          <ac:chgData name="Roger Burek-Bors" userId="52318fc02a824a34" providerId="LiveId" clId="{CE0CDD7B-C3A1-414A-9816-595488E1E4B6}" dt="2021-03-06T21:39:16.908" v="2830" actId="14100"/>
-          <ac:picMkLst>
-            <pc:docMk/>
-            <pc:sldMk cId="1290289446" sldId="280"/>
-            <ac:picMk id="9" creationId="{8BCFA284-C68A-4565-B96D-D6012DAD4993}"/>
-          </ac:picMkLst>
-        </pc:picChg>
-        <pc:picChg chg="add mod">
-          <ac:chgData name="Roger Burek-Bors" userId="52318fc02a824a34" providerId="LiveId" clId="{CE0CDD7B-C3A1-414A-9816-595488E1E4B6}" dt="2021-03-06T21:52:28.253" v="2906" actId="1076"/>
-          <ac:picMkLst>
-            <pc:docMk/>
-            <pc:sldMk cId="1290289446" sldId="280"/>
-            <ac:picMk id="11" creationId="{3B299F46-81F4-4196-A257-5297C1A42360}"/>
-          </ac:picMkLst>
-        </pc:picChg>
-        <pc:picChg chg="add mod">
-          <ac:chgData name="Roger Burek-Bors" userId="52318fc02a824a34" providerId="LiveId" clId="{CE0CDD7B-C3A1-414A-9816-595488E1E4B6}" dt="2021-03-06T21:52:04.552" v="2895" actId="1035"/>
-          <ac:picMkLst>
-            <pc:docMk/>
-            <pc:sldMk cId="1290289446" sldId="280"/>
-            <ac:picMk id="13" creationId="{EF606B0A-43BE-430F-A5D5-B106AF7572AA}"/>
-          </ac:picMkLst>
-        </pc:picChg>
-        <pc:picChg chg="add mod">
-          <ac:chgData name="Roger Burek-Bors" userId="52318fc02a824a34" providerId="LiveId" clId="{CE0CDD7B-C3A1-414A-9816-595488E1E4B6}" dt="2021-03-06T21:52:14.994" v="2904" actId="1076"/>
-          <ac:picMkLst>
-            <pc:docMk/>
-            <pc:sldMk cId="1290289446" sldId="280"/>
-            <ac:picMk id="15" creationId="{9EBC8CDE-7985-4438-8414-61613270DF62}"/>
-          </ac:picMkLst>
-        </pc:picChg>
-        <pc:picChg chg="add mod">
-          <ac:chgData name="Roger Burek-Bors" userId="52318fc02a824a34" providerId="LiveId" clId="{CE0CDD7B-C3A1-414A-9816-595488E1E4B6}" dt="2021-03-06T21:48:56.253" v="2855" actId="1076"/>
-          <ac:picMkLst>
-            <pc:docMk/>
-            <pc:sldMk cId="1290289446" sldId="280"/>
-            <ac:picMk id="17" creationId="{9CE373F2-B6EB-4F66-A022-E6C1073E6E17}"/>
-          </ac:picMkLst>
-        </pc:picChg>
-        <pc:picChg chg="add mod">
-          <ac:chgData name="Roger Burek-Bors" userId="52318fc02a824a34" providerId="LiveId" clId="{CE0CDD7B-C3A1-414A-9816-595488E1E4B6}" dt="2021-03-06T21:48:49.029" v="2854" actId="1076"/>
-          <ac:picMkLst>
-            <pc:docMk/>
-            <pc:sldMk cId="1290289446" sldId="280"/>
-            <ac:picMk id="19" creationId="{2AC43E6A-EF41-4406-8345-E883118028B4}"/>
-          </ac:picMkLst>
-        </pc:picChg>
-        <pc:picChg chg="add mod">
-          <ac:chgData name="Roger Burek-Bors" userId="52318fc02a824a34" providerId="LiveId" clId="{CE0CDD7B-C3A1-414A-9816-595488E1E4B6}" dt="2021-03-06T21:52:14.994" v="2904" actId="1076"/>
-          <ac:picMkLst>
-            <pc:docMk/>
-            <pc:sldMk cId="1290289446" sldId="280"/>
-            <ac:picMk id="21" creationId="{B1EF41AE-55C4-466E-BB0D-966D553CA48D}"/>
-          </ac:picMkLst>
-        </pc:picChg>
-        <pc:picChg chg="add mod">
-          <ac:chgData name="Roger Burek-Bors" userId="52318fc02a824a34" providerId="LiveId" clId="{CE0CDD7B-C3A1-414A-9816-595488E1E4B6}" dt="2021-03-06T21:52:04.552" v="2895" actId="1035"/>
-          <ac:picMkLst>
-            <pc:docMk/>
-            <pc:sldMk cId="1290289446" sldId="280"/>
-            <ac:picMk id="23" creationId="{4D30FDC5-05B4-48EA-9CC7-95299F4E793C}"/>
-          </ac:picMkLst>
-        </pc:picChg>
-        <pc:picChg chg="add mod">
-          <ac:chgData name="Roger Burek-Bors" userId="52318fc02a824a34" providerId="LiveId" clId="{CE0CDD7B-C3A1-414A-9816-595488E1E4B6}" dt="2021-03-06T21:52:28.253" v="2906" actId="1076"/>
-          <ac:picMkLst>
-            <pc:docMk/>
-            <pc:sldMk cId="1290289446" sldId="280"/>
-            <ac:picMk id="25" creationId="{67823BE7-DD39-4020-85C3-2807ACF36B1F}"/>
-          </ac:picMkLst>
-        </pc:picChg>
-      </pc:sldChg>
-      <pc:sldChg chg="addSp delSp modSp add mod">
-        <pc:chgData name="Roger Burek-Bors" userId="52318fc02a824a34" providerId="LiveId" clId="{CE0CDD7B-C3A1-414A-9816-595488E1E4B6}" dt="2021-03-06T22:06:47.038" v="3364" actId="1038"/>
-        <pc:sldMkLst>
-          <pc:docMk/>
-          <pc:sldMk cId="3626305797" sldId="281"/>
-        </pc:sldMkLst>
-        <pc:spChg chg="del">
-          <ac:chgData name="Roger Burek-Bors" userId="52318fc02a824a34" providerId="LiveId" clId="{CE0CDD7B-C3A1-414A-9816-595488E1E4B6}" dt="2021-03-06T21:54:11.303" v="2910" actId="1957"/>
-          <ac:spMkLst>
-            <pc:docMk/>
-            <pc:sldMk cId="3626305797" sldId="281"/>
-            <ac:spMk id="3" creationId="{CDC6F948-2F33-47A0-AE55-62E355ACC532}"/>
-          </ac:spMkLst>
-        </pc:spChg>
-        <pc:spChg chg="mod">
-          <ac:chgData name="Roger Burek-Bors" userId="52318fc02a824a34" providerId="LiveId" clId="{CE0CDD7B-C3A1-414A-9816-595488E1E4B6}" dt="2021-03-06T10:28:12.258" v="1236" actId="20577"/>
-          <ac:spMkLst>
-            <pc:docMk/>
-            <pc:sldMk cId="3626305797" sldId="281"/>
-            <ac:spMk id="4" creationId="{F0FEE1CD-BF08-48FA-8526-5BEB92660675}"/>
-          </ac:spMkLst>
-        </pc:spChg>
-        <pc:spChg chg="add mod">
-          <ac:chgData name="Roger Burek-Bors" userId="52318fc02a824a34" providerId="LiveId" clId="{CE0CDD7B-C3A1-414A-9816-595488E1E4B6}" dt="2021-03-06T22:06:47.038" v="3364" actId="1038"/>
-          <ac:spMkLst>
-            <pc:docMk/>
-            <pc:sldMk cId="3626305797" sldId="281"/>
-            <ac:spMk id="7" creationId="{F5943E24-CE6D-4EA8-9150-F2710DF1E286}"/>
-          </ac:spMkLst>
-        </pc:spChg>
-        <pc:graphicFrameChg chg="add mod">
-          <ac:chgData name="Roger Burek-Bors" userId="52318fc02a824a34" providerId="LiveId" clId="{CE0CDD7B-C3A1-414A-9816-595488E1E4B6}" dt="2021-03-06T22:06:47.038" v="3364" actId="1038"/>
-          <ac:graphicFrameMkLst>
-            <pc:docMk/>
-            <pc:sldMk cId="3626305797" sldId="281"/>
-            <ac:graphicFrameMk id="6" creationId="{551A0D79-1971-4153-A695-B2CD66C645EE}"/>
-          </ac:graphicFrameMkLst>
-        </pc:graphicFrameChg>
-      </pc:sldChg>
-      <pc:sldChg chg="addSp delSp modSp add mod">
-        <pc:chgData name="Roger Burek-Bors" userId="52318fc02a824a34" providerId="LiveId" clId="{CE0CDD7B-C3A1-414A-9816-595488E1E4B6}" dt="2021-03-06T22:57:38.614" v="4473" actId="27918"/>
-        <pc:sldMkLst>
-          <pc:docMk/>
-          <pc:sldMk cId="414061104" sldId="282"/>
-        </pc:sldMkLst>
-        <pc:spChg chg="del">
-          <ac:chgData name="Roger Burek-Bors" userId="52318fc02a824a34" providerId="LiveId" clId="{CE0CDD7B-C3A1-414A-9816-595488E1E4B6}" dt="2021-03-06T22:51:14.023" v="4400" actId="1957"/>
-          <ac:spMkLst>
-            <pc:docMk/>
-            <pc:sldMk cId="414061104" sldId="282"/>
-            <ac:spMk id="3" creationId="{CDC6F948-2F33-47A0-AE55-62E355ACC532}"/>
-          </ac:spMkLst>
-        </pc:spChg>
-        <pc:spChg chg="mod">
-          <ac:chgData name="Roger Burek-Bors" userId="52318fc02a824a34" providerId="LiveId" clId="{CE0CDD7B-C3A1-414A-9816-595488E1E4B6}" dt="2021-03-06T10:28:16.646" v="1238" actId="20577"/>
-          <ac:spMkLst>
-            <pc:docMk/>
-            <pc:sldMk cId="414061104" sldId="282"/>
-            <ac:spMk id="4" creationId="{F0FEE1CD-BF08-48FA-8526-5BEB92660675}"/>
-          </ac:spMkLst>
-        </pc:spChg>
-        <pc:graphicFrameChg chg="add mod">
-          <ac:chgData name="Roger Burek-Bors" userId="52318fc02a824a34" providerId="LiveId" clId="{CE0CDD7B-C3A1-414A-9816-595488E1E4B6}" dt="2021-03-06T22:56:58.142" v="4471" actId="20577"/>
-          <ac:graphicFrameMkLst>
-            <pc:docMk/>
-            <pc:sldMk cId="414061104" sldId="282"/>
-            <ac:graphicFrameMk id="6" creationId="{0C73F6A4-BD75-466A-91C4-DC593C0E3E0D}"/>
-          </ac:graphicFrameMkLst>
-        </pc:graphicFrameChg>
-      </pc:sldChg>
-      <pc:sldChg chg="modSp add mod">
-        <pc:chgData name="Roger Burek-Bors" userId="52318fc02a824a34" providerId="LiveId" clId="{CE0CDD7B-C3A1-414A-9816-595488E1E4B6}" dt="2021-03-06T10:43:29.820" v="1318" actId="790"/>
-        <pc:sldMkLst>
-          <pc:docMk/>
-          <pc:sldMk cId="2824837901" sldId="283"/>
-        </pc:sldMkLst>
-        <pc:spChg chg="mod">
-          <ac:chgData name="Roger Burek-Bors" userId="52318fc02a824a34" providerId="LiveId" clId="{CE0CDD7B-C3A1-414A-9816-595488E1E4B6}" dt="2021-03-06T10:43:29.820" v="1318" actId="790"/>
-          <ac:spMkLst>
-            <pc:docMk/>
-            <pc:sldMk cId="2824837901" sldId="283"/>
-            <ac:spMk id="3" creationId="{CDC6F948-2F33-47A0-AE55-62E355ACC532}"/>
-          </ac:spMkLst>
-        </pc:spChg>
-        <pc:spChg chg="mod">
-          <ac:chgData name="Roger Burek-Bors" userId="52318fc02a824a34" providerId="LiveId" clId="{CE0CDD7B-C3A1-414A-9816-595488E1E4B6}" dt="2021-03-06T10:36:29.792" v="1265" actId="20577"/>
-          <ac:spMkLst>
-            <pc:docMk/>
-            <pc:sldMk cId="2824837901" sldId="283"/>
-            <ac:spMk id="4" creationId="{F0FEE1CD-BF08-48FA-8526-5BEB92660675}"/>
-          </ac:spMkLst>
-        </pc:spChg>
-      </pc:sldChg>
-    </pc:docChg>
-  </pc:docChgLst>
-  <pc:docChgLst>
     <pc:chgData name="Roger Burek-Bors" userId="52318fc02a824a34" providerId="LiveId" clId="{1F239C82-AFC1-45CC-A017-1A691C60E705}"/>
     <pc:docChg chg="undo custSel addSld delSld modSld sldOrd">
       <pc:chgData name="Roger Burek-Bors" userId="52318fc02a824a34" providerId="LiveId" clId="{1F239C82-AFC1-45CC-A017-1A691C60E705}" dt="2021-05-04T13:17:40.855" v="794" actId="1076"/>
@@ -1677,6 +1093,591 @@
             <ac:picMk id="9" creationId="{3CBC7FF4-559B-4FC3-8235-ADCA753D42A7}"/>
           </ac:picMkLst>
         </pc:picChg>
+      </pc:sldChg>
+    </pc:docChg>
+  </pc:docChgLst>
+  <pc:docChgLst>
+    <pc:chgData name="Roger Burek-Bors" userId="52318fc02a824a34" providerId="LiveId" clId="{CE0CDD7B-C3A1-414A-9816-595488E1E4B6}"/>
+    <pc:docChg chg="undo custSel addSld modSld">
+      <pc:chgData name="Roger Burek-Bors" userId="52318fc02a824a34" providerId="LiveId" clId="{CE0CDD7B-C3A1-414A-9816-595488E1E4B6}" dt="2021-03-06T23:02:37.974" v="4491" actId="20577"/>
+      <pc:docMkLst>
+        <pc:docMk/>
+      </pc:docMkLst>
+      <pc:sldChg chg="modSp mod">
+        <pc:chgData name="Roger Burek-Bors" userId="52318fc02a824a34" providerId="LiveId" clId="{CE0CDD7B-C3A1-414A-9816-595488E1E4B6}" dt="2021-03-06T10:26:05.598" v="1214" actId="20577"/>
+        <pc:sldMkLst>
+          <pc:docMk/>
+          <pc:sldMk cId="109857222" sldId="256"/>
+        </pc:sldMkLst>
+        <pc:spChg chg="mod">
+          <ac:chgData name="Roger Burek-Bors" userId="52318fc02a824a34" providerId="LiveId" clId="{CE0CDD7B-C3A1-414A-9816-595488E1E4B6}" dt="2021-03-06T10:26:05.598" v="1214" actId="20577"/>
+          <ac:spMkLst>
+            <pc:docMk/>
+            <pc:sldMk cId="109857222" sldId="256"/>
+            <ac:spMk id="11" creationId="{00CC22B5-8500-2C45-91DE-A596A6DF1C3B}"/>
+          </ac:spMkLst>
+        </pc:spChg>
+      </pc:sldChg>
+      <pc:sldChg chg="addSp delSp modSp new mod">
+        <pc:chgData name="Roger Burek-Bors" userId="52318fc02a824a34" providerId="LiveId" clId="{CE0CDD7B-C3A1-414A-9816-595488E1E4B6}" dt="2021-03-06T22:17:29.718" v="4022" actId="20577"/>
+        <pc:sldMkLst>
+          <pc:docMk/>
+          <pc:sldMk cId="1899016330" sldId="269"/>
+        </pc:sldMkLst>
+        <pc:spChg chg="del">
+          <ac:chgData name="Roger Burek-Bors" userId="52318fc02a824a34" providerId="LiveId" clId="{CE0CDD7B-C3A1-414A-9816-595488E1E4B6}" dt="2021-03-06T08:16:46.801" v="2" actId="478"/>
+          <ac:spMkLst>
+            <pc:docMk/>
+            <pc:sldMk cId="1899016330" sldId="269"/>
+            <ac:spMk id="2" creationId="{2050F080-7170-4879-B84F-2D5EC65696CB}"/>
+          </ac:spMkLst>
+        </pc:spChg>
+        <pc:spChg chg="mod">
+          <ac:chgData name="Roger Burek-Bors" userId="52318fc02a824a34" providerId="LiveId" clId="{CE0CDD7B-C3A1-414A-9816-595488E1E4B6}" dt="2021-03-06T22:17:29.718" v="4022" actId="20577"/>
+          <ac:spMkLst>
+            <pc:docMk/>
+            <pc:sldMk cId="1899016330" sldId="269"/>
+            <ac:spMk id="3" creationId="{CDC6F948-2F33-47A0-AE55-62E355ACC532}"/>
+          </ac:spMkLst>
+        </pc:spChg>
+        <pc:spChg chg="add mod">
+          <ac:chgData name="Roger Burek-Bors" userId="52318fc02a824a34" providerId="LiveId" clId="{CE0CDD7B-C3A1-414A-9816-595488E1E4B6}" dt="2021-03-06T08:18:13.808" v="19"/>
+          <ac:spMkLst>
+            <pc:docMk/>
+            <pc:sldMk cId="1899016330" sldId="269"/>
+            <ac:spMk id="4" creationId="{F0FEE1CD-BF08-48FA-8526-5BEB92660675}"/>
+          </ac:spMkLst>
+        </pc:spChg>
+      </pc:sldChg>
+      <pc:sldChg chg="modSp add mod">
+        <pc:chgData name="Roger Burek-Bors" userId="52318fc02a824a34" providerId="LiveId" clId="{CE0CDD7B-C3A1-414A-9816-595488E1E4B6}" dt="2021-03-06T08:59:48.309" v="330" actId="790"/>
+        <pc:sldMkLst>
+          <pc:docMk/>
+          <pc:sldMk cId="1384039938" sldId="270"/>
+        </pc:sldMkLst>
+        <pc:spChg chg="mod">
+          <ac:chgData name="Roger Burek-Bors" userId="52318fc02a824a34" providerId="LiveId" clId="{CE0CDD7B-C3A1-414A-9816-595488E1E4B6}" dt="2021-03-06T08:59:48.309" v="330" actId="790"/>
+          <ac:spMkLst>
+            <pc:docMk/>
+            <pc:sldMk cId="1384039938" sldId="270"/>
+            <ac:spMk id="3" creationId="{CDC6F948-2F33-47A0-AE55-62E355ACC532}"/>
+          </ac:spMkLst>
+        </pc:spChg>
+        <pc:spChg chg="mod">
+          <ac:chgData name="Roger Burek-Bors" userId="52318fc02a824a34" providerId="LiveId" clId="{CE0CDD7B-C3A1-414A-9816-595488E1E4B6}" dt="2021-03-06T08:18:30.018" v="20"/>
+          <ac:spMkLst>
+            <pc:docMk/>
+            <pc:sldMk cId="1384039938" sldId="270"/>
+            <ac:spMk id="4" creationId="{F0FEE1CD-BF08-48FA-8526-5BEB92660675}"/>
+          </ac:spMkLst>
+        </pc:spChg>
+      </pc:sldChg>
+      <pc:sldChg chg="modSp add mod">
+        <pc:chgData name="Roger Burek-Bors" userId="52318fc02a824a34" providerId="LiveId" clId="{CE0CDD7B-C3A1-414A-9816-595488E1E4B6}" dt="2021-03-06T10:59:18.865" v="1401" actId="790"/>
+        <pc:sldMkLst>
+          <pc:docMk/>
+          <pc:sldMk cId="3712518515" sldId="271"/>
+        </pc:sldMkLst>
+        <pc:spChg chg="mod">
+          <ac:chgData name="Roger Burek-Bors" userId="52318fc02a824a34" providerId="LiveId" clId="{CE0CDD7B-C3A1-414A-9816-595488E1E4B6}" dt="2021-03-06T10:59:18.865" v="1401" actId="790"/>
+          <ac:spMkLst>
+            <pc:docMk/>
+            <pc:sldMk cId="3712518515" sldId="271"/>
+            <ac:spMk id="3" creationId="{CDC6F948-2F33-47A0-AE55-62E355ACC532}"/>
+          </ac:spMkLst>
+        </pc:spChg>
+        <pc:spChg chg="mod">
+          <ac:chgData name="Roger Burek-Bors" userId="52318fc02a824a34" providerId="LiveId" clId="{CE0CDD7B-C3A1-414A-9816-595488E1E4B6}" dt="2021-03-06T08:18:38.911" v="21"/>
+          <ac:spMkLst>
+            <pc:docMk/>
+            <pc:sldMk cId="3712518515" sldId="271"/>
+            <ac:spMk id="4" creationId="{F0FEE1CD-BF08-48FA-8526-5BEB92660675}"/>
+          </ac:spMkLst>
+        </pc:spChg>
+      </pc:sldChg>
+      <pc:sldChg chg="addSp modSp add mod">
+        <pc:chgData name="Roger Burek-Bors" userId="52318fc02a824a34" providerId="LiveId" clId="{CE0CDD7B-C3A1-414A-9816-595488E1E4B6}" dt="2021-03-06T20:40:13.980" v="1926" actId="20577"/>
+        <pc:sldMkLst>
+          <pc:docMk/>
+          <pc:sldMk cId="4200854336" sldId="272"/>
+        </pc:sldMkLst>
+        <pc:spChg chg="mod">
+          <ac:chgData name="Roger Burek-Bors" userId="52318fc02a824a34" providerId="LiveId" clId="{CE0CDD7B-C3A1-414A-9816-595488E1E4B6}" dt="2021-03-06T20:40:13.980" v="1926" actId="20577"/>
+          <ac:spMkLst>
+            <pc:docMk/>
+            <pc:sldMk cId="4200854336" sldId="272"/>
+            <ac:spMk id="3" creationId="{CDC6F948-2F33-47A0-AE55-62E355ACC532}"/>
+          </ac:spMkLst>
+        </pc:spChg>
+        <pc:spChg chg="mod">
+          <ac:chgData name="Roger Burek-Bors" userId="52318fc02a824a34" providerId="LiveId" clId="{CE0CDD7B-C3A1-414A-9816-595488E1E4B6}" dt="2021-03-06T10:27:18.728" v="1223" actId="20577"/>
+          <ac:spMkLst>
+            <pc:docMk/>
+            <pc:sldMk cId="4200854336" sldId="272"/>
+            <ac:spMk id="4" creationId="{F0FEE1CD-BF08-48FA-8526-5BEB92660675}"/>
+          </ac:spMkLst>
+        </pc:spChg>
+        <pc:spChg chg="add mod">
+          <ac:chgData name="Roger Burek-Bors" userId="52318fc02a824a34" providerId="LiveId" clId="{CE0CDD7B-C3A1-414A-9816-595488E1E4B6}" dt="2021-03-06T20:27:56.070" v="1459" actId="122"/>
+          <ac:spMkLst>
+            <pc:docMk/>
+            <pc:sldMk cId="4200854336" sldId="272"/>
+            <ac:spMk id="8" creationId="{3E00D818-545B-486D-93DE-99A9F6CB2B69}"/>
+          </ac:spMkLst>
+        </pc:spChg>
+        <pc:spChg chg="add mod">
+          <ac:chgData name="Roger Burek-Bors" userId="52318fc02a824a34" providerId="LiveId" clId="{CE0CDD7B-C3A1-414A-9816-595488E1E4B6}" dt="2021-03-06T20:28:37.867" v="1481" actId="20577"/>
+          <ac:spMkLst>
+            <pc:docMk/>
+            <pc:sldMk cId="4200854336" sldId="272"/>
+            <ac:spMk id="9" creationId="{F523BA9E-3D67-441D-9B1C-80CEA39F5E2C}"/>
+          </ac:spMkLst>
+        </pc:spChg>
+        <pc:picChg chg="add mod">
+          <ac:chgData name="Roger Burek-Bors" userId="52318fc02a824a34" providerId="LiveId" clId="{CE0CDD7B-C3A1-414A-9816-595488E1E4B6}" dt="2021-03-06T20:27:05.116" v="1413" actId="14100"/>
+          <ac:picMkLst>
+            <pc:docMk/>
+            <pc:sldMk cId="4200854336" sldId="272"/>
+            <ac:picMk id="5" creationId="{E04AD88E-AB73-4501-BA1F-20A03346571A}"/>
+          </ac:picMkLst>
+        </pc:picChg>
+        <pc:picChg chg="add mod">
+          <ac:chgData name="Roger Burek-Bors" userId="52318fc02a824a34" providerId="LiveId" clId="{CE0CDD7B-C3A1-414A-9816-595488E1E4B6}" dt="2021-03-06T20:26:58.032" v="1411" actId="1076"/>
+          <ac:picMkLst>
+            <pc:docMk/>
+            <pc:sldMk cId="4200854336" sldId="272"/>
+            <ac:picMk id="7" creationId="{4B03E726-EE28-4C6F-B7B4-87B349369EB5}"/>
+          </ac:picMkLst>
+        </pc:picChg>
+      </pc:sldChg>
+      <pc:sldChg chg="modSp add mod">
+        <pc:chgData name="Roger Burek-Bors" userId="52318fc02a824a34" providerId="LiveId" clId="{CE0CDD7B-C3A1-414A-9816-595488E1E4B6}" dt="2021-03-06T22:22:50.552" v="4398" actId="1076"/>
+        <pc:sldMkLst>
+          <pc:docMk/>
+          <pc:sldMk cId="3497837162" sldId="273"/>
+        </pc:sldMkLst>
+        <pc:spChg chg="mod">
+          <ac:chgData name="Roger Burek-Bors" userId="52318fc02a824a34" providerId="LiveId" clId="{CE0CDD7B-C3A1-414A-9816-595488E1E4B6}" dt="2021-03-06T22:22:50.552" v="4398" actId="1076"/>
+          <ac:spMkLst>
+            <pc:docMk/>
+            <pc:sldMk cId="3497837162" sldId="273"/>
+            <ac:spMk id="3" creationId="{CDC6F948-2F33-47A0-AE55-62E355ACC532}"/>
+          </ac:spMkLst>
+        </pc:spChg>
+        <pc:spChg chg="mod">
+          <ac:chgData name="Roger Burek-Bors" userId="52318fc02a824a34" providerId="LiveId" clId="{CE0CDD7B-C3A1-414A-9816-595488E1E4B6}" dt="2021-03-06T08:19:04.168" v="23"/>
+          <ac:spMkLst>
+            <pc:docMk/>
+            <pc:sldMk cId="3497837162" sldId="273"/>
+            <ac:spMk id="4" creationId="{F0FEE1CD-BF08-48FA-8526-5BEB92660675}"/>
+          </ac:spMkLst>
+        </pc:spChg>
+      </pc:sldChg>
+      <pc:sldChg chg="modSp add mod">
+        <pc:chgData name="Roger Burek-Bors" userId="52318fc02a824a34" providerId="LiveId" clId="{CE0CDD7B-C3A1-414A-9816-595488E1E4B6}" dt="2021-03-06T23:02:37.974" v="4491" actId="20577"/>
+        <pc:sldMkLst>
+          <pc:docMk/>
+          <pc:sldMk cId="481083618" sldId="274"/>
+        </pc:sldMkLst>
+        <pc:spChg chg="mod">
+          <ac:chgData name="Roger Burek-Bors" userId="52318fc02a824a34" providerId="LiveId" clId="{CE0CDD7B-C3A1-414A-9816-595488E1E4B6}" dt="2021-03-06T23:02:37.974" v="4491" actId="20577"/>
+          <ac:spMkLst>
+            <pc:docMk/>
+            <pc:sldMk cId="481083618" sldId="274"/>
+            <ac:spMk id="3" creationId="{CDC6F948-2F33-47A0-AE55-62E355ACC532}"/>
+          </ac:spMkLst>
+        </pc:spChg>
+        <pc:spChg chg="mod">
+          <ac:chgData name="Roger Burek-Bors" userId="52318fc02a824a34" providerId="LiveId" clId="{CE0CDD7B-C3A1-414A-9816-595488E1E4B6}" dt="2021-03-06T10:34:49.377" v="1256" actId="20577"/>
+          <ac:spMkLst>
+            <pc:docMk/>
+            <pc:sldMk cId="481083618" sldId="274"/>
+            <ac:spMk id="4" creationId="{F0FEE1CD-BF08-48FA-8526-5BEB92660675}"/>
+          </ac:spMkLst>
+        </pc:spChg>
+      </pc:sldChg>
+      <pc:sldChg chg="addSp modSp add mod">
+        <pc:chgData name="Roger Burek-Bors" userId="52318fc02a824a34" providerId="LiveId" clId="{CE0CDD7B-C3A1-414A-9816-595488E1E4B6}" dt="2021-03-06T09:50:28.173" v="917" actId="20577"/>
+        <pc:sldMkLst>
+          <pc:docMk/>
+          <pc:sldMk cId="2276711680" sldId="275"/>
+        </pc:sldMkLst>
+        <pc:spChg chg="mod">
+          <ac:chgData name="Roger Burek-Bors" userId="52318fc02a824a34" providerId="LiveId" clId="{CE0CDD7B-C3A1-414A-9816-595488E1E4B6}" dt="2021-03-06T09:48:39.949" v="908" actId="20577"/>
+          <ac:spMkLst>
+            <pc:docMk/>
+            <pc:sldMk cId="2276711680" sldId="275"/>
+            <ac:spMk id="3" creationId="{CDC6F948-2F33-47A0-AE55-62E355ACC532}"/>
+          </ac:spMkLst>
+        </pc:spChg>
+        <pc:spChg chg="mod">
+          <ac:chgData name="Roger Burek-Bors" userId="52318fc02a824a34" providerId="LiveId" clId="{CE0CDD7B-C3A1-414A-9816-595488E1E4B6}" dt="2021-03-06T09:50:28.173" v="917" actId="20577"/>
+          <ac:spMkLst>
+            <pc:docMk/>
+            <pc:sldMk cId="2276711680" sldId="275"/>
+            <ac:spMk id="4" creationId="{F0FEE1CD-BF08-48FA-8526-5BEB92660675}"/>
+          </ac:spMkLst>
+        </pc:spChg>
+        <pc:picChg chg="add mod">
+          <ac:chgData name="Roger Burek-Bors" userId="52318fc02a824a34" providerId="LiveId" clId="{CE0CDD7B-C3A1-414A-9816-595488E1E4B6}" dt="2021-03-06T09:28:27.934" v="419" actId="1038"/>
+          <ac:picMkLst>
+            <pc:docMk/>
+            <pc:sldMk cId="2276711680" sldId="275"/>
+            <ac:picMk id="5" creationId="{9C092213-4A86-436C-8C28-7631B5B29EBE}"/>
+          </ac:picMkLst>
+        </pc:picChg>
+      </pc:sldChg>
+      <pc:sldChg chg="modSp add mod">
+        <pc:chgData name="Roger Burek-Bors" userId="52318fc02a824a34" providerId="LiveId" clId="{CE0CDD7B-C3A1-414A-9816-595488E1E4B6}" dt="2021-03-06T09:20:47.535" v="378" actId="12"/>
+        <pc:sldMkLst>
+          <pc:docMk/>
+          <pc:sldMk cId="3201505257" sldId="276"/>
+        </pc:sldMkLst>
+        <pc:spChg chg="mod">
+          <ac:chgData name="Roger Burek-Bors" userId="52318fc02a824a34" providerId="LiveId" clId="{CE0CDD7B-C3A1-414A-9816-595488E1E4B6}" dt="2021-03-06T09:20:47.535" v="378" actId="12"/>
+          <ac:spMkLst>
+            <pc:docMk/>
+            <pc:sldMk cId="3201505257" sldId="276"/>
+            <ac:spMk id="3" creationId="{CDC6F948-2F33-47A0-AE55-62E355ACC532}"/>
+          </ac:spMkLst>
+        </pc:spChg>
+        <pc:spChg chg="mod">
+          <ac:chgData name="Roger Burek-Bors" userId="52318fc02a824a34" providerId="LiveId" clId="{CE0CDD7B-C3A1-414A-9816-595488E1E4B6}" dt="2021-03-06T09:15:08.698" v="373" actId="790"/>
+          <ac:spMkLst>
+            <pc:docMk/>
+            <pc:sldMk cId="3201505257" sldId="276"/>
+            <ac:spMk id="4" creationId="{F0FEE1CD-BF08-48FA-8526-5BEB92660675}"/>
+          </ac:spMkLst>
+        </pc:spChg>
+      </pc:sldChg>
+      <pc:sldChg chg="addSp delSp modSp add mod">
+        <pc:chgData name="Roger Burek-Bors" userId="52318fc02a824a34" providerId="LiveId" clId="{CE0CDD7B-C3A1-414A-9816-595488E1E4B6}" dt="2021-03-06T10:16:30.686" v="1210" actId="1035"/>
+        <pc:sldMkLst>
+          <pc:docMk/>
+          <pc:sldMk cId="1898627169" sldId="277"/>
+        </pc:sldMkLst>
+        <pc:spChg chg="mod">
+          <ac:chgData name="Roger Burek-Bors" userId="52318fc02a824a34" providerId="LiveId" clId="{CE0CDD7B-C3A1-414A-9816-595488E1E4B6}" dt="2021-03-06T10:15:59.491" v="1203" actId="1035"/>
+          <ac:spMkLst>
+            <pc:docMk/>
+            <pc:sldMk cId="1898627169" sldId="277"/>
+            <ac:spMk id="3" creationId="{CDC6F948-2F33-47A0-AE55-62E355ACC532}"/>
+          </ac:spMkLst>
+        </pc:spChg>
+        <pc:spChg chg="mod">
+          <ac:chgData name="Roger Burek-Bors" userId="52318fc02a824a34" providerId="LiveId" clId="{CE0CDD7B-C3A1-414A-9816-595488E1E4B6}" dt="2021-03-06T09:50:54.452" v="944" actId="20577"/>
+          <ac:spMkLst>
+            <pc:docMk/>
+            <pc:sldMk cId="1898627169" sldId="277"/>
+            <ac:spMk id="4" creationId="{F0FEE1CD-BF08-48FA-8526-5BEB92660675}"/>
+          </ac:spMkLst>
+        </pc:spChg>
+        <pc:spChg chg="add mod">
+          <ac:chgData name="Roger Burek-Bors" userId="52318fc02a824a34" providerId="LiveId" clId="{CE0CDD7B-C3A1-414A-9816-595488E1E4B6}" dt="2021-03-06T10:16:21.239" v="1208" actId="1036"/>
+          <ac:spMkLst>
+            <pc:docMk/>
+            <pc:sldMk cId="1898627169" sldId="277"/>
+            <ac:spMk id="9" creationId="{86890FC7-D71E-464F-A6EE-FA5C8A0939D1}"/>
+          </ac:spMkLst>
+        </pc:spChg>
+        <pc:spChg chg="add mod">
+          <ac:chgData name="Roger Burek-Bors" userId="52318fc02a824a34" providerId="LiveId" clId="{CE0CDD7B-C3A1-414A-9816-595488E1E4B6}" dt="2021-03-06T10:15:59.491" v="1203" actId="1035"/>
+          <ac:spMkLst>
+            <pc:docMk/>
+            <pc:sldMk cId="1898627169" sldId="277"/>
+            <ac:spMk id="10" creationId="{B0F8B1CA-463D-4F6F-8873-0953CDF30F82}"/>
+          </ac:spMkLst>
+        </pc:spChg>
+        <pc:spChg chg="add mod">
+          <ac:chgData name="Roger Burek-Bors" userId="52318fc02a824a34" providerId="LiveId" clId="{CE0CDD7B-C3A1-414A-9816-595488E1E4B6}" dt="2021-03-06T10:15:49.443" v="1200" actId="1036"/>
+          <ac:spMkLst>
+            <pc:docMk/>
+            <pc:sldMk cId="1898627169" sldId="277"/>
+            <ac:spMk id="11" creationId="{6E73E28B-7C40-4E48-B144-F4D992B71A59}"/>
+          </ac:spMkLst>
+        </pc:spChg>
+        <pc:picChg chg="del">
+          <ac:chgData name="Roger Burek-Bors" userId="52318fc02a824a34" providerId="LiveId" clId="{CE0CDD7B-C3A1-414A-9816-595488E1E4B6}" dt="2021-03-06T09:52:36.390" v="945" actId="478"/>
+          <ac:picMkLst>
+            <pc:docMk/>
+            <pc:sldMk cId="1898627169" sldId="277"/>
+            <ac:picMk id="5" creationId="{9C092213-4A86-436C-8C28-7631B5B29EBE}"/>
+          </ac:picMkLst>
+        </pc:picChg>
+        <pc:picChg chg="add mod">
+          <ac:chgData name="Roger Burek-Bors" userId="52318fc02a824a34" providerId="LiveId" clId="{CE0CDD7B-C3A1-414A-9816-595488E1E4B6}" dt="2021-03-06T10:15:59.491" v="1203" actId="1035"/>
+          <ac:picMkLst>
+            <pc:docMk/>
+            <pc:sldMk cId="1898627169" sldId="277"/>
+            <ac:picMk id="6" creationId="{025EA7C1-B980-4A2B-BF56-F74CFE5975A9}"/>
+          </ac:picMkLst>
+        </pc:picChg>
+        <pc:picChg chg="add mod">
+          <ac:chgData name="Roger Burek-Bors" userId="52318fc02a824a34" providerId="LiveId" clId="{CE0CDD7B-C3A1-414A-9816-595488E1E4B6}" dt="2021-03-06T10:16:30.686" v="1210" actId="1035"/>
+          <ac:picMkLst>
+            <pc:docMk/>
+            <pc:sldMk cId="1898627169" sldId="277"/>
+            <ac:picMk id="8" creationId="{D89AD308-79D0-4F5B-9860-504B18E3E720}"/>
+          </ac:picMkLst>
+        </pc:picChg>
+      </pc:sldChg>
+      <pc:sldChg chg="addSp modSp add mod">
+        <pc:chgData name="Roger Burek-Bors" userId="52318fc02a824a34" providerId="LiveId" clId="{CE0CDD7B-C3A1-414A-9816-595488E1E4B6}" dt="2021-03-06T21:19:05.900" v="2438" actId="6549"/>
+        <pc:sldMkLst>
+          <pc:docMk/>
+          <pc:sldMk cId="3679507724" sldId="278"/>
+        </pc:sldMkLst>
+        <pc:spChg chg="mod">
+          <ac:chgData name="Roger Burek-Bors" userId="52318fc02a824a34" providerId="LiveId" clId="{CE0CDD7B-C3A1-414A-9816-595488E1E4B6}" dt="2021-03-06T21:19:05.900" v="2438" actId="6549"/>
+          <ac:spMkLst>
+            <pc:docMk/>
+            <pc:sldMk cId="3679507724" sldId="278"/>
+            <ac:spMk id="3" creationId="{CDC6F948-2F33-47A0-AE55-62E355ACC532}"/>
+          </ac:spMkLst>
+        </pc:spChg>
+        <pc:spChg chg="mod">
+          <ac:chgData name="Roger Burek-Bors" userId="52318fc02a824a34" providerId="LiveId" clId="{CE0CDD7B-C3A1-414A-9816-595488E1E4B6}" dt="2021-03-06T10:27:58.947" v="1230" actId="20577"/>
+          <ac:spMkLst>
+            <pc:docMk/>
+            <pc:sldMk cId="3679507724" sldId="278"/>
+            <ac:spMk id="4" creationId="{F0FEE1CD-BF08-48FA-8526-5BEB92660675}"/>
+          </ac:spMkLst>
+        </pc:spChg>
+        <pc:picChg chg="add mod">
+          <ac:chgData name="Roger Burek-Bors" userId="52318fc02a824a34" providerId="LiveId" clId="{CE0CDD7B-C3A1-414A-9816-595488E1E4B6}" dt="2021-03-06T20:53:22.625" v="2012" actId="14100"/>
+          <ac:picMkLst>
+            <pc:docMk/>
+            <pc:sldMk cId="3679507724" sldId="278"/>
+            <ac:picMk id="5" creationId="{98E0585E-FC03-49DA-9084-1FECF72001CC}"/>
+          </ac:picMkLst>
+        </pc:picChg>
+      </pc:sldChg>
+      <pc:sldChg chg="modSp add mod">
+        <pc:chgData name="Roger Burek-Bors" userId="52318fc02a824a34" providerId="LiveId" clId="{CE0CDD7B-C3A1-414A-9816-595488E1E4B6}" dt="2021-03-06T21:28:40.172" v="2816" actId="20577"/>
+        <pc:sldMkLst>
+          <pc:docMk/>
+          <pc:sldMk cId="2898413202" sldId="279"/>
+        </pc:sldMkLst>
+        <pc:spChg chg="mod">
+          <ac:chgData name="Roger Burek-Bors" userId="52318fc02a824a34" providerId="LiveId" clId="{CE0CDD7B-C3A1-414A-9816-595488E1E4B6}" dt="2021-03-06T21:28:40.172" v="2816" actId="20577"/>
+          <ac:spMkLst>
+            <pc:docMk/>
+            <pc:sldMk cId="2898413202" sldId="279"/>
+            <ac:spMk id="3" creationId="{CDC6F948-2F33-47A0-AE55-62E355ACC532}"/>
+          </ac:spMkLst>
+        </pc:spChg>
+        <pc:spChg chg="mod">
+          <ac:chgData name="Roger Burek-Bors" userId="52318fc02a824a34" providerId="LiveId" clId="{CE0CDD7B-C3A1-414A-9816-595488E1E4B6}" dt="2021-03-06T10:28:03.831" v="1232" actId="20577"/>
+          <ac:spMkLst>
+            <pc:docMk/>
+            <pc:sldMk cId="2898413202" sldId="279"/>
+            <ac:spMk id="4" creationId="{F0FEE1CD-BF08-48FA-8526-5BEB92660675}"/>
+          </ac:spMkLst>
+        </pc:spChg>
+      </pc:sldChg>
+      <pc:sldChg chg="addSp delSp modSp add mod">
+        <pc:chgData name="Roger Burek-Bors" userId="52318fc02a824a34" providerId="LiveId" clId="{CE0CDD7B-C3A1-414A-9816-595488E1E4B6}" dt="2021-03-06T21:52:35.375" v="2907" actId="14100"/>
+        <pc:sldMkLst>
+          <pc:docMk/>
+          <pc:sldMk cId="1290289446" sldId="280"/>
+        </pc:sldMkLst>
+        <pc:spChg chg="del">
+          <ac:chgData name="Roger Burek-Bors" userId="52318fc02a824a34" providerId="LiveId" clId="{CE0CDD7B-C3A1-414A-9816-595488E1E4B6}" dt="2021-03-06T21:31:17.465" v="2817" actId="478"/>
+          <ac:spMkLst>
+            <pc:docMk/>
+            <pc:sldMk cId="1290289446" sldId="280"/>
+            <ac:spMk id="3" creationId="{CDC6F948-2F33-47A0-AE55-62E355ACC532}"/>
+          </ac:spMkLst>
+        </pc:spChg>
+        <pc:spChg chg="mod">
+          <ac:chgData name="Roger Burek-Bors" userId="52318fc02a824a34" providerId="LiveId" clId="{CE0CDD7B-C3A1-414A-9816-595488E1E4B6}" dt="2021-03-06T10:28:07.441" v="1234" actId="20577"/>
+          <ac:spMkLst>
+            <pc:docMk/>
+            <pc:sldMk cId="1290289446" sldId="280"/>
+            <ac:spMk id="4" creationId="{F0FEE1CD-BF08-48FA-8526-5BEB92660675}"/>
+          </ac:spMkLst>
+        </pc:spChg>
+        <pc:picChg chg="add mod">
+          <ac:chgData name="Roger Burek-Bors" userId="52318fc02a824a34" providerId="LiveId" clId="{CE0CDD7B-C3A1-414A-9816-595488E1E4B6}" dt="2021-03-06T21:52:35.375" v="2907" actId="14100"/>
+          <ac:picMkLst>
+            <pc:docMk/>
+            <pc:sldMk cId="1290289446" sldId="280"/>
+            <ac:picMk id="5" creationId="{DCE17B6A-718D-45CF-909E-9EB4347067BD}"/>
+          </ac:picMkLst>
+        </pc:picChg>
+        <pc:picChg chg="add mod">
+          <ac:chgData name="Roger Burek-Bors" userId="52318fc02a824a34" providerId="LiveId" clId="{CE0CDD7B-C3A1-414A-9816-595488E1E4B6}" dt="2021-03-06T21:38:53.794" v="2825" actId="1076"/>
+          <ac:picMkLst>
+            <pc:docMk/>
+            <pc:sldMk cId="1290289446" sldId="280"/>
+            <ac:picMk id="7" creationId="{74B6F8BA-D934-4B67-8EBE-F760E171C1DB}"/>
+          </ac:picMkLst>
+        </pc:picChg>
+        <pc:picChg chg="add mod">
+          <ac:chgData name="Roger Burek-Bors" userId="52318fc02a824a34" providerId="LiveId" clId="{CE0CDD7B-C3A1-414A-9816-595488E1E4B6}" dt="2021-03-06T21:39:16.908" v="2830" actId="14100"/>
+          <ac:picMkLst>
+            <pc:docMk/>
+            <pc:sldMk cId="1290289446" sldId="280"/>
+            <ac:picMk id="9" creationId="{8BCFA284-C68A-4565-B96D-D6012DAD4993}"/>
+          </ac:picMkLst>
+        </pc:picChg>
+        <pc:picChg chg="add mod">
+          <ac:chgData name="Roger Burek-Bors" userId="52318fc02a824a34" providerId="LiveId" clId="{CE0CDD7B-C3A1-414A-9816-595488E1E4B6}" dt="2021-03-06T21:52:28.253" v="2906" actId="1076"/>
+          <ac:picMkLst>
+            <pc:docMk/>
+            <pc:sldMk cId="1290289446" sldId="280"/>
+            <ac:picMk id="11" creationId="{3B299F46-81F4-4196-A257-5297C1A42360}"/>
+          </ac:picMkLst>
+        </pc:picChg>
+        <pc:picChg chg="add mod">
+          <ac:chgData name="Roger Burek-Bors" userId="52318fc02a824a34" providerId="LiveId" clId="{CE0CDD7B-C3A1-414A-9816-595488E1E4B6}" dt="2021-03-06T21:52:04.552" v="2895" actId="1035"/>
+          <ac:picMkLst>
+            <pc:docMk/>
+            <pc:sldMk cId="1290289446" sldId="280"/>
+            <ac:picMk id="13" creationId="{EF606B0A-43BE-430F-A5D5-B106AF7572AA}"/>
+          </ac:picMkLst>
+        </pc:picChg>
+        <pc:picChg chg="add mod">
+          <ac:chgData name="Roger Burek-Bors" userId="52318fc02a824a34" providerId="LiveId" clId="{CE0CDD7B-C3A1-414A-9816-595488E1E4B6}" dt="2021-03-06T21:52:14.994" v="2904" actId="1076"/>
+          <ac:picMkLst>
+            <pc:docMk/>
+            <pc:sldMk cId="1290289446" sldId="280"/>
+            <ac:picMk id="15" creationId="{9EBC8CDE-7985-4438-8414-61613270DF62}"/>
+          </ac:picMkLst>
+        </pc:picChg>
+        <pc:picChg chg="add mod">
+          <ac:chgData name="Roger Burek-Bors" userId="52318fc02a824a34" providerId="LiveId" clId="{CE0CDD7B-C3A1-414A-9816-595488E1E4B6}" dt="2021-03-06T21:48:56.253" v="2855" actId="1076"/>
+          <ac:picMkLst>
+            <pc:docMk/>
+            <pc:sldMk cId="1290289446" sldId="280"/>
+            <ac:picMk id="17" creationId="{9CE373F2-B6EB-4F66-A022-E6C1073E6E17}"/>
+          </ac:picMkLst>
+        </pc:picChg>
+        <pc:picChg chg="add mod">
+          <ac:chgData name="Roger Burek-Bors" userId="52318fc02a824a34" providerId="LiveId" clId="{CE0CDD7B-C3A1-414A-9816-595488E1E4B6}" dt="2021-03-06T21:48:49.029" v="2854" actId="1076"/>
+          <ac:picMkLst>
+            <pc:docMk/>
+            <pc:sldMk cId="1290289446" sldId="280"/>
+            <ac:picMk id="19" creationId="{2AC43E6A-EF41-4406-8345-E883118028B4}"/>
+          </ac:picMkLst>
+        </pc:picChg>
+        <pc:picChg chg="add mod">
+          <ac:chgData name="Roger Burek-Bors" userId="52318fc02a824a34" providerId="LiveId" clId="{CE0CDD7B-C3A1-414A-9816-595488E1E4B6}" dt="2021-03-06T21:52:14.994" v="2904" actId="1076"/>
+          <ac:picMkLst>
+            <pc:docMk/>
+            <pc:sldMk cId="1290289446" sldId="280"/>
+            <ac:picMk id="21" creationId="{B1EF41AE-55C4-466E-BB0D-966D553CA48D}"/>
+          </ac:picMkLst>
+        </pc:picChg>
+        <pc:picChg chg="add mod">
+          <ac:chgData name="Roger Burek-Bors" userId="52318fc02a824a34" providerId="LiveId" clId="{CE0CDD7B-C3A1-414A-9816-595488E1E4B6}" dt="2021-03-06T21:52:04.552" v="2895" actId="1035"/>
+          <ac:picMkLst>
+            <pc:docMk/>
+            <pc:sldMk cId="1290289446" sldId="280"/>
+            <ac:picMk id="23" creationId="{4D30FDC5-05B4-48EA-9CC7-95299F4E793C}"/>
+          </ac:picMkLst>
+        </pc:picChg>
+        <pc:picChg chg="add mod">
+          <ac:chgData name="Roger Burek-Bors" userId="52318fc02a824a34" providerId="LiveId" clId="{CE0CDD7B-C3A1-414A-9816-595488E1E4B6}" dt="2021-03-06T21:52:28.253" v="2906" actId="1076"/>
+          <ac:picMkLst>
+            <pc:docMk/>
+            <pc:sldMk cId="1290289446" sldId="280"/>
+            <ac:picMk id="25" creationId="{67823BE7-DD39-4020-85C3-2807ACF36B1F}"/>
+          </ac:picMkLst>
+        </pc:picChg>
+      </pc:sldChg>
+      <pc:sldChg chg="addSp delSp modSp add mod">
+        <pc:chgData name="Roger Burek-Bors" userId="52318fc02a824a34" providerId="LiveId" clId="{CE0CDD7B-C3A1-414A-9816-595488E1E4B6}" dt="2021-03-06T22:06:47.038" v="3364" actId="1038"/>
+        <pc:sldMkLst>
+          <pc:docMk/>
+          <pc:sldMk cId="3626305797" sldId="281"/>
+        </pc:sldMkLst>
+        <pc:spChg chg="del">
+          <ac:chgData name="Roger Burek-Bors" userId="52318fc02a824a34" providerId="LiveId" clId="{CE0CDD7B-C3A1-414A-9816-595488E1E4B6}" dt="2021-03-06T21:54:11.303" v="2910" actId="1957"/>
+          <ac:spMkLst>
+            <pc:docMk/>
+            <pc:sldMk cId="3626305797" sldId="281"/>
+            <ac:spMk id="3" creationId="{CDC6F948-2F33-47A0-AE55-62E355ACC532}"/>
+          </ac:spMkLst>
+        </pc:spChg>
+        <pc:spChg chg="mod">
+          <ac:chgData name="Roger Burek-Bors" userId="52318fc02a824a34" providerId="LiveId" clId="{CE0CDD7B-C3A1-414A-9816-595488E1E4B6}" dt="2021-03-06T10:28:12.258" v="1236" actId="20577"/>
+          <ac:spMkLst>
+            <pc:docMk/>
+            <pc:sldMk cId="3626305797" sldId="281"/>
+            <ac:spMk id="4" creationId="{F0FEE1CD-BF08-48FA-8526-5BEB92660675}"/>
+          </ac:spMkLst>
+        </pc:spChg>
+        <pc:spChg chg="add mod">
+          <ac:chgData name="Roger Burek-Bors" userId="52318fc02a824a34" providerId="LiveId" clId="{CE0CDD7B-C3A1-414A-9816-595488E1E4B6}" dt="2021-03-06T22:06:47.038" v="3364" actId="1038"/>
+          <ac:spMkLst>
+            <pc:docMk/>
+            <pc:sldMk cId="3626305797" sldId="281"/>
+            <ac:spMk id="7" creationId="{F5943E24-CE6D-4EA8-9150-F2710DF1E286}"/>
+          </ac:spMkLst>
+        </pc:spChg>
+        <pc:graphicFrameChg chg="add mod">
+          <ac:chgData name="Roger Burek-Bors" userId="52318fc02a824a34" providerId="LiveId" clId="{CE0CDD7B-C3A1-414A-9816-595488E1E4B6}" dt="2021-03-06T22:06:47.038" v="3364" actId="1038"/>
+          <ac:graphicFrameMkLst>
+            <pc:docMk/>
+            <pc:sldMk cId="3626305797" sldId="281"/>
+            <ac:graphicFrameMk id="6" creationId="{551A0D79-1971-4153-A695-B2CD66C645EE}"/>
+          </ac:graphicFrameMkLst>
+        </pc:graphicFrameChg>
+      </pc:sldChg>
+      <pc:sldChg chg="addSp delSp modSp add mod">
+        <pc:chgData name="Roger Burek-Bors" userId="52318fc02a824a34" providerId="LiveId" clId="{CE0CDD7B-C3A1-414A-9816-595488E1E4B6}" dt="2021-03-06T22:57:38.614" v="4473" actId="27918"/>
+        <pc:sldMkLst>
+          <pc:docMk/>
+          <pc:sldMk cId="414061104" sldId="282"/>
+        </pc:sldMkLst>
+        <pc:spChg chg="del">
+          <ac:chgData name="Roger Burek-Bors" userId="52318fc02a824a34" providerId="LiveId" clId="{CE0CDD7B-C3A1-414A-9816-595488E1E4B6}" dt="2021-03-06T22:51:14.023" v="4400" actId="1957"/>
+          <ac:spMkLst>
+            <pc:docMk/>
+            <pc:sldMk cId="414061104" sldId="282"/>
+            <ac:spMk id="3" creationId="{CDC6F948-2F33-47A0-AE55-62E355ACC532}"/>
+          </ac:spMkLst>
+        </pc:spChg>
+        <pc:spChg chg="mod">
+          <ac:chgData name="Roger Burek-Bors" userId="52318fc02a824a34" providerId="LiveId" clId="{CE0CDD7B-C3A1-414A-9816-595488E1E4B6}" dt="2021-03-06T10:28:16.646" v="1238" actId="20577"/>
+          <ac:spMkLst>
+            <pc:docMk/>
+            <pc:sldMk cId="414061104" sldId="282"/>
+            <ac:spMk id="4" creationId="{F0FEE1CD-BF08-48FA-8526-5BEB92660675}"/>
+          </ac:spMkLst>
+        </pc:spChg>
+        <pc:graphicFrameChg chg="add mod">
+          <ac:chgData name="Roger Burek-Bors" userId="52318fc02a824a34" providerId="LiveId" clId="{CE0CDD7B-C3A1-414A-9816-595488E1E4B6}" dt="2021-03-06T22:56:58.142" v="4471" actId="20577"/>
+          <ac:graphicFrameMkLst>
+            <pc:docMk/>
+            <pc:sldMk cId="414061104" sldId="282"/>
+            <ac:graphicFrameMk id="6" creationId="{0C73F6A4-BD75-466A-91C4-DC593C0E3E0D}"/>
+          </ac:graphicFrameMkLst>
+        </pc:graphicFrameChg>
+      </pc:sldChg>
+      <pc:sldChg chg="modSp add mod">
+        <pc:chgData name="Roger Burek-Bors" userId="52318fc02a824a34" providerId="LiveId" clId="{CE0CDD7B-C3A1-414A-9816-595488E1E4B6}" dt="2021-03-06T10:43:29.820" v="1318" actId="790"/>
+        <pc:sldMkLst>
+          <pc:docMk/>
+          <pc:sldMk cId="2824837901" sldId="283"/>
+        </pc:sldMkLst>
+        <pc:spChg chg="mod">
+          <ac:chgData name="Roger Burek-Bors" userId="52318fc02a824a34" providerId="LiveId" clId="{CE0CDD7B-C3A1-414A-9816-595488E1E4B6}" dt="2021-03-06T10:43:29.820" v="1318" actId="790"/>
+          <ac:spMkLst>
+            <pc:docMk/>
+            <pc:sldMk cId="2824837901" sldId="283"/>
+            <ac:spMk id="3" creationId="{CDC6F948-2F33-47A0-AE55-62E355ACC532}"/>
+          </ac:spMkLst>
+        </pc:spChg>
+        <pc:spChg chg="mod">
+          <ac:chgData name="Roger Burek-Bors" userId="52318fc02a824a34" providerId="LiveId" clId="{CE0CDD7B-C3A1-414A-9816-595488E1E4B6}" dt="2021-03-06T10:36:29.792" v="1265" actId="20577"/>
+          <ac:spMkLst>
+            <pc:docMk/>
+            <pc:sldMk cId="2824837901" sldId="283"/>
+            <ac:spMk id="4" creationId="{F0FEE1CD-BF08-48FA-8526-5BEB92660675}"/>
+          </ac:spMkLst>
+        </pc:spChg>
       </pc:sldChg>
     </pc:docChg>
   </pc:docChgLst>
@@ -1765,7 +1766,7 @@
           <a:p>
             <a:fld id="{2BDA1FB4-8E38-4CEB-9ECB-65C04D5EAEF4}" type="datetimeFigureOut">
               <a:rPr lang="en-US" smtClean="0"/>
-              <a:t>5/4/2021</a:t>
+              <a:t>05/04/2021</a:t>
             </a:fld>
             <a:endParaRPr lang="en-US"/>
           </a:p>
@@ -2332,7 +2333,7 @@
           <a:p>
             <a:fld id="{C764DE79-268F-4C1A-8933-263129D2AF90}" type="datetimeFigureOut">
               <a:rPr lang="en-US" dirty="0"/>
-              <a:t>5/4/2021</a:t>
+              <a:t>05/04/2021</a:t>
             </a:fld>
             <a:endParaRPr lang="en-US"/>
           </a:p>
@@ -2502,7 +2503,7 @@
           <a:p>
             <a:fld id="{C764DE79-268F-4C1A-8933-263129D2AF90}" type="datetimeFigureOut">
               <a:rPr lang="en-US" dirty="0"/>
-              <a:t>5/4/2021</a:t>
+              <a:t>05/04/2021</a:t>
             </a:fld>
             <a:endParaRPr lang="en-US"/>
           </a:p>
@@ -2682,7 +2683,7 @@
           <a:p>
             <a:fld id="{C764DE79-268F-4C1A-8933-263129D2AF90}" type="datetimeFigureOut">
               <a:rPr lang="en-US" dirty="0"/>
-              <a:t>5/4/2021</a:t>
+              <a:t>05/04/2021</a:t>
             </a:fld>
             <a:endParaRPr lang="en-US"/>
           </a:p>
@@ -2852,7 +2853,7 @@
           <a:p>
             <a:fld id="{C764DE79-268F-4C1A-8933-263129D2AF90}" type="datetimeFigureOut">
               <a:rPr lang="en-US" dirty="0"/>
-              <a:t>5/4/2021</a:t>
+              <a:t>05/04/2021</a:t>
             </a:fld>
             <a:endParaRPr lang="en-US"/>
           </a:p>
@@ -3098,7 +3099,7 @@
           <a:p>
             <a:fld id="{C764DE79-268F-4C1A-8933-263129D2AF90}" type="datetimeFigureOut">
               <a:rPr lang="en-US" dirty="0"/>
-              <a:t>5/4/2021</a:t>
+              <a:t>05/04/2021</a:t>
             </a:fld>
             <a:endParaRPr lang="en-US"/>
           </a:p>
@@ -3330,7 +3331,7 @@
           <a:p>
             <a:fld id="{C764DE79-268F-4C1A-8933-263129D2AF90}" type="datetimeFigureOut">
               <a:rPr lang="en-US" dirty="0"/>
-              <a:t>5/4/2021</a:t>
+              <a:t>05/04/2021</a:t>
             </a:fld>
             <a:endParaRPr lang="en-US"/>
           </a:p>
@@ -3697,7 +3698,7 @@
           <a:p>
             <a:fld id="{C764DE79-268F-4C1A-8933-263129D2AF90}" type="datetimeFigureOut">
               <a:rPr lang="en-US" dirty="0"/>
-              <a:t>5/4/2021</a:t>
+              <a:t>05/04/2021</a:t>
             </a:fld>
             <a:endParaRPr lang="en-US"/>
           </a:p>
@@ -3815,7 +3816,7 @@
           <a:p>
             <a:fld id="{C764DE79-268F-4C1A-8933-263129D2AF90}" type="datetimeFigureOut">
               <a:rPr lang="en-US" dirty="0"/>
-              <a:t>5/4/2021</a:t>
+              <a:t>05/04/2021</a:t>
             </a:fld>
             <a:endParaRPr lang="en-US"/>
           </a:p>
@@ -3910,7 +3911,7 @@
           <a:p>
             <a:fld id="{C764DE79-268F-4C1A-8933-263129D2AF90}" type="datetimeFigureOut">
               <a:rPr lang="en-US" dirty="0"/>
-              <a:t>5/4/2021</a:t>
+              <a:t>05/04/2021</a:t>
             </a:fld>
             <a:endParaRPr lang="en-US"/>
           </a:p>
@@ -4187,7 +4188,7 @@
           <a:p>
             <a:fld id="{C764DE79-268F-4C1A-8933-263129D2AF90}" type="datetimeFigureOut">
               <a:rPr lang="en-US" dirty="0"/>
-              <a:t>5/4/2021</a:t>
+              <a:t>05/04/2021</a:t>
             </a:fld>
             <a:endParaRPr lang="en-US"/>
           </a:p>
@@ -4444,7 +4445,7 @@
           <a:p>
             <a:fld id="{C764DE79-268F-4C1A-8933-263129D2AF90}" type="datetimeFigureOut">
               <a:rPr lang="en-US" dirty="0"/>
-              <a:t>5/4/2021</a:t>
+              <a:t>05/04/2021</a:t>
             </a:fld>
             <a:endParaRPr lang="en-US"/>
           </a:p>
@@ -4657,7 +4658,7 @@
           <a:p>
             <a:fld id="{C764DE79-268F-4C1A-8933-263129D2AF90}" type="datetimeFigureOut">
               <a:rPr lang="en-US" dirty="0"/>
-              <a:t>5/4/2021</a:t>
+              <a:t>05/04/2021</a:t>
             </a:fld>
             <a:endParaRPr lang="en-US"/>
           </a:p>
@@ -7712,26 +7713,9 @@
           </a:bodyPr>
           <a:lstStyle/>
           <a:p>
-            <a:pPr algn="just"/>
-            <a:r>
-              <a:rPr lang="pl-PL" dirty="0">
-                <a:highlight>
-                  <a:srgbClr val="FFFF00"/>
-                </a:highlight>
-              </a:rPr>
-              <a:t>…</a:t>
-            </a:r>
-          </a:p>
-          <a:p>
-            <a:pPr algn="just"/>
-            <a:r>
-              <a:rPr lang="pl-PL" dirty="0">
-                <a:highlight>
-                  <a:srgbClr val="FFFF00"/>
-                </a:highlight>
-              </a:rPr>
-              <a:t>…</a:t>
-            </a:r>
+            <a:pPr marL="0" indent="0" algn="just">
+              <a:buNone/>
+            </a:pPr>
             <a:endParaRPr lang="en-AU" dirty="0">
               <a:highlight>
                 <a:srgbClr val="FFFF00"/>
@@ -7867,14 +7851,81 @@
         </p:blipFill>
         <p:spPr>
           <a:xfrm>
-            <a:off x="265446" y="3688181"/>
-            <a:ext cx="3648075" cy="2609850"/>
+            <a:off x="446740" y="1221645"/>
+            <a:ext cx="5830554" cy="4171206"/>
           </a:xfrm>
           <a:prstGeom prst="rect">
             <a:avLst/>
           </a:prstGeom>
         </p:spPr>
       </p:pic>
+      <p:sp>
+        <p:nvSpPr>
+          <p:cNvPr id="5" name="TextBox 4">
+            <a:extLst>
+              <a:ext uri="{FF2B5EF4-FFF2-40B4-BE49-F238E27FC236}">
+                <a16:creationId xmlns:a16="http://schemas.microsoft.com/office/drawing/2014/main" id="{0A861399-6A19-42CB-A799-633012D42F4E}"/>
+              </a:ext>
+            </a:extLst>
+          </p:cNvPr>
+          <p:cNvSpPr txBox="1"/>
+          <p:nvPr/>
+        </p:nvSpPr>
+        <p:spPr>
+          <a:xfrm>
+            <a:off x="6184640" y="1800566"/>
+            <a:ext cx="5830554" cy="2031325"/>
+          </a:xfrm>
+          <a:prstGeom prst="rect">
+            <a:avLst/>
+          </a:prstGeom>
+          <a:noFill/>
+        </p:spPr>
+        <p:txBody>
+          <a:bodyPr wrap="square" rtlCol="0">
+            <a:spAutoFit/>
+          </a:bodyPr>
+          <a:lstStyle/>
+          <a:p>
+            <a:pPr marL="285750" indent="-285750">
+              <a:buFont typeface="Arial" panose="020B0604020202020204" pitchFamily="34" charset="0"/>
+              <a:buChar char="•"/>
+            </a:pPr>
+            <a:r>
+              <a:rPr lang="en-US" dirty="0"/>
+              <a:t>The plots shows that </a:t>
+            </a:r>
+            <a:r>
+              <a:rPr lang="en-US" dirty="0" err="1"/>
+              <a:t>Persistent_Flag</a:t>
+            </a:r>
+            <a:r>
+              <a:rPr lang="en-US" dirty="0"/>
+              <a:t> variable is highly dependent on Comorbidities variables; numbered from 0 to 13.</a:t>
+            </a:r>
+          </a:p>
+          <a:p>
+            <a:pPr marL="285750" indent="-285750">
+              <a:buFont typeface="Arial" panose="020B0604020202020204" pitchFamily="34" charset="0"/>
+              <a:buChar char="•"/>
+            </a:pPr>
+            <a:r>
+              <a:rPr lang="en-US" dirty="0"/>
+              <a:t>This was validated using a Chi-Square test of Independence.</a:t>
+            </a:r>
+          </a:p>
+          <a:p>
+            <a:pPr marL="285750" indent="-285750">
+              <a:buFont typeface="Arial" panose="020B0604020202020204" pitchFamily="34" charset="0"/>
+              <a:buChar char="•"/>
+            </a:pPr>
+            <a:r>
+              <a:rPr lang="en-US" dirty="0"/>
+              <a:t>“Y” flags refer to entries with values “Yes”, similarly “N” refer to “No” values.</a:t>
+            </a:r>
+          </a:p>
+        </p:txBody>
+      </p:sp>
     </p:spTree>
     <p:extLst>
       <p:ext uri="{BB962C8B-B14F-4D97-AF65-F5344CB8AC3E}">
@@ -7923,8 +7974,8 @@
         </p:nvSpPr>
         <p:spPr>
           <a:xfrm>
-            <a:off x="838199" y="2090320"/>
-            <a:ext cx="10515600" cy="4351338"/>
+            <a:off x="446740" y="1393140"/>
+            <a:ext cx="11298518" cy="5327749"/>
           </a:xfrm>
         </p:spPr>
         <p:txBody>
@@ -7933,47 +7984,17 @@
           </a:bodyPr>
           <a:lstStyle/>
           <a:p>
-            <a:pPr algn="just"/>
-            <a:r>
-              <a:rPr lang="en-US" sz="2000" dirty="0"/>
-              <a:t>CT scan prior and during therapy has similar values. Therefore, only one of these features should be taken into modeling.</a:t>
-            </a:r>
-          </a:p>
-          <a:p>
-            <a:pPr algn="just"/>
-            <a:r>
-              <a:rPr lang="en-US" sz="2000" dirty="0"/>
-              <a:t>All risk related features should be taken into modeling.</a:t>
-            </a:r>
-          </a:p>
-          <a:p>
-            <a:pPr algn="just"/>
-            <a:r>
-              <a:rPr lang="en-US" sz="2000" dirty="0"/>
-              <a:t>Most of the patients had no side effects, but they neither improved their condition.</a:t>
-            </a:r>
-          </a:p>
-          <a:p>
-            <a:pPr algn="just"/>
-            <a:r>
-              <a:rPr lang="en-US" sz="2000" dirty="0"/>
-              <a:t>The most frequent risks are usually among: Vitamin D insufficiency, risk of smoking tobacco, risk of chronic malnutrition or malabsorption, risks during Rx and before mycobacteria (NTM) treatment.</a:t>
-            </a:r>
-          </a:p>
-          <a:p>
-            <a:pPr algn="just"/>
-            <a:r>
-              <a:rPr lang="en-US" sz="2000" dirty="0">
-                <a:highlight>
-                  <a:srgbClr val="FFFF00"/>
-                </a:highlight>
-              </a:rPr>
-              <a:t>….</a:t>
-            </a:r>
-          </a:p>
-          <a:p>
-            <a:pPr algn="just"/>
-            <a:endParaRPr lang="en-AU" sz="3200" dirty="0"/>
+            <a:pPr marL="0" indent="0" algn="just">
+              <a:buNone/>
+            </a:pPr>
+            <a:endParaRPr lang="en-AU" dirty="0">
+              <a:highlight>
+                <a:srgbClr val="FFFF00"/>
+              </a:highlight>
+            </a:endParaRPr>
+          </a:p>
+          <a:p>
+            <a:endParaRPr lang="pl-PL" dirty="0"/>
           </a:p>
         </p:txBody>
       </p:sp>
@@ -8005,7 +8026,7 @@
         </p:spPr>
         <p:txBody>
           <a:bodyPr vert="vert270" lIns="91440" tIns="45720" rIns="91440" bIns="45720" rtlCol="0" anchor="ctr" anchorCtr="0">
-            <a:normAutofit/>
+            <a:normAutofit fontScale="92500" lnSpcReduction="10000"/>
           </a:bodyPr>
           <a:lstStyle>
             <a:lvl1pPr algn="l" defTabSz="914400" rtl="0" eaLnBrk="1" latinLnBrk="0" hangingPunct="1">
@@ -8034,7 +8055,136 @@
                   <a:srgbClr val="FF6600"/>
                 </a:solidFill>
               </a:rPr>
-              <a:t>EDA Summary</a:t>
+              <a:t>EDA - Hypothesis no. 9</a:t>
+            </a:r>
+            <a:endParaRPr lang="pl-PL" b="1" dirty="0">
+              <a:solidFill>
+                <a:srgbClr val="FF6600"/>
+              </a:solidFill>
+            </a:endParaRPr>
+          </a:p>
+          <a:p>
+            <a:pPr algn="ctr"/>
+            <a:r>
+              <a:rPr lang="pl-PL" b="1" dirty="0">
+                <a:solidFill>
+                  <a:srgbClr val="FF6600"/>
+                </a:solidFill>
+              </a:rPr>
+              <a:t>„</a:t>
+            </a:r>
+            <a:r>
+              <a:rPr lang="en-US" b="1" dirty="0">
+                <a:solidFill>
+                  <a:srgbClr val="FF6600"/>
+                </a:solidFill>
+              </a:rPr>
+              <a:t>Effect of Adherence on persistence</a:t>
+            </a:r>
+            <a:r>
+              <a:rPr lang="pl-PL" b="1" dirty="0">
+                <a:solidFill>
+                  <a:srgbClr val="FF6600"/>
+                </a:solidFill>
+              </a:rPr>
+              <a:t>”</a:t>
+            </a:r>
+            <a:endParaRPr lang="en-US" b="1" dirty="0">
+              <a:solidFill>
+                <a:srgbClr val="FF6600"/>
+              </a:solidFill>
+            </a:endParaRPr>
+          </a:p>
+        </p:txBody>
+      </p:sp>
+      <p:pic>
+        <p:nvPicPr>
+          <p:cNvPr id="2" name="Obraz 1">
+            <a:extLst>
+              <a:ext uri="{FF2B5EF4-FFF2-40B4-BE49-F238E27FC236}">
+                <a16:creationId xmlns:a16="http://schemas.microsoft.com/office/drawing/2014/main" id="{D9451F33-5E7D-4199-A53D-1B806DB46646}"/>
+              </a:ext>
+            </a:extLst>
+          </p:cNvPr>
+          <p:cNvPicPr>
+            <a:picLocks noChangeAspect="1"/>
+          </p:cNvPicPr>
+          <p:nvPr/>
+        </p:nvPicPr>
+        <p:blipFill>
+          <a:blip r:embed="rId2">
+            <a:extLst>
+              <a:ext uri="{28A0092B-C50C-407E-A947-70E740481C1C}">
+                <a14:useLocalDpi xmlns:a14="http://schemas.microsoft.com/office/drawing/2010/main" val="0"/>
+              </a:ext>
+            </a:extLst>
+          </a:blip>
+          <a:srcRect/>
+          <a:stretch/>
+        </p:blipFill>
+        <p:spPr>
+          <a:xfrm>
+            <a:off x="446740" y="1363730"/>
+            <a:ext cx="5830554" cy="3887036"/>
+          </a:xfrm>
+          <a:prstGeom prst="rect">
+            <a:avLst/>
+          </a:prstGeom>
+        </p:spPr>
+      </p:pic>
+      <p:sp>
+        <p:nvSpPr>
+          <p:cNvPr id="5" name="TextBox 4">
+            <a:extLst>
+              <a:ext uri="{FF2B5EF4-FFF2-40B4-BE49-F238E27FC236}">
+                <a16:creationId xmlns:a16="http://schemas.microsoft.com/office/drawing/2014/main" id="{0A861399-6A19-42CB-A799-633012D42F4E}"/>
+              </a:ext>
+            </a:extLst>
+          </p:cNvPr>
+          <p:cNvSpPr txBox="1"/>
+          <p:nvPr/>
+        </p:nvSpPr>
+        <p:spPr>
+          <a:xfrm>
+            <a:off x="6184640" y="1800566"/>
+            <a:ext cx="5830554" cy="1477328"/>
+          </a:xfrm>
+          <a:prstGeom prst="rect">
+            <a:avLst/>
+          </a:prstGeom>
+          <a:noFill/>
+        </p:spPr>
+        <p:txBody>
+          <a:bodyPr wrap="square" rtlCol="0">
+            <a:spAutoFit/>
+          </a:bodyPr>
+          <a:lstStyle/>
+          <a:p>
+            <a:pPr marL="285750" indent="-285750">
+              <a:buFont typeface="Arial" panose="020B0604020202020204" pitchFamily="34" charset="0"/>
+              <a:buChar char="•"/>
+            </a:pPr>
+            <a:r>
+              <a:rPr lang="en-US" dirty="0"/>
+              <a:t>The plots shows that </a:t>
+            </a:r>
+            <a:r>
+              <a:rPr lang="en-US" dirty="0" err="1"/>
+              <a:t>Persistent_Flag</a:t>
+            </a:r>
+            <a:r>
+              <a:rPr lang="en-US" dirty="0"/>
+              <a:t> variable is also dependent on Adherence Flag.</a:t>
+            </a:r>
+          </a:p>
+          <a:p>
+            <a:pPr marL="285750" indent="-285750">
+              <a:buFont typeface="Arial" panose="020B0604020202020204" pitchFamily="34" charset="0"/>
+              <a:buChar char="•"/>
+            </a:pPr>
+            <a:r>
+              <a:rPr lang="en-US" dirty="0"/>
+              <a:t>This was validated using a Chi-Square test of Independence, emphasizing its use in later modeling stages.</a:t>
             </a:r>
           </a:p>
         </p:txBody>
@@ -8042,7 +8192,7 @@
     </p:spTree>
     <p:extLst>
       <p:ext uri="{BB962C8B-B14F-4D97-AF65-F5344CB8AC3E}">
-        <p14:creationId xmlns:p14="http://schemas.microsoft.com/office/powerpoint/2010/main" val="3497837162"/>
+        <p14:creationId xmlns:p14="http://schemas.microsoft.com/office/powerpoint/2010/main" val="2915037259"/>
       </p:ext>
     </p:extLst>
   </p:cSld>
@@ -8347,121 +8497,53 @@
         </p:nvSpPr>
         <p:spPr>
           <a:xfrm>
-            <a:off x="477252" y="1296232"/>
-            <a:ext cx="11193379" cy="4226263"/>
+            <a:off x="838199" y="2090320"/>
+            <a:ext cx="10515600" cy="4351338"/>
           </a:xfrm>
         </p:spPr>
         <p:txBody>
           <a:bodyPr>
-            <a:noAutofit/>
+            <a:normAutofit/>
           </a:bodyPr>
           <a:lstStyle/>
           <a:p>
             <a:pPr algn="just"/>
             <a:r>
-              <a:rPr lang="en-US" sz="2300" dirty="0"/>
-              <a:t>Following modeling techniques should be consider for this assignment:</a:t>
-            </a:r>
-          </a:p>
-          <a:p>
-            <a:pPr lvl="1" algn="just"/>
-            <a:r>
-              <a:rPr lang="en-US" sz="1900" dirty="0"/>
-              <a:t>Decision Trees</a:t>
-            </a:r>
-          </a:p>
-          <a:p>
-            <a:pPr lvl="1" algn="just"/>
-            <a:r>
-              <a:rPr lang="en-US" sz="1900" dirty="0"/>
-              <a:t>K-Nearest Neighbors</a:t>
-            </a:r>
-          </a:p>
-          <a:p>
-            <a:pPr lvl="1" algn="just"/>
-            <a:r>
-              <a:rPr lang="en-US" sz="1900" dirty="0"/>
-              <a:t>Logistic Regression</a:t>
-            </a:r>
-          </a:p>
-          <a:p>
-            <a:pPr lvl="1" algn="just"/>
-            <a:r>
-              <a:rPr lang="en-US" sz="1900" dirty="0"/>
-              <a:t>SVM (Support Vector Machines)</a:t>
-            </a:r>
-            <a:endParaRPr lang="pl-PL" sz="1900" dirty="0"/>
-          </a:p>
-          <a:p>
-            <a:pPr lvl="1" algn="just"/>
-            <a:endParaRPr lang="pl-PL" sz="1900" dirty="0"/>
+              <a:rPr lang="en-US" sz="2000" dirty="0"/>
+              <a:t>CT scan prior and during therapy has similar values. Therefore, only one of these features should be taken into modeling.</a:t>
+            </a:r>
           </a:p>
           <a:p>
             <a:pPr algn="just"/>
             <a:r>
-              <a:rPr lang="en-US" sz="2300" dirty="0"/>
-              <a:t>Following evaluation metrics will be followed</a:t>
-            </a:r>
-            <a:r>
-              <a:rPr lang="pl-PL" sz="2300" dirty="0"/>
-              <a:t> in</a:t>
-            </a:r>
-            <a:r>
-              <a:rPr lang="en-US" sz="2300" dirty="0"/>
-              <a:t> this assignment:</a:t>
-            </a:r>
-            <a:endParaRPr lang="pl-PL" sz="2300" dirty="0"/>
-          </a:p>
-          <a:p>
-            <a:pPr lvl="1" algn="just"/>
-            <a:r>
-              <a:rPr lang="en-US" sz="1900" dirty="0"/>
-              <a:t>Accuracy</a:t>
-            </a:r>
-          </a:p>
-          <a:p>
-            <a:pPr lvl="1" algn="just"/>
-            <a:r>
-              <a:rPr lang="en-US" sz="1900" dirty="0"/>
-              <a:t>Precision and Recall  </a:t>
-            </a:r>
-            <a:endParaRPr lang="pl-PL" sz="1900" dirty="0"/>
-          </a:p>
-          <a:p>
-            <a:pPr lvl="1" algn="just"/>
-            <a:r>
-              <a:rPr lang="en-US" sz="1900" dirty="0"/>
-              <a:t>F1</a:t>
-            </a:r>
-            <a:r>
-              <a:rPr lang="pl-PL" sz="1900" dirty="0"/>
-              <a:t>/F2</a:t>
-            </a:r>
-            <a:r>
-              <a:rPr lang="en-US" sz="1900" dirty="0"/>
-              <a:t> Score</a:t>
-            </a:r>
-          </a:p>
-          <a:p>
-            <a:pPr lvl="1" algn="just"/>
-            <a:r>
-              <a:rPr lang="en-US" sz="1900" dirty="0"/>
-              <a:t>Lift and Gain</a:t>
-            </a:r>
-          </a:p>
-          <a:p>
-            <a:pPr lvl="1" algn="just"/>
-            <a:r>
-              <a:rPr lang="en-US" sz="1900" dirty="0"/>
-              <a:t>KS statistics</a:t>
-            </a:r>
-          </a:p>
-          <a:p>
-            <a:pPr lvl="1" algn="just"/>
-            <a:r>
-              <a:rPr lang="en-US" sz="1900" dirty="0"/>
-              <a:t>AUC-ROC</a:t>
-            </a:r>
+              <a:rPr lang="en-US" sz="2000" dirty="0"/>
+              <a:t>All risk related features should be taken into modeling.</a:t>
+            </a:r>
+          </a:p>
+          <a:p>
+            <a:pPr algn="just"/>
+            <a:r>
+              <a:rPr lang="en-US" sz="2000" dirty="0"/>
+              <a:t>Most of the patients had no side effects, but they neither improved their condition.</a:t>
+            </a:r>
+          </a:p>
+          <a:p>
+            <a:pPr algn="just"/>
+            <a:r>
+              <a:rPr lang="en-US" sz="2000" dirty="0"/>
+              <a:t>The most frequent risks are usually among: Vitamin D insufficiency, risk of smoking tobacco, risk of chronic malnutrition or malabsorption, risks during Rx and before mycobacteria (NTM) treatment.</a:t>
+            </a:r>
+          </a:p>
+          <a:p>
+            <a:pPr algn="just"/>
+            <a:r>
+              <a:rPr lang="en-US" sz="2000" dirty="0"/>
+              <a:t>Variables related to comorbidities and adherence contribute to the likelihood of patients behind persistent with the medication.</a:t>
+            </a:r>
+          </a:p>
+          <a:p>
+            <a:pPr algn="just"/>
+            <a:endParaRPr lang="en-AU" sz="3200" dirty="0"/>
           </a:p>
         </p:txBody>
       </p:sp>
@@ -8517,6 +8599,234 @@
           <a:p>
             <a:pPr algn="ctr"/>
             <a:r>
+              <a:rPr lang="en-US" b="1" dirty="0">
+                <a:solidFill>
+                  <a:srgbClr val="FF6600"/>
+                </a:solidFill>
+              </a:rPr>
+              <a:t>EDA Summary</a:t>
+            </a:r>
+          </a:p>
+        </p:txBody>
+      </p:sp>
+    </p:spTree>
+    <p:extLst>
+      <p:ext uri="{BB962C8B-B14F-4D97-AF65-F5344CB8AC3E}">
+        <p14:creationId xmlns:p14="http://schemas.microsoft.com/office/powerpoint/2010/main" val="3497837162"/>
+      </p:ext>
+    </p:extLst>
+  </p:cSld>
+  <p:clrMapOvr>
+    <a:masterClrMapping/>
+  </p:clrMapOvr>
+</p:sld>
+</file>
+
+<file path=ppt/slides/slide21.xml><?xml version="1.0" encoding="utf-8"?>
+<p:sld xmlns:a="http://schemas.openxmlformats.org/drawingml/2006/main" xmlns:r="http://schemas.openxmlformats.org/officeDocument/2006/relationships" xmlns:p="http://schemas.openxmlformats.org/presentationml/2006/main">
+  <p:cSld>
+    <p:spTree>
+      <p:nvGrpSpPr>
+        <p:cNvPr id="1" name=""/>
+        <p:cNvGrpSpPr/>
+        <p:nvPr/>
+      </p:nvGrpSpPr>
+      <p:grpSpPr>
+        <a:xfrm>
+          <a:off x="0" y="0"/>
+          <a:ext cx="0" cy="0"/>
+          <a:chOff x="0" y="0"/>
+          <a:chExt cx="0" cy="0"/>
+        </a:xfrm>
+      </p:grpSpPr>
+      <p:sp>
+        <p:nvSpPr>
+          <p:cNvPr id="3" name="Symbol zastępczy zawartości 2">
+            <a:extLst>
+              <a:ext uri="{FF2B5EF4-FFF2-40B4-BE49-F238E27FC236}">
+                <a16:creationId xmlns:a16="http://schemas.microsoft.com/office/drawing/2014/main" id="{CDC6F948-2F33-47A0-AE55-62E355ACC532}"/>
+              </a:ext>
+            </a:extLst>
+          </p:cNvPr>
+          <p:cNvSpPr>
+            <a:spLocks noGrp="1"/>
+          </p:cNvSpPr>
+          <p:nvPr>
+            <p:ph idx="1"/>
+          </p:nvPr>
+        </p:nvSpPr>
+        <p:spPr>
+          <a:xfrm>
+            <a:off x="477252" y="1296232"/>
+            <a:ext cx="11193379" cy="4226263"/>
+          </a:xfrm>
+        </p:spPr>
+        <p:txBody>
+          <a:bodyPr>
+            <a:noAutofit/>
+          </a:bodyPr>
+          <a:lstStyle/>
+          <a:p>
+            <a:pPr algn="just"/>
+            <a:r>
+              <a:rPr lang="en-US" sz="2300" dirty="0"/>
+              <a:t>Following modeling techniques should be consider for this assignment:</a:t>
+            </a:r>
+          </a:p>
+          <a:p>
+            <a:pPr lvl="1" algn="just"/>
+            <a:r>
+              <a:rPr lang="en-US" sz="1900" dirty="0"/>
+              <a:t>Decision Trees</a:t>
+            </a:r>
+          </a:p>
+          <a:p>
+            <a:pPr lvl="1" algn="just"/>
+            <a:r>
+              <a:rPr lang="en-US" sz="1900" dirty="0"/>
+              <a:t>K-Nearest Neighbors</a:t>
+            </a:r>
+          </a:p>
+          <a:p>
+            <a:pPr lvl="1" algn="just"/>
+            <a:r>
+              <a:rPr lang="en-US" sz="1900" dirty="0"/>
+              <a:t>Logistic Regression</a:t>
+            </a:r>
+          </a:p>
+          <a:p>
+            <a:pPr lvl="1" algn="just"/>
+            <a:r>
+              <a:rPr lang="en-US" sz="1900" dirty="0"/>
+              <a:t>SVM (Support Vector Machines)</a:t>
+            </a:r>
+            <a:endParaRPr lang="pl-PL" sz="1900" dirty="0"/>
+          </a:p>
+          <a:p>
+            <a:pPr lvl="1" algn="just"/>
+            <a:endParaRPr lang="pl-PL" sz="1900" dirty="0"/>
+          </a:p>
+          <a:p>
+            <a:pPr algn="just"/>
+            <a:r>
+              <a:rPr lang="en-US" sz="2300" dirty="0"/>
+              <a:t>Following evaluation metrics will be followed</a:t>
+            </a:r>
+            <a:r>
+              <a:rPr lang="pl-PL" sz="2300" dirty="0"/>
+              <a:t> in</a:t>
+            </a:r>
+            <a:r>
+              <a:rPr lang="en-US" sz="2300" dirty="0"/>
+              <a:t> this assignment:</a:t>
+            </a:r>
+            <a:endParaRPr lang="pl-PL" sz="2300" dirty="0"/>
+          </a:p>
+          <a:p>
+            <a:pPr lvl="1" algn="just"/>
+            <a:r>
+              <a:rPr lang="en-US" sz="1900" dirty="0"/>
+              <a:t>Accuracy</a:t>
+            </a:r>
+          </a:p>
+          <a:p>
+            <a:pPr lvl="1" algn="just"/>
+            <a:r>
+              <a:rPr lang="en-US" sz="1900" dirty="0"/>
+              <a:t>Precision and Recall  </a:t>
+            </a:r>
+            <a:endParaRPr lang="pl-PL" sz="1900" dirty="0"/>
+          </a:p>
+          <a:p>
+            <a:pPr lvl="1" algn="just"/>
+            <a:r>
+              <a:rPr lang="en-US" sz="1900" dirty="0"/>
+              <a:t>F1</a:t>
+            </a:r>
+            <a:r>
+              <a:rPr lang="pl-PL" sz="1900" dirty="0"/>
+              <a:t>/F2</a:t>
+            </a:r>
+            <a:r>
+              <a:rPr lang="en-US" sz="1900" dirty="0"/>
+              <a:t> Score</a:t>
+            </a:r>
+          </a:p>
+          <a:p>
+            <a:pPr lvl="1" algn="just"/>
+            <a:r>
+              <a:rPr lang="en-US" sz="1900" dirty="0"/>
+              <a:t>Lift and Gain</a:t>
+            </a:r>
+          </a:p>
+          <a:p>
+            <a:pPr lvl="1" algn="just"/>
+            <a:r>
+              <a:rPr lang="en-US" sz="1900" dirty="0"/>
+              <a:t>KS statistics</a:t>
+            </a:r>
+          </a:p>
+          <a:p>
+            <a:pPr lvl="1" algn="just"/>
+            <a:r>
+              <a:rPr lang="en-US" sz="1900" dirty="0"/>
+              <a:t>AUC-ROC</a:t>
+            </a:r>
+          </a:p>
+        </p:txBody>
+      </p:sp>
+      <p:sp>
+        <p:nvSpPr>
+          <p:cNvPr id="4" name="Title 1">
+            <a:extLst>
+              <a:ext uri="{FF2B5EF4-FFF2-40B4-BE49-F238E27FC236}">
+                <a16:creationId xmlns:a16="http://schemas.microsoft.com/office/drawing/2014/main" id="{F0FEE1CD-BF08-48FA-8526-5BEB92660675}"/>
+              </a:ext>
+            </a:extLst>
+          </p:cNvPr>
+          <p:cNvSpPr txBox="1">
+            <a:spLocks/>
+          </p:cNvSpPr>
+          <p:nvPr/>
+        </p:nvSpPr>
+        <p:spPr>
+          <a:xfrm rot="5400000">
+            <a:off x="5488404" y="-5488406"/>
+            <a:ext cx="1215190" cy="12192001"/>
+          </a:xfrm>
+          <a:prstGeom prst="rect">
+            <a:avLst/>
+          </a:prstGeom>
+          <a:solidFill>
+            <a:srgbClr val="3B3B3B"/>
+          </a:solidFill>
+        </p:spPr>
+        <p:txBody>
+          <a:bodyPr vert="vert270" lIns="91440" tIns="45720" rIns="91440" bIns="45720" rtlCol="0" anchor="ctr" anchorCtr="0">
+            <a:normAutofit/>
+          </a:bodyPr>
+          <a:lstStyle>
+            <a:lvl1pPr algn="l" defTabSz="914400" rtl="0" eaLnBrk="1" latinLnBrk="0" hangingPunct="1">
+              <a:lnSpc>
+                <a:spcPct val="90000"/>
+              </a:lnSpc>
+              <a:spcBef>
+                <a:spcPct val="0"/>
+              </a:spcBef>
+              <a:buNone/>
+              <a:defRPr sz="4400" kern="1200">
+                <a:solidFill>
+                  <a:schemeClr val="tx1"/>
+                </a:solidFill>
+                <a:latin typeface="+mj-lt"/>
+                <a:ea typeface="+mj-ea"/>
+                <a:cs typeface="+mj-cs"/>
+              </a:defRPr>
+            </a:lvl1pPr>
+          </a:lstStyle>
+          <a:p>
+            <a:pPr algn="ctr"/>
+            <a:r>
               <a:rPr lang="pl-PL" b="1" dirty="0">
                 <a:solidFill>
                   <a:srgbClr val="FF6600"/>
@@ -8585,7 +8895,7 @@
 </p:sld>
 </file>
 
-<file path=ppt/slides/slide21.xml><?xml version="1.0" encoding="utf-8"?>
+<file path=ppt/slides/slide22.xml><?xml version="1.0" encoding="utf-8"?>
 <p:sld xmlns:a="http://schemas.openxmlformats.org/drawingml/2006/main" xmlns:r="http://schemas.openxmlformats.org/officeDocument/2006/relationships" xmlns:p="http://schemas.openxmlformats.org/presentationml/2006/main">
   <p:cSld>
     <p:spTree>
@@ -9407,7 +9717,7 @@
             <a:pPr lvl="1"/>
             <a:r>
               <a:rPr lang="en-US" dirty="0"/>
-              <a:t>2004 data entries</a:t>
+              <a:t>3425 data entries</a:t>
             </a:r>
           </a:p>
           <a:p>

</xml_diff>